<commit_message>
Added Applied Decision Intelligence
</commit_message>
<xml_diff>
--- a/Images/DecisionIntelligence.pptx
+++ b/Images/DecisionIntelligence.pptx
@@ -5,7 +5,7 @@
     <p:sldMasterId id="2147483648" r:id="rId1"/>
   </p:sldMasterIdLst>
   <p:notesMasterIdLst>
-    <p:notesMasterId r:id="rId8"/>
+    <p:notesMasterId r:id="rId9"/>
   </p:notesMasterIdLst>
   <p:sldIdLst>
     <p:sldId id="265" r:id="rId2"/>
@@ -14,6 +14,7 @@
     <p:sldId id="267" r:id="rId5"/>
     <p:sldId id="268" r:id="rId6"/>
     <p:sldId id="269" r:id="rId7"/>
+    <p:sldId id="270" r:id="rId8"/>
   </p:sldIdLst>
   <p:sldSz cx="12192000" cy="6858000"/>
   <p:notesSz cx="6858000" cy="9144000"/>
@@ -112,6 +113,30 @@
       </a:defRPr>
     </a:lvl9pPr>
   </p:defaultTextStyle>
+  <p:extLst>
+    <p:ext uri="{521415D9-36F7-43E2-AB2F-B90AF26B5E84}">
+      <p14:sectionLst xmlns:p14="http://schemas.microsoft.com/office/powerpoint/2010/main">
+        <p14:section name="Default Section" id="{19190146-3B61-544B-8A68-15D6E7193C40}">
+          <p14:sldIdLst>
+            <p14:sldId id="265"/>
+            <p14:sldId id="264"/>
+            <p14:sldId id="266"/>
+            <p14:sldId id="267"/>
+            <p14:sldId id="268"/>
+            <p14:sldId id="269"/>
+          </p14:sldIdLst>
+        </p14:section>
+        <p14:section name="Applied" id="{675E842B-1B59-A94B-A0D6-55AC10858A7F}">
+          <p14:sldIdLst>
+            <p14:sldId id="270"/>
+          </p14:sldIdLst>
+        </p14:section>
+      </p14:sectionLst>
+    </p:ext>
+    <p:ext uri="{EFAFB233-063F-42B5-8137-9DF3F51BA10A}">
+      <p15:sldGuideLst xmlns:p15="http://schemas.microsoft.com/office/powerpoint/2012/main"/>
+    </p:ext>
+  </p:extLst>
 </p:presentation>
 </file>
 
@@ -197,7 +222,7 @@
           <a:p>
             <a:fld id="{2CEE8FBA-7790-BE4B-A711-6375D57AA7C0}" type="datetimeFigureOut">
               <a:rPr lang="en-US" smtClean="0"/>
-              <a:t>12/1/24</a:t>
+              <a:t>12/2/24</a:t>
             </a:fld>
             <a:endParaRPr lang="en-US" dirty="0"/>
           </a:p>
@@ -732,7 +757,7 @@
                 <a:tabLst/>
                 <a:defRPr/>
               </a:pPr>
-              <a:t>12/1/24 9:19 PM</a:t>
+              <a:t>12/2/24 8:32 AM</a:t>
             </a:fld>
             <a:endParaRPr kumimoji="0" lang="en-US" sz="1200" b="0" i="0" u="none" strike="noStrike" kern="1200" cap="none" spc="0" normalizeH="0" baseline="0" noProof="0" dirty="0">
               <a:ln>
@@ -1121,7 +1146,7 @@
                 <a:tabLst/>
                 <a:defRPr/>
               </a:pPr>
-              <a:t>12/1/24 9:10 PM</a:t>
+              <a:t>12/2/24 8:32 AM</a:t>
             </a:fld>
             <a:endParaRPr kumimoji="0" lang="en-US" sz="1200" b="0" i="0" u="none" strike="noStrike" kern="1200" cap="none" spc="0" normalizeH="0" baseline="0" noProof="0" dirty="0">
               <a:ln>
@@ -1510,7 +1535,7 @@
                 <a:tabLst/>
                 <a:defRPr/>
               </a:pPr>
-              <a:t>12/1/24 9:27 PM</a:t>
+              <a:t>12/2/24 8:32 AM</a:t>
             </a:fld>
             <a:endParaRPr kumimoji="0" lang="en-US" sz="1200" b="0" i="0" u="none" strike="noStrike" kern="1200" cap="none" spc="0" normalizeH="0" baseline="0" noProof="0" dirty="0">
               <a:ln>
@@ -1899,7 +1924,7 @@
                 <a:tabLst/>
                 <a:defRPr/>
               </a:pPr>
-              <a:t>12/1/24 9:29 PM</a:t>
+              <a:t>12/2/24 8:32 AM</a:t>
             </a:fld>
             <a:endParaRPr kumimoji="0" lang="en-US" sz="1200" b="0" i="0" u="none" strike="noStrike" kern="1200" cap="none" spc="0" normalizeH="0" baseline="0" noProof="0" dirty="0">
               <a:ln>
@@ -2288,7 +2313,7 @@
                 <a:tabLst/>
                 <a:defRPr/>
               </a:pPr>
-              <a:t>12/1/24 9:30 PM</a:t>
+              <a:t>12/2/24 8:32 AM</a:t>
             </a:fld>
             <a:endParaRPr kumimoji="0" lang="en-US" sz="1200" b="0" i="0" u="none" strike="noStrike" kern="1200" cap="none" spc="0" normalizeH="0" baseline="0" noProof="0" dirty="0">
               <a:ln>
@@ -2677,7 +2702,7 @@
                 <a:tabLst/>
                 <a:defRPr/>
               </a:pPr>
-              <a:t>12/1/24 9:31 PM</a:t>
+              <a:t>12/2/24 8:32 AM</a:t>
             </a:fld>
             <a:endParaRPr kumimoji="0" lang="en-US" sz="1200" b="0" i="0" u="none" strike="noStrike" kern="1200" cap="none" spc="0" normalizeH="0" baseline="0" noProof="0" dirty="0">
               <a:ln>
@@ -2789,6 +2814,395 @@
     <p:extLst>
       <p:ext uri="{BB962C8B-B14F-4D97-AF65-F5344CB8AC3E}">
         <p14:creationId xmlns:p14="http://schemas.microsoft.com/office/powerpoint/2010/main" val="2671923654"/>
+      </p:ext>
+    </p:extLst>
+  </p:cSld>
+  <p:clrMapOvr>
+    <a:masterClrMapping/>
+  </p:clrMapOvr>
+</p:notes>
+</file>
+
+<file path=ppt/notesSlides/notesSlide7.xml><?xml version="1.0" encoding="utf-8"?>
+<p:notes xmlns:a="http://schemas.openxmlformats.org/drawingml/2006/main" xmlns:r="http://schemas.openxmlformats.org/officeDocument/2006/relationships" xmlns:p="http://schemas.openxmlformats.org/presentationml/2006/main">
+  <p:cSld>
+    <p:spTree>
+      <p:nvGrpSpPr>
+        <p:cNvPr id="1" name="">
+          <a:extLst>
+            <a:ext uri="{FF2B5EF4-FFF2-40B4-BE49-F238E27FC236}">
+              <a16:creationId xmlns:a16="http://schemas.microsoft.com/office/drawing/2014/main" id="{1BAE3ED1-86C9-0D2A-0388-0E5A2226BC46}"/>
+            </a:ext>
+          </a:extLst>
+        </p:cNvPr>
+        <p:cNvGrpSpPr/>
+        <p:nvPr/>
+      </p:nvGrpSpPr>
+      <p:grpSpPr>
+        <a:xfrm>
+          <a:off x="0" y="0"/>
+          <a:ext cx="0" cy="0"/>
+          <a:chOff x="0" y="0"/>
+          <a:chExt cx="0" cy="0"/>
+        </a:xfrm>
+      </p:grpSpPr>
+      <p:sp>
+        <p:nvSpPr>
+          <p:cNvPr id="2" name="Slide Image Placeholder 1">
+            <a:extLst>
+              <a:ext uri="{FF2B5EF4-FFF2-40B4-BE49-F238E27FC236}">
+                <a16:creationId xmlns:a16="http://schemas.microsoft.com/office/drawing/2014/main" id="{1F8EBFB7-630B-34A3-2DA7-B542CD0AF5D1}"/>
+              </a:ext>
+            </a:extLst>
+          </p:cNvPr>
+          <p:cNvSpPr>
+            <a:spLocks noGrp="1" noRot="1" noChangeAspect="1"/>
+          </p:cNvSpPr>
+          <p:nvPr>
+            <p:ph type="sldImg"/>
+          </p:nvPr>
+        </p:nvSpPr>
+        <p:spPr/>
+      </p:sp>
+      <p:sp>
+        <p:nvSpPr>
+          <p:cNvPr id="3" name="Notes Placeholder 2">
+            <a:extLst>
+              <a:ext uri="{FF2B5EF4-FFF2-40B4-BE49-F238E27FC236}">
+                <a16:creationId xmlns:a16="http://schemas.microsoft.com/office/drawing/2014/main" id="{2AFA4FA9-738A-8627-CA8C-3E3A6B4CFD5F}"/>
+              </a:ext>
+            </a:extLst>
+          </p:cNvPr>
+          <p:cNvSpPr>
+            <a:spLocks noGrp="1"/>
+          </p:cNvSpPr>
+          <p:nvPr>
+            <p:ph type="body" idx="1"/>
+          </p:nvPr>
+        </p:nvSpPr>
+        <p:spPr/>
+        <p:txBody>
+          <a:bodyPr/>
+          <a:lstStyle/>
+          <a:p>
+            <a:pPr marL="0" marR="0">
+              <a:lnSpc>
+                <a:spcPct val="107000"/>
+              </a:lnSpc>
+              <a:spcBef>
+                <a:spcPts val="0"/>
+              </a:spcBef>
+              <a:spcAft>
+                <a:spcPts val="600"/>
+              </a:spcAft>
+            </a:pPr>
+            <a:endParaRPr lang="en-US" dirty="0"/>
+          </a:p>
+        </p:txBody>
+      </p:sp>
+      <p:sp>
+        <p:nvSpPr>
+          <p:cNvPr id="4" name="Header Placeholder 3">
+            <a:extLst>
+              <a:ext uri="{FF2B5EF4-FFF2-40B4-BE49-F238E27FC236}">
+                <a16:creationId xmlns:a16="http://schemas.microsoft.com/office/drawing/2014/main" id="{78C54FE3-C4A1-C11B-A227-FA27F8507D31}"/>
+              </a:ext>
+            </a:extLst>
+          </p:cNvPr>
+          <p:cNvSpPr>
+            <a:spLocks noGrp="1"/>
+          </p:cNvSpPr>
+          <p:nvPr>
+            <p:ph type="hdr" sz="quarter"/>
+          </p:nvPr>
+        </p:nvSpPr>
+        <p:spPr/>
+        <p:txBody>
+          <a:bodyPr/>
+          <a:lstStyle/>
+          <a:p>
+            <a:pPr marL="0" marR="0" lvl="0" indent="0" algn="l" defTabSz="914367" rtl="0" eaLnBrk="1" fontAlgn="auto" latinLnBrk="0" hangingPunct="1">
+              <a:lnSpc>
+                <a:spcPct val="100000"/>
+              </a:lnSpc>
+              <a:spcBef>
+                <a:spcPts val="0"/>
+              </a:spcBef>
+              <a:spcAft>
+                <a:spcPts val="0"/>
+              </a:spcAft>
+              <a:buClrTx/>
+              <a:buSzTx/>
+              <a:buFontTx/>
+              <a:buNone/>
+              <a:tabLst/>
+              <a:defRPr/>
+            </a:pPr>
+            <a:endParaRPr kumimoji="0" lang="en-US" sz="1200" b="0" i="0" u="none" strike="noStrike" kern="1200" cap="none" spc="0" normalizeH="0" baseline="0" noProof="0" dirty="0">
+              <a:ln>
+                <a:noFill/>
+              </a:ln>
+              <a:solidFill>
+                <a:prstClr val="black"/>
+              </a:solidFill>
+              <a:effectLst/>
+              <a:uLnTx/>
+              <a:uFillTx/>
+              <a:latin typeface="Segoe UI" pitchFamily="34" charset="0"/>
+              <a:ea typeface="+mn-ea"/>
+              <a:cs typeface="+mn-cs"/>
+            </a:endParaRPr>
+          </a:p>
+        </p:txBody>
+      </p:sp>
+      <p:sp>
+        <p:nvSpPr>
+          <p:cNvPr id="5" name="Footer Placeholder 4">
+            <a:extLst>
+              <a:ext uri="{FF2B5EF4-FFF2-40B4-BE49-F238E27FC236}">
+                <a16:creationId xmlns:a16="http://schemas.microsoft.com/office/drawing/2014/main" id="{1E4D613E-F673-6001-AD3B-2F3980DCDA97}"/>
+              </a:ext>
+            </a:extLst>
+          </p:cNvPr>
+          <p:cNvSpPr>
+            <a:spLocks noGrp="1"/>
+          </p:cNvSpPr>
+          <p:nvPr>
+            <p:ph type="ftr" sz="quarter" idx="4"/>
+          </p:nvPr>
+        </p:nvSpPr>
+        <p:spPr/>
+        <p:txBody>
+          <a:bodyPr/>
+          <a:lstStyle/>
+          <a:p>
+            <a:pPr marL="571500" marR="0" lvl="0" indent="0" algn="l" defTabSz="914099" rtl="0" eaLnBrk="0" fontAlgn="auto" latinLnBrk="0" hangingPunct="0">
+              <a:lnSpc>
+                <a:spcPct val="100000"/>
+              </a:lnSpc>
+              <a:spcBef>
+                <a:spcPts val="0"/>
+              </a:spcBef>
+              <a:spcAft>
+                <a:spcPts val="0"/>
+              </a:spcAft>
+              <a:buClrTx/>
+              <a:buSzTx/>
+              <a:buFontTx/>
+              <a:buNone/>
+              <a:tabLst/>
+              <a:defRPr/>
+            </a:pPr>
+            <a:r>
+              <a:rPr kumimoji="0" lang="en-US" sz="400" b="0" i="0" u="none" strike="noStrike" kern="1200" cap="none" spc="0" normalizeH="0" baseline="0" noProof="0" dirty="0">
+                <a:ln>
+                  <a:noFill/>
+                </a:ln>
+                <a:gradFill>
+                  <a:gsLst>
+                    <a:gs pos="0">
+                      <a:prstClr val="black"/>
+                    </a:gs>
+                    <a:gs pos="100000">
+                      <a:prstClr val="black"/>
+                    </a:gs>
+                  </a:gsLst>
+                  <a:lin ang="5400000" scaled="0"/>
+                </a:gradFill>
+                <a:effectLst/>
+                <a:uLnTx/>
+                <a:uFillTx/>
+                <a:latin typeface="Segoe UI" pitchFamily="34" charset="0"/>
+                <a:ea typeface="Segoe UI" pitchFamily="34" charset="0"/>
+                <a:cs typeface="Segoe UI" pitchFamily="34" charset="0"/>
+              </a:rPr>
+              <a:t>© Microsoft Corporation. All rights reserved. MICROSOFT MAKES NO WARRANTIES, EXPRESS, IMPLIED OR STATUTORY, AS TO THE INFORMATION IN THIS PRESENTATION.</a:t>
+            </a:r>
+          </a:p>
+        </p:txBody>
+      </p:sp>
+      <p:sp>
+        <p:nvSpPr>
+          <p:cNvPr id="6" name="Date Placeholder 5">
+            <a:extLst>
+              <a:ext uri="{FF2B5EF4-FFF2-40B4-BE49-F238E27FC236}">
+                <a16:creationId xmlns:a16="http://schemas.microsoft.com/office/drawing/2014/main" id="{16EFEA1D-B72C-76C8-86A3-83131B726E97}"/>
+              </a:ext>
+            </a:extLst>
+          </p:cNvPr>
+          <p:cNvSpPr>
+            <a:spLocks noGrp="1"/>
+          </p:cNvSpPr>
+          <p:nvPr>
+            <p:ph type="dt" idx="1"/>
+          </p:nvPr>
+        </p:nvSpPr>
+        <p:spPr/>
+        <p:txBody>
+          <a:bodyPr/>
+          <a:lstStyle/>
+          <a:p>
+            <a:pPr marL="0" marR="0" lvl="0" indent="0" algn="r" defTabSz="914367" rtl="0" eaLnBrk="1" fontAlgn="auto" latinLnBrk="0" hangingPunct="1">
+              <a:lnSpc>
+                <a:spcPct val="100000"/>
+              </a:lnSpc>
+              <a:spcBef>
+                <a:spcPts val="0"/>
+              </a:spcBef>
+              <a:spcAft>
+                <a:spcPts val="0"/>
+              </a:spcAft>
+              <a:buClrTx/>
+              <a:buSzTx/>
+              <a:buFontTx/>
+              <a:buNone/>
+              <a:tabLst/>
+              <a:defRPr/>
+            </a:pPr>
+            <a:fld id="{386CE63F-9E7F-4C04-9D0D-FCA25A8E9E86}" type="datetime8">
+              <a:rPr kumimoji="0" lang="en-US" sz="1200" b="0" i="0" u="none" strike="noStrike" kern="1200" cap="none" spc="0" normalizeH="0" baseline="0" noProof="0" smtClean="0">
+                <a:ln>
+                  <a:noFill/>
+                </a:ln>
+                <a:solidFill>
+                  <a:prstClr val="black"/>
+                </a:solidFill>
+                <a:effectLst/>
+                <a:uLnTx/>
+                <a:uFillTx/>
+                <a:latin typeface="Segoe UI" pitchFamily="34" charset="0"/>
+                <a:ea typeface="+mn-ea"/>
+                <a:cs typeface="+mn-cs"/>
+              </a:rPr>
+              <a:pPr marL="0" marR="0" lvl="0" indent="0" algn="r" defTabSz="914367" rtl="0" eaLnBrk="1" fontAlgn="auto" latinLnBrk="0" hangingPunct="1">
+                <a:lnSpc>
+                  <a:spcPct val="100000"/>
+                </a:lnSpc>
+                <a:spcBef>
+                  <a:spcPts val="0"/>
+                </a:spcBef>
+                <a:spcAft>
+                  <a:spcPts val="0"/>
+                </a:spcAft>
+                <a:buClrTx/>
+                <a:buSzTx/>
+                <a:buFontTx/>
+                <a:buNone/>
+                <a:tabLst/>
+                <a:defRPr/>
+              </a:pPr>
+              <a:t>12/2/24 8:33 AM</a:t>
+            </a:fld>
+            <a:endParaRPr kumimoji="0" lang="en-US" sz="1200" b="0" i="0" u="none" strike="noStrike" kern="1200" cap="none" spc="0" normalizeH="0" baseline="0" noProof="0" dirty="0">
+              <a:ln>
+                <a:noFill/>
+              </a:ln>
+              <a:solidFill>
+                <a:prstClr val="black"/>
+              </a:solidFill>
+              <a:effectLst/>
+              <a:uLnTx/>
+              <a:uFillTx/>
+              <a:latin typeface="Segoe UI" pitchFamily="34" charset="0"/>
+              <a:ea typeface="+mn-ea"/>
+              <a:cs typeface="+mn-cs"/>
+            </a:endParaRPr>
+          </a:p>
+        </p:txBody>
+      </p:sp>
+      <p:sp>
+        <p:nvSpPr>
+          <p:cNvPr id="7" name="Slide Number Placeholder 6">
+            <a:extLst>
+              <a:ext uri="{FF2B5EF4-FFF2-40B4-BE49-F238E27FC236}">
+                <a16:creationId xmlns:a16="http://schemas.microsoft.com/office/drawing/2014/main" id="{E866D2AF-FAC3-6F1E-8E8F-2FD60CA7DCA1}"/>
+              </a:ext>
+            </a:extLst>
+          </p:cNvPr>
+          <p:cNvSpPr>
+            <a:spLocks noGrp="1"/>
+          </p:cNvSpPr>
+          <p:nvPr>
+            <p:ph type="sldNum" sz="quarter" idx="5"/>
+          </p:nvPr>
+        </p:nvSpPr>
+        <p:spPr/>
+        <p:txBody>
+          <a:bodyPr/>
+          <a:lstStyle/>
+          <a:p>
+            <a:pPr marL="0" marR="0" lvl="0" indent="0" algn="r" defTabSz="914367" rtl="0" eaLnBrk="1" fontAlgn="auto" latinLnBrk="0" hangingPunct="1">
+              <a:lnSpc>
+                <a:spcPct val="100000"/>
+              </a:lnSpc>
+              <a:spcBef>
+                <a:spcPts val="0"/>
+              </a:spcBef>
+              <a:spcAft>
+                <a:spcPts val="0"/>
+              </a:spcAft>
+              <a:buClrTx/>
+              <a:buSzTx/>
+              <a:buFontTx/>
+              <a:buNone/>
+              <a:tabLst/>
+              <a:defRPr/>
+            </a:pPr>
+            <a:fld id="{B4008EB6-D09E-4580-8CD6-DDB14511944F}" type="slidenum">
+              <a:rPr kumimoji="0" lang="en-US" sz="1200" b="0" i="0" u="none" strike="noStrike" kern="1200" cap="none" spc="0" normalizeH="0" baseline="0" noProof="0" smtClean="0">
+                <a:ln>
+                  <a:noFill/>
+                </a:ln>
+                <a:solidFill>
+                  <a:prstClr val="black"/>
+                </a:solidFill>
+                <a:effectLst/>
+                <a:uLnTx/>
+                <a:uFillTx/>
+                <a:latin typeface="Segoe UI" pitchFamily="34" charset="0"/>
+                <a:ea typeface="+mn-ea"/>
+                <a:cs typeface="+mn-cs"/>
+              </a:rPr>
+              <a:pPr marL="0" marR="0" lvl="0" indent="0" algn="r" defTabSz="914367" rtl="0" eaLnBrk="1" fontAlgn="auto" latinLnBrk="0" hangingPunct="1">
+                <a:lnSpc>
+                  <a:spcPct val="100000"/>
+                </a:lnSpc>
+                <a:spcBef>
+                  <a:spcPts val="0"/>
+                </a:spcBef>
+                <a:spcAft>
+                  <a:spcPts val="0"/>
+                </a:spcAft>
+                <a:buClrTx/>
+                <a:buSzTx/>
+                <a:buFontTx/>
+                <a:buNone/>
+                <a:tabLst/>
+                <a:defRPr/>
+              </a:pPr>
+              <a:t>7</a:t>
+            </a:fld>
+            <a:endParaRPr kumimoji="0" lang="en-US" sz="1200" b="0" i="0" u="none" strike="noStrike" kern="1200" cap="none" spc="0" normalizeH="0" baseline="0" noProof="0" dirty="0">
+              <a:ln>
+                <a:noFill/>
+              </a:ln>
+              <a:solidFill>
+                <a:prstClr val="black"/>
+              </a:solidFill>
+              <a:effectLst/>
+              <a:uLnTx/>
+              <a:uFillTx/>
+              <a:latin typeface="Segoe UI" pitchFamily="34" charset="0"/>
+              <a:ea typeface="+mn-ea"/>
+              <a:cs typeface="+mn-cs"/>
+            </a:endParaRPr>
+          </a:p>
+        </p:txBody>
+      </p:sp>
+    </p:spTree>
+    <p:extLst>
+      <p:ext uri="{BB962C8B-B14F-4D97-AF65-F5344CB8AC3E}">
+        <p14:creationId xmlns:p14="http://schemas.microsoft.com/office/powerpoint/2010/main" val="1984963095"/>
       </p:ext>
     </p:extLst>
   </p:cSld>
@@ -2945,7 +3359,7 @@
           <a:p>
             <a:fld id="{CC3759E9-439F-164C-816F-E7C3A6980DCB}" type="datetimeFigureOut">
               <a:rPr lang="en-US" smtClean="0"/>
-              <a:t>12/1/24</a:t>
+              <a:t>12/2/24</a:t>
             </a:fld>
             <a:endParaRPr lang="en-US" dirty="0"/>
           </a:p>
@@ -3143,7 +3557,7 @@
           <a:p>
             <a:fld id="{CC3759E9-439F-164C-816F-E7C3A6980DCB}" type="datetimeFigureOut">
               <a:rPr lang="en-US" smtClean="0"/>
-              <a:t>12/1/24</a:t>
+              <a:t>12/2/24</a:t>
             </a:fld>
             <a:endParaRPr lang="en-US" dirty="0"/>
           </a:p>
@@ -3351,7 +3765,7 @@
           <a:p>
             <a:fld id="{CC3759E9-439F-164C-816F-E7C3A6980DCB}" type="datetimeFigureOut">
               <a:rPr lang="en-US" smtClean="0"/>
-              <a:t>12/1/24</a:t>
+              <a:t>12/2/24</a:t>
             </a:fld>
             <a:endParaRPr lang="en-US" dirty="0"/>
           </a:p>
@@ -3549,7 +3963,7 @@
           <a:p>
             <a:fld id="{CC3759E9-439F-164C-816F-E7C3A6980DCB}" type="datetimeFigureOut">
               <a:rPr lang="en-US" smtClean="0"/>
-              <a:t>12/1/24</a:t>
+              <a:t>12/2/24</a:t>
             </a:fld>
             <a:endParaRPr lang="en-US" dirty="0"/>
           </a:p>
@@ -3824,7 +4238,7 @@
           <a:p>
             <a:fld id="{CC3759E9-439F-164C-816F-E7C3A6980DCB}" type="datetimeFigureOut">
               <a:rPr lang="en-US" smtClean="0"/>
-              <a:t>12/1/24</a:t>
+              <a:t>12/2/24</a:t>
             </a:fld>
             <a:endParaRPr lang="en-US" dirty="0"/>
           </a:p>
@@ -4089,7 +4503,7 @@
           <a:p>
             <a:fld id="{CC3759E9-439F-164C-816F-E7C3A6980DCB}" type="datetimeFigureOut">
               <a:rPr lang="en-US" smtClean="0"/>
-              <a:t>12/1/24</a:t>
+              <a:t>12/2/24</a:t>
             </a:fld>
             <a:endParaRPr lang="en-US" dirty="0"/>
           </a:p>
@@ -4501,7 +4915,7 @@
           <a:p>
             <a:fld id="{CC3759E9-439F-164C-816F-E7C3A6980DCB}" type="datetimeFigureOut">
               <a:rPr lang="en-US" smtClean="0"/>
-              <a:t>12/1/24</a:t>
+              <a:t>12/2/24</a:t>
             </a:fld>
             <a:endParaRPr lang="en-US" dirty="0"/>
           </a:p>
@@ -4642,7 +5056,7 @@
           <a:p>
             <a:fld id="{CC3759E9-439F-164C-816F-E7C3A6980DCB}" type="datetimeFigureOut">
               <a:rPr lang="en-US" smtClean="0"/>
-              <a:t>12/1/24</a:t>
+              <a:t>12/2/24</a:t>
             </a:fld>
             <a:endParaRPr lang="en-US" dirty="0"/>
           </a:p>
@@ -4755,7 +5169,7 @@
           <a:p>
             <a:fld id="{CC3759E9-439F-164C-816F-E7C3A6980DCB}" type="datetimeFigureOut">
               <a:rPr lang="en-US" smtClean="0"/>
-              <a:t>12/1/24</a:t>
+              <a:t>12/2/24</a:t>
             </a:fld>
             <a:endParaRPr lang="en-US" dirty="0"/>
           </a:p>
@@ -5066,7 +5480,7 @@
           <a:p>
             <a:fld id="{CC3759E9-439F-164C-816F-E7C3A6980DCB}" type="datetimeFigureOut">
               <a:rPr lang="en-US" smtClean="0"/>
-              <a:t>12/1/24</a:t>
+              <a:t>12/2/24</a:t>
             </a:fld>
             <a:endParaRPr lang="en-US" dirty="0"/>
           </a:p>
@@ -5354,7 +5768,7 @@
           <a:p>
             <a:fld id="{CC3759E9-439F-164C-816F-E7C3A6980DCB}" type="datetimeFigureOut">
               <a:rPr lang="en-US" smtClean="0"/>
-              <a:t>12/1/24</a:t>
+              <a:t>12/2/24</a:t>
             </a:fld>
             <a:endParaRPr lang="en-US" dirty="0"/>
           </a:p>
@@ -5595,7 +6009,7 @@
           <a:p>
             <a:fld id="{CC3759E9-439F-164C-816F-E7C3A6980DCB}" type="datetimeFigureOut">
               <a:rPr lang="en-US" smtClean="0"/>
-              <a:t>12/1/24</a:t>
+              <a:t>12/2/24</a:t>
             </a:fld>
             <a:endParaRPr lang="en-US" dirty="0"/>
           </a:p>
@@ -7697,13 +8111,13 @@
   <p:clrMapOvr>
     <a:masterClrMapping/>
   </p:clrMapOvr>
-  <mc:AlternateContent xmlns:mc="http://schemas.openxmlformats.org/markup-compatibility/2006">
-    <mc:Choice xmlns:p14="http://schemas.microsoft.com/office/powerpoint/2010/main" Requires="p14">
+  <mc:AlternateContent xmlns:mc="http://schemas.openxmlformats.org/markup-compatibility/2006" xmlns:p14="http://schemas.microsoft.com/office/powerpoint/2010/main">
+    <mc:Choice Requires="p14">
       <p:transition spd="med" p14:dur="700">
         <p:fade/>
       </p:transition>
     </mc:Choice>
-    <mc:Fallback>
+    <mc:Fallback xmlns="">
       <p:transition spd="med">
         <p:fade/>
       </p:transition>
@@ -12167,13 +12581,13 @@
   <p:clrMapOvr>
     <a:masterClrMapping/>
   </p:clrMapOvr>
-  <mc:AlternateContent xmlns:mc="http://schemas.openxmlformats.org/markup-compatibility/2006">
-    <mc:Choice xmlns:p14="http://schemas.microsoft.com/office/powerpoint/2010/main" Requires="p14">
+  <mc:AlternateContent xmlns:mc="http://schemas.openxmlformats.org/markup-compatibility/2006" xmlns:p14="http://schemas.microsoft.com/office/powerpoint/2010/main">
+    <mc:Choice Requires="p14">
       <p:transition spd="med" p14:dur="700">
         <p:fade/>
       </p:transition>
     </mc:Choice>
-    <mc:Fallback>
+    <mc:Fallback xmlns="">
       <p:transition spd="med">
         <p:fade/>
       </p:transition>
@@ -14403,13 +14817,13 @@
   <p:clrMapOvr>
     <a:masterClrMapping/>
   </p:clrMapOvr>
-  <mc:AlternateContent xmlns:mc="http://schemas.openxmlformats.org/markup-compatibility/2006">
-    <mc:Choice xmlns:p14="http://schemas.microsoft.com/office/powerpoint/2010/main" Requires="p14">
+  <mc:AlternateContent xmlns:mc="http://schemas.openxmlformats.org/markup-compatibility/2006" xmlns:p14="http://schemas.microsoft.com/office/powerpoint/2010/main">
+    <mc:Choice Requires="p14">
       <p:transition spd="med" p14:dur="700">
         <p:fade/>
       </p:transition>
     </mc:Choice>
-    <mc:Fallback>
+    <mc:Fallback xmlns="">
       <p:transition spd="med">
         <p:fade/>
       </p:transition>
@@ -16639,13 +17053,13 @@
   <p:clrMapOvr>
     <a:masterClrMapping/>
   </p:clrMapOvr>
-  <mc:AlternateContent xmlns:mc="http://schemas.openxmlformats.org/markup-compatibility/2006">
-    <mc:Choice xmlns:p14="http://schemas.microsoft.com/office/powerpoint/2010/main" Requires="p14">
+  <mc:AlternateContent xmlns:mc="http://schemas.openxmlformats.org/markup-compatibility/2006" xmlns:p14="http://schemas.microsoft.com/office/powerpoint/2010/main">
+    <mc:Choice Requires="p14">
       <p:transition spd="med" p14:dur="700">
         <p:fade/>
       </p:transition>
     </mc:Choice>
-    <mc:Fallback>
+    <mc:Fallback xmlns="">
       <p:transition spd="med">
         <p:fade/>
       </p:transition>
@@ -18875,13 +19289,13 @@
   <p:clrMapOvr>
     <a:masterClrMapping/>
   </p:clrMapOvr>
-  <mc:AlternateContent xmlns:mc="http://schemas.openxmlformats.org/markup-compatibility/2006">
-    <mc:Choice xmlns:p14="http://schemas.microsoft.com/office/powerpoint/2010/main" Requires="p14">
+  <mc:AlternateContent xmlns:mc="http://schemas.openxmlformats.org/markup-compatibility/2006" xmlns:p14="http://schemas.microsoft.com/office/powerpoint/2010/main">
+    <mc:Choice Requires="p14">
       <p:transition spd="med" p14:dur="700">
         <p:fade/>
       </p:transition>
     </mc:Choice>
-    <mc:Fallback>
+    <mc:Fallback xmlns="">
       <p:transition spd="med">
         <p:fade/>
       </p:transition>
@@ -19438,6 +19852,2289 @@
       <p:bldP spid="23" grpId="0"/>
       <p:bldP spid="27" grpId="0"/>
       <p:bldP spid="3" grpId="0" animBg="1"/>
+    </p:bldLst>
+  </p:timing>
+</p:sld>
+</file>
+
+<file path=ppt/slides/slide7.xml><?xml version="1.0" encoding="utf-8"?>
+<p:sld xmlns:a="http://schemas.openxmlformats.org/drawingml/2006/main" xmlns:r="http://schemas.openxmlformats.org/officeDocument/2006/relationships" xmlns:p="http://schemas.openxmlformats.org/presentationml/2006/main">
+  <p:cSld>
+    <p:spTree>
+      <p:nvGrpSpPr>
+        <p:cNvPr id="1" name="">
+          <a:extLst>
+            <a:ext uri="{FF2B5EF4-FFF2-40B4-BE49-F238E27FC236}">
+              <a16:creationId xmlns:a16="http://schemas.microsoft.com/office/drawing/2014/main" id="{C66C70F4-CC02-E441-9AEC-18C94C977202}"/>
+            </a:ext>
+          </a:extLst>
+        </p:cNvPr>
+        <p:cNvGrpSpPr/>
+        <p:nvPr/>
+      </p:nvGrpSpPr>
+      <p:grpSpPr>
+        <a:xfrm>
+          <a:off x="0" y="0"/>
+          <a:ext cx="0" cy="0"/>
+          <a:chOff x="0" y="0"/>
+          <a:chExt cx="0" cy="0"/>
+        </a:xfrm>
+      </p:grpSpPr>
+      <p:sp>
+        <p:nvSpPr>
+          <p:cNvPr id="4" name="Rounded Rectangle 7">
+            <a:extLst>
+              <a:ext uri="{FF2B5EF4-FFF2-40B4-BE49-F238E27FC236}">
+                <a16:creationId xmlns:a16="http://schemas.microsoft.com/office/drawing/2014/main" id="{FE4D2F0B-4738-C368-C4F6-92CC9DD3FF8A}"/>
+              </a:ext>
+              <a:ext uri="{C183D7F6-B498-43B3-948B-1728B52AA6E4}">
+                <adec:decorative xmlns:adec="http://schemas.microsoft.com/office/drawing/2017/decorative" val="1"/>
+              </a:ext>
+            </a:extLst>
+          </p:cNvPr>
+          <p:cNvSpPr/>
+          <p:nvPr/>
+        </p:nvSpPr>
+        <p:spPr bwMode="auto">
+          <a:xfrm>
+            <a:off x="349807" y="1714216"/>
+            <a:ext cx="11232391" cy="2388551"/>
+          </a:xfrm>
+          <a:prstGeom prst="roundRect">
+            <a:avLst>
+              <a:gd name="adj" fmla="val 7119"/>
+            </a:avLst>
+          </a:prstGeom>
+          <a:solidFill>
+            <a:srgbClr val="FFFFFF"/>
+          </a:solidFill>
+          <a:ln w="9525" cap="flat" cmpd="sng" algn="ctr">
+            <a:noFill/>
+            <a:prstDash val="solid"/>
+            <a:headEnd type="none" w="med" len="med"/>
+            <a:tailEnd type="none" w="med" len="med"/>
+          </a:ln>
+          <a:effectLst>
+            <a:outerShdw blurRad="190500" dist="38100" dir="2700000" algn="tl" rotWithShape="0">
+              <a:schemeClr val="tx1">
+                <a:alpha val="20000"/>
+              </a:schemeClr>
+            </a:outerShdw>
+          </a:effectLst>
+        </p:spPr>
+        <p:txBody>
+          <a:bodyPr rot="0" spcFirstLastPara="0" vertOverflow="overflow" horzOverflow="overflow" vert="horz" wrap="square" lIns="72000" tIns="146304" rIns="182880" bIns="72000" numCol="1" spcCol="0" rtlCol="0" fromWordArt="0" anchor="b" anchorCtr="0" forceAA="0" compatLnSpc="1">
+            <a:prstTxWarp prst="textNoShape">
+              <a:avLst/>
+            </a:prstTxWarp>
+            <a:noAutofit/>
+          </a:bodyPr>
+          <a:lstStyle/>
+          <a:p>
+            <a:pPr marL="0" marR="0" lvl="0" indent="0" algn="ctr" defTabSz="932472" rtl="0" eaLnBrk="1" fontAlgn="base" latinLnBrk="0" hangingPunct="1">
+              <a:lnSpc>
+                <a:spcPct val="100000"/>
+              </a:lnSpc>
+              <a:spcBef>
+                <a:spcPct val="0"/>
+              </a:spcBef>
+              <a:spcAft>
+                <a:spcPct val="0"/>
+              </a:spcAft>
+              <a:buClrTx/>
+              <a:buSzTx/>
+              <a:buFontTx/>
+              <a:buNone/>
+              <a:tabLst/>
+              <a:defRPr/>
+            </a:pPr>
+            <a:endParaRPr kumimoji="0" lang="en-US" sz="1000" b="1" i="0" u="none" strike="noStrike" kern="0" cap="none" spc="0" normalizeH="0" baseline="0" noProof="0" dirty="0">
+              <a:ln>
+                <a:noFill/>
+              </a:ln>
+              <a:solidFill>
+                <a:prstClr val="black"/>
+              </a:solidFill>
+              <a:effectLst/>
+              <a:uLnTx/>
+              <a:uFillTx/>
+              <a:latin typeface="Segoe UI" panose="020B0502040204020203" pitchFamily="34" charset="0"/>
+              <a:ea typeface="+mn-ea"/>
+              <a:cs typeface="Segoe UI" panose="020B0502040204020203" pitchFamily="34" charset="0"/>
+            </a:endParaRPr>
+          </a:p>
+        </p:txBody>
+      </p:sp>
+      <p:cxnSp>
+        <p:nvCxnSpPr>
+          <p:cNvPr id="39" name="Straight Arrow Connector 38">
+            <a:extLst>
+              <a:ext uri="{FF2B5EF4-FFF2-40B4-BE49-F238E27FC236}">
+                <a16:creationId xmlns:a16="http://schemas.microsoft.com/office/drawing/2014/main" id="{C1A5509E-9CA2-2DE4-8FC6-6933CB22B088}"/>
+              </a:ext>
+              <a:ext uri="{C183D7F6-B498-43B3-948B-1728B52AA6E4}">
+                <adec:decorative xmlns:adec="http://schemas.microsoft.com/office/drawing/2017/decorative" val="1"/>
+              </a:ext>
+            </a:extLst>
+          </p:cNvPr>
+          <p:cNvCxnSpPr>
+            <a:cxnSpLocks/>
+          </p:cNvCxnSpPr>
+          <p:nvPr/>
+        </p:nvCxnSpPr>
+        <p:spPr>
+          <a:xfrm flipV="1">
+            <a:off x="1682587" y="2181416"/>
+            <a:ext cx="1018361" cy="2900"/>
+          </a:xfrm>
+          <a:prstGeom prst="straightConnector1">
+            <a:avLst/>
+          </a:prstGeom>
+          <a:ln w="9525">
+            <a:solidFill>
+              <a:schemeClr val="accent1"/>
+            </a:solidFill>
+            <a:tailEnd type="triangle"/>
+          </a:ln>
+        </p:spPr>
+        <p:style>
+          <a:lnRef idx="2">
+            <a:schemeClr val="accent1"/>
+          </a:lnRef>
+          <a:fillRef idx="0">
+            <a:schemeClr val="accent1"/>
+          </a:fillRef>
+          <a:effectRef idx="1">
+            <a:schemeClr val="accent1"/>
+          </a:effectRef>
+          <a:fontRef idx="minor">
+            <a:schemeClr val="tx1"/>
+          </a:fontRef>
+        </p:style>
+      </p:cxnSp>
+      <p:sp>
+        <p:nvSpPr>
+          <p:cNvPr id="40" name="!! Purple box">
+            <a:extLst>
+              <a:ext uri="{FF2B5EF4-FFF2-40B4-BE49-F238E27FC236}">
+                <a16:creationId xmlns:a16="http://schemas.microsoft.com/office/drawing/2014/main" id="{0C68B363-FA8B-D7D0-F5B0-CC7F10473FCC}"/>
+              </a:ext>
+            </a:extLst>
+          </p:cNvPr>
+          <p:cNvSpPr txBox="1"/>
+          <p:nvPr/>
+        </p:nvSpPr>
+        <p:spPr>
+          <a:xfrm>
+            <a:off x="524810" y="1939321"/>
+            <a:ext cx="1866099" cy="516820"/>
+          </a:xfrm>
+          <a:prstGeom prst="roundRect">
+            <a:avLst>
+              <a:gd name="adj" fmla="val 16667"/>
+            </a:avLst>
+          </a:prstGeom>
+          <a:solidFill>
+            <a:srgbClr val="8661C5"/>
+          </a:solidFill>
+          <a:ln w="15875">
+            <a:noFill/>
+            <a:headEnd type="none" w="med" len="med"/>
+            <a:tailEnd type="none" w="med" len="med"/>
+          </a:ln>
+          <a:effectLst>
+            <a:outerShdw blurRad="101600" dist="127000" dir="2700000" algn="tl" rotWithShape="0">
+              <a:prstClr val="black">
+                <a:alpha val="20000"/>
+              </a:prstClr>
+            </a:outerShdw>
+          </a:effectLst>
+        </p:spPr>
+        <p:style>
+          <a:lnRef idx="1">
+            <a:schemeClr val="accent2"/>
+          </a:lnRef>
+          <a:fillRef idx="3">
+            <a:schemeClr val="accent2"/>
+          </a:fillRef>
+          <a:effectRef idx="2">
+            <a:schemeClr val="accent2"/>
+          </a:effectRef>
+          <a:fontRef idx="minor">
+            <a:schemeClr val="lt1"/>
+          </a:fontRef>
+        </p:style>
+        <p:txBody>
+          <a:bodyPr rot="0" spcFirstLastPara="0" vertOverflow="overflow" horzOverflow="overflow" vert="horz" wrap="square" lIns="179285" tIns="72000" rIns="179285" bIns="72000" numCol="1" spcCol="0" rtlCol="0" fromWordArt="0" anchor="ctr" anchorCtr="0" forceAA="0" compatLnSpc="1">
+            <a:prstTxWarp prst="textNoShape">
+              <a:avLst/>
+            </a:prstTxWarp>
+            <a:noAutofit/>
+          </a:bodyPr>
+          <a:lstStyle>
+            <a:defPPr>
+              <a:defRPr lang="en-US"/>
+            </a:defPPr>
+            <a:lvl1pPr algn="ctr" defTabSz="914102" fontAlgn="base">
+              <a:spcBef>
+                <a:spcPct val="0"/>
+              </a:spcBef>
+              <a:spcAft>
+                <a:spcPct val="0"/>
+              </a:spcAft>
+              <a:defRPr sz="1961">
+                <a:gradFill>
+                  <a:gsLst>
+                    <a:gs pos="0">
+                      <a:srgbClr val="FFFFFF"/>
+                    </a:gs>
+                    <a:gs pos="100000">
+                      <a:srgbClr val="FFFFFF"/>
+                    </a:gs>
+                  </a:gsLst>
+                  <a:lin ang="5400000" scaled="0"/>
+                </a:gradFill>
+                <a:latin typeface="Segoe UI"/>
+                <a:cs typeface="Segoe UI" pitchFamily="34" charset="0"/>
+              </a:defRPr>
+            </a:lvl1pPr>
+            <a:lvl2pPr>
+              <a:defRPr>
+                <a:solidFill>
+                  <a:schemeClr val="lt1"/>
+                </a:solidFill>
+              </a:defRPr>
+            </a:lvl2pPr>
+            <a:lvl3pPr>
+              <a:defRPr>
+                <a:solidFill>
+                  <a:schemeClr val="lt1"/>
+                </a:solidFill>
+              </a:defRPr>
+            </a:lvl3pPr>
+            <a:lvl4pPr>
+              <a:defRPr>
+                <a:solidFill>
+                  <a:schemeClr val="lt1"/>
+                </a:solidFill>
+              </a:defRPr>
+            </a:lvl4pPr>
+            <a:lvl5pPr>
+              <a:defRPr>
+                <a:solidFill>
+                  <a:schemeClr val="lt1"/>
+                </a:solidFill>
+              </a:defRPr>
+            </a:lvl5pPr>
+            <a:lvl6pPr>
+              <a:defRPr>
+                <a:solidFill>
+                  <a:schemeClr val="lt1"/>
+                </a:solidFill>
+              </a:defRPr>
+            </a:lvl6pPr>
+            <a:lvl7pPr>
+              <a:defRPr>
+                <a:solidFill>
+                  <a:schemeClr val="lt1"/>
+                </a:solidFill>
+              </a:defRPr>
+            </a:lvl7pPr>
+            <a:lvl8pPr>
+              <a:defRPr>
+                <a:solidFill>
+                  <a:schemeClr val="lt1"/>
+                </a:solidFill>
+              </a:defRPr>
+            </a:lvl8pPr>
+            <a:lvl9pPr>
+              <a:defRPr>
+                <a:solidFill>
+                  <a:schemeClr val="lt1"/>
+                </a:solidFill>
+              </a:defRPr>
+            </a:lvl9pPr>
+          </a:lstStyle>
+          <a:p>
+            <a:pPr marL="0" marR="0" lvl="0" indent="0" algn="ctr" defTabSz="914102" rtl="0" eaLnBrk="1" fontAlgn="base" latinLnBrk="0" hangingPunct="1">
+              <a:lnSpc>
+                <a:spcPct val="100000"/>
+              </a:lnSpc>
+              <a:spcBef>
+                <a:spcPct val="0"/>
+              </a:spcBef>
+              <a:spcAft>
+                <a:spcPct val="0"/>
+              </a:spcAft>
+              <a:buClrTx/>
+              <a:buSzTx/>
+              <a:buFontTx/>
+              <a:buNone/>
+              <a:tabLst/>
+              <a:defRPr/>
+            </a:pPr>
+            <a:r>
+              <a:rPr lang="en-US" sz="1000" b="1" dirty="0">
+                <a:latin typeface="Segoe Sans Text Semibold"/>
+              </a:rPr>
+              <a:t>Decision Framing</a:t>
+            </a:r>
+            <a:endParaRPr kumimoji="0" lang="en-US" sz="1000" b="1" i="0" u="none" strike="noStrike" kern="1200" cap="none" spc="0" normalizeH="0" baseline="0" noProof="0" dirty="0">
+              <a:ln>
+                <a:noFill/>
+              </a:ln>
+              <a:gradFill>
+                <a:gsLst>
+                  <a:gs pos="0">
+                    <a:srgbClr val="FFFFFF"/>
+                  </a:gs>
+                  <a:gs pos="100000">
+                    <a:srgbClr val="FFFFFF"/>
+                  </a:gs>
+                </a:gsLst>
+                <a:lin ang="5400000" scaled="0"/>
+              </a:gradFill>
+              <a:effectLst/>
+              <a:uLnTx/>
+              <a:uFillTx/>
+              <a:latin typeface="Segoe Sans Text Semibold"/>
+            </a:endParaRPr>
+          </a:p>
+        </p:txBody>
+      </p:sp>
+      <p:sp>
+        <p:nvSpPr>
+          <p:cNvPr id="19" name="TextBox 18">
+            <a:extLst>
+              <a:ext uri="{FF2B5EF4-FFF2-40B4-BE49-F238E27FC236}">
+                <a16:creationId xmlns:a16="http://schemas.microsoft.com/office/drawing/2014/main" id="{0E467AF7-193E-73AE-C319-9042C295DCDB}"/>
+              </a:ext>
+            </a:extLst>
+          </p:cNvPr>
+          <p:cNvSpPr txBox="1"/>
+          <p:nvPr/>
+        </p:nvSpPr>
+        <p:spPr>
+          <a:xfrm>
+            <a:off x="599636" y="2610542"/>
+            <a:ext cx="1791273" cy="835037"/>
+          </a:xfrm>
+          <a:prstGeom prst="rect">
+            <a:avLst/>
+          </a:prstGeom>
+          <a:noFill/>
+        </p:spPr>
+        <p:txBody>
+          <a:bodyPr wrap="square" lIns="0" tIns="0" rIns="0" bIns="0" rtlCol="0">
+            <a:spAutoFit/>
+          </a:bodyPr>
+          <a:lstStyle/>
+          <a:p>
+            <a:pPr marL="0" marR="0" lvl="0" indent="0" defTabSz="914400" rtl="0" eaLnBrk="1" fontAlgn="auto" latinLnBrk="0" hangingPunct="1">
+              <a:lnSpc>
+                <a:spcPct val="110000"/>
+              </a:lnSpc>
+              <a:spcBef>
+                <a:spcPts val="0"/>
+              </a:spcBef>
+              <a:spcAft>
+                <a:spcPts val="200"/>
+              </a:spcAft>
+              <a:buClrTx/>
+              <a:buSzTx/>
+              <a:buFontTx/>
+              <a:buNone/>
+              <a:tabLst/>
+              <a:defRPr/>
+            </a:pPr>
+            <a:r>
+              <a:rPr lang="en-US" sz="1000" spc="300" dirty="0">
+                <a:solidFill>
+                  <a:schemeClr val="tx1">
+                    <a:lumMod val="65000"/>
+                    <a:lumOff val="35000"/>
+                  </a:schemeClr>
+                </a:solidFill>
+                <a:latin typeface="Segoe Sans Text Semibold"/>
+                <a:cs typeface="Segoe UI Semilight" panose="020B0402040204020203" pitchFamily="34" charset="0"/>
+              </a:rPr>
+              <a:t>Is there significance to my mom’s predictive dream, or a mere coincidence?</a:t>
+            </a:r>
+            <a:endParaRPr kumimoji="0" lang="en-US" sz="1000" b="0" i="0" u="none" strike="noStrike" kern="1200" cap="none" spc="300" normalizeH="0" baseline="0" noProof="0" dirty="0">
+              <a:ln>
+                <a:noFill/>
+              </a:ln>
+              <a:solidFill>
+                <a:schemeClr val="tx1">
+                  <a:lumMod val="65000"/>
+                  <a:lumOff val="35000"/>
+                </a:schemeClr>
+              </a:solidFill>
+              <a:effectLst/>
+              <a:uLnTx/>
+              <a:uFillTx/>
+              <a:latin typeface="Segoe Sans Text Semibold"/>
+              <a:cs typeface="Segoe UI Semilight" panose="020B0402040204020203" pitchFamily="34" charset="0"/>
+            </a:endParaRPr>
+          </a:p>
+        </p:txBody>
+      </p:sp>
+      <p:sp>
+        <p:nvSpPr>
+          <p:cNvPr id="10" name="!! Purple box">
+            <a:extLst>
+              <a:ext uri="{FF2B5EF4-FFF2-40B4-BE49-F238E27FC236}">
+                <a16:creationId xmlns:a16="http://schemas.microsoft.com/office/drawing/2014/main" id="{A5E18F19-A9CF-3D2D-30B9-B809D294E44F}"/>
+              </a:ext>
+            </a:extLst>
+          </p:cNvPr>
+          <p:cNvSpPr txBox="1"/>
+          <p:nvPr/>
+        </p:nvSpPr>
+        <p:spPr>
+          <a:xfrm>
+            <a:off x="9515090" y="1925906"/>
+            <a:ext cx="1866099" cy="516820"/>
+          </a:xfrm>
+          <a:prstGeom prst="roundRect">
+            <a:avLst>
+              <a:gd name="adj" fmla="val 16667"/>
+            </a:avLst>
+          </a:prstGeom>
+          <a:solidFill>
+            <a:srgbClr val="8661C5"/>
+          </a:solidFill>
+          <a:ln w="15875">
+            <a:noFill/>
+            <a:headEnd type="none" w="med" len="med"/>
+            <a:tailEnd type="none" w="med" len="med"/>
+          </a:ln>
+          <a:effectLst>
+            <a:outerShdw blurRad="101600" dist="127000" dir="2700000" algn="tl" rotWithShape="0">
+              <a:prstClr val="black">
+                <a:alpha val="20000"/>
+              </a:prstClr>
+            </a:outerShdw>
+          </a:effectLst>
+        </p:spPr>
+        <p:style>
+          <a:lnRef idx="1">
+            <a:schemeClr val="accent2"/>
+          </a:lnRef>
+          <a:fillRef idx="3">
+            <a:schemeClr val="accent2"/>
+          </a:fillRef>
+          <a:effectRef idx="2">
+            <a:schemeClr val="accent2"/>
+          </a:effectRef>
+          <a:fontRef idx="minor">
+            <a:schemeClr val="lt1"/>
+          </a:fontRef>
+        </p:style>
+        <p:txBody>
+          <a:bodyPr rot="0" spcFirstLastPara="0" vertOverflow="overflow" horzOverflow="overflow" vert="horz" wrap="square" lIns="179285" tIns="72000" rIns="179285" bIns="72000" numCol="1" spcCol="0" rtlCol="0" fromWordArt="0" anchor="ctr" anchorCtr="0" forceAA="0" compatLnSpc="1">
+            <a:prstTxWarp prst="textNoShape">
+              <a:avLst/>
+            </a:prstTxWarp>
+            <a:noAutofit/>
+          </a:bodyPr>
+          <a:lstStyle>
+            <a:defPPr>
+              <a:defRPr lang="en-US"/>
+            </a:defPPr>
+            <a:lvl1pPr algn="ctr" defTabSz="914102" fontAlgn="base">
+              <a:spcBef>
+                <a:spcPct val="0"/>
+              </a:spcBef>
+              <a:spcAft>
+                <a:spcPct val="0"/>
+              </a:spcAft>
+              <a:defRPr sz="1961">
+                <a:gradFill>
+                  <a:gsLst>
+                    <a:gs pos="0">
+                      <a:srgbClr val="FFFFFF"/>
+                    </a:gs>
+                    <a:gs pos="100000">
+                      <a:srgbClr val="FFFFFF"/>
+                    </a:gs>
+                  </a:gsLst>
+                  <a:lin ang="5400000" scaled="0"/>
+                </a:gradFill>
+                <a:latin typeface="Segoe UI"/>
+                <a:cs typeface="Segoe UI" pitchFamily="34" charset="0"/>
+              </a:defRPr>
+            </a:lvl1pPr>
+            <a:lvl2pPr>
+              <a:defRPr>
+                <a:solidFill>
+                  <a:schemeClr val="lt1"/>
+                </a:solidFill>
+              </a:defRPr>
+            </a:lvl2pPr>
+            <a:lvl3pPr>
+              <a:defRPr>
+                <a:solidFill>
+                  <a:schemeClr val="lt1"/>
+                </a:solidFill>
+              </a:defRPr>
+            </a:lvl3pPr>
+            <a:lvl4pPr>
+              <a:defRPr>
+                <a:solidFill>
+                  <a:schemeClr val="lt1"/>
+                </a:solidFill>
+              </a:defRPr>
+            </a:lvl4pPr>
+            <a:lvl5pPr>
+              <a:defRPr>
+                <a:solidFill>
+                  <a:schemeClr val="lt1"/>
+                </a:solidFill>
+              </a:defRPr>
+            </a:lvl5pPr>
+            <a:lvl6pPr>
+              <a:defRPr>
+                <a:solidFill>
+                  <a:schemeClr val="lt1"/>
+                </a:solidFill>
+              </a:defRPr>
+            </a:lvl6pPr>
+            <a:lvl7pPr>
+              <a:defRPr>
+                <a:solidFill>
+                  <a:schemeClr val="lt1"/>
+                </a:solidFill>
+              </a:defRPr>
+            </a:lvl7pPr>
+            <a:lvl8pPr>
+              <a:defRPr>
+                <a:solidFill>
+                  <a:schemeClr val="lt1"/>
+                </a:solidFill>
+              </a:defRPr>
+            </a:lvl8pPr>
+            <a:lvl9pPr>
+              <a:defRPr>
+                <a:solidFill>
+                  <a:schemeClr val="lt1"/>
+                </a:solidFill>
+              </a:defRPr>
+            </a:lvl9pPr>
+          </a:lstStyle>
+          <a:p>
+            <a:pPr marL="0" marR="0" lvl="0" indent="0" algn="ctr" defTabSz="914102" rtl="0" eaLnBrk="1" fontAlgn="base" latinLnBrk="0" hangingPunct="1">
+              <a:lnSpc>
+                <a:spcPct val="100000"/>
+              </a:lnSpc>
+              <a:spcBef>
+                <a:spcPct val="0"/>
+              </a:spcBef>
+              <a:spcAft>
+                <a:spcPct val="0"/>
+              </a:spcAft>
+              <a:buClrTx/>
+              <a:buSzTx/>
+              <a:buFontTx/>
+              <a:buNone/>
+              <a:tabLst/>
+              <a:defRPr/>
+            </a:pPr>
+            <a:r>
+              <a:rPr lang="en-US" sz="1000" b="1" noProof="0" dirty="0">
+                <a:latin typeface="Segoe Sans Text Semibold"/>
+              </a:rPr>
+              <a:t>Decision Monitoring</a:t>
+            </a:r>
+            <a:endParaRPr kumimoji="0" lang="en-US" sz="1000" b="1" i="0" u="none" strike="noStrike" kern="1200" cap="none" spc="0" normalizeH="0" baseline="0" noProof="0" dirty="0">
+              <a:ln>
+                <a:noFill/>
+              </a:ln>
+              <a:gradFill>
+                <a:gsLst>
+                  <a:gs pos="0">
+                    <a:srgbClr val="FFFFFF"/>
+                  </a:gs>
+                  <a:gs pos="100000">
+                    <a:srgbClr val="FFFFFF"/>
+                  </a:gs>
+                </a:gsLst>
+                <a:lin ang="5400000" scaled="0"/>
+              </a:gradFill>
+              <a:effectLst/>
+              <a:uLnTx/>
+              <a:uFillTx/>
+              <a:latin typeface="Segoe Sans Text Semibold"/>
+            </a:endParaRPr>
+          </a:p>
+        </p:txBody>
+      </p:sp>
+      <p:cxnSp>
+        <p:nvCxnSpPr>
+          <p:cNvPr id="11" name="Straight Arrow Connector 10">
+            <a:extLst>
+              <a:ext uri="{FF2B5EF4-FFF2-40B4-BE49-F238E27FC236}">
+                <a16:creationId xmlns:a16="http://schemas.microsoft.com/office/drawing/2014/main" id="{794D67E2-193B-4AE2-0FC1-9042AF75EAAF}"/>
+              </a:ext>
+              <a:ext uri="{C183D7F6-B498-43B3-948B-1728B52AA6E4}">
+                <adec:decorative xmlns:adec="http://schemas.microsoft.com/office/drawing/2017/decorative" val="1"/>
+              </a:ext>
+            </a:extLst>
+          </p:cNvPr>
+          <p:cNvCxnSpPr>
+            <a:cxnSpLocks/>
+          </p:cNvCxnSpPr>
+          <p:nvPr/>
+        </p:nvCxnSpPr>
+        <p:spPr>
+          <a:xfrm flipV="1">
+            <a:off x="3946461" y="2197731"/>
+            <a:ext cx="1018361" cy="2900"/>
+          </a:xfrm>
+          <a:prstGeom prst="straightConnector1">
+            <a:avLst/>
+          </a:prstGeom>
+          <a:ln w="9525">
+            <a:solidFill>
+              <a:schemeClr val="accent1"/>
+            </a:solidFill>
+            <a:tailEnd type="triangle"/>
+          </a:ln>
+        </p:spPr>
+        <p:style>
+          <a:lnRef idx="2">
+            <a:schemeClr val="accent1"/>
+          </a:lnRef>
+          <a:fillRef idx="0">
+            <a:schemeClr val="accent1"/>
+          </a:fillRef>
+          <a:effectRef idx="1">
+            <a:schemeClr val="accent1"/>
+          </a:effectRef>
+          <a:fontRef idx="minor">
+            <a:schemeClr val="tx1"/>
+          </a:fontRef>
+        </p:style>
+      </p:cxnSp>
+      <p:cxnSp>
+        <p:nvCxnSpPr>
+          <p:cNvPr id="12" name="Straight Arrow Connector 11">
+            <a:extLst>
+              <a:ext uri="{FF2B5EF4-FFF2-40B4-BE49-F238E27FC236}">
+                <a16:creationId xmlns:a16="http://schemas.microsoft.com/office/drawing/2014/main" id="{40987F77-890C-E3D4-74FF-B1E829AEE6D4}"/>
+              </a:ext>
+              <a:ext uri="{C183D7F6-B498-43B3-948B-1728B52AA6E4}">
+                <adec:decorative xmlns:adec="http://schemas.microsoft.com/office/drawing/2017/decorative" val="1"/>
+              </a:ext>
+            </a:extLst>
+          </p:cNvPr>
+          <p:cNvCxnSpPr>
+            <a:cxnSpLocks/>
+          </p:cNvCxnSpPr>
+          <p:nvPr/>
+        </p:nvCxnSpPr>
+        <p:spPr>
+          <a:xfrm flipV="1">
+            <a:off x="6187055" y="2197731"/>
+            <a:ext cx="1018361" cy="2900"/>
+          </a:xfrm>
+          <a:prstGeom prst="straightConnector1">
+            <a:avLst/>
+          </a:prstGeom>
+          <a:ln w="9525">
+            <a:solidFill>
+              <a:schemeClr val="accent1"/>
+            </a:solidFill>
+            <a:tailEnd type="triangle"/>
+          </a:ln>
+        </p:spPr>
+        <p:style>
+          <a:lnRef idx="2">
+            <a:schemeClr val="accent1"/>
+          </a:lnRef>
+          <a:fillRef idx="0">
+            <a:schemeClr val="accent1"/>
+          </a:fillRef>
+          <a:effectRef idx="1">
+            <a:schemeClr val="accent1"/>
+          </a:effectRef>
+          <a:fontRef idx="minor">
+            <a:schemeClr val="tx1"/>
+          </a:fontRef>
+        </p:style>
+      </p:cxnSp>
+      <p:cxnSp>
+        <p:nvCxnSpPr>
+          <p:cNvPr id="13" name="Straight Arrow Connector 12">
+            <a:extLst>
+              <a:ext uri="{FF2B5EF4-FFF2-40B4-BE49-F238E27FC236}">
+                <a16:creationId xmlns:a16="http://schemas.microsoft.com/office/drawing/2014/main" id="{73541D26-15D8-6ED4-32D3-7824B63953B6}"/>
+              </a:ext>
+              <a:ext uri="{C183D7F6-B498-43B3-948B-1728B52AA6E4}">
+                <adec:decorative xmlns:adec="http://schemas.microsoft.com/office/drawing/2017/decorative" val="1"/>
+              </a:ext>
+            </a:extLst>
+          </p:cNvPr>
+          <p:cNvCxnSpPr>
+            <a:cxnSpLocks/>
+          </p:cNvCxnSpPr>
+          <p:nvPr/>
+        </p:nvCxnSpPr>
+        <p:spPr>
+          <a:xfrm flipV="1">
+            <a:off x="8485417" y="2197731"/>
+            <a:ext cx="1018361" cy="2900"/>
+          </a:xfrm>
+          <a:prstGeom prst="straightConnector1">
+            <a:avLst/>
+          </a:prstGeom>
+          <a:ln w="9525">
+            <a:solidFill>
+              <a:schemeClr val="accent1"/>
+            </a:solidFill>
+            <a:tailEnd type="triangle"/>
+          </a:ln>
+        </p:spPr>
+        <p:style>
+          <a:lnRef idx="2">
+            <a:schemeClr val="accent1"/>
+          </a:lnRef>
+          <a:fillRef idx="0">
+            <a:schemeClr val="accent1"/>
+          </a:fillRef>
+          <a:effectRef idx="1">
+            <a:schemeClr val="accent1"/>
+          </a:effectRef>
+          <a:fontRef idx="minor">
+            <a:schemeClr val="tx1"/>
+          </a:fontRef>
+        </p:style>
+      </p:cxnSp>
+      <p:sp>
+        <p:nvSpPr>
+          <p:cNvPr id="7" name="!! Purple box">
+            <a:extLst>
+              <a:ext uri="{FF2B5EF4-FFF2-40B4-BE49-F238E27FC236}">
+                <a16:creationId xmlns:a16="http://schemas.microsoft.com/office/drawing/2014/main" id="{32F67CC6-C9E8-1FCD-2160-8CC48BE0BF43}"/>
+              </a:ext>
+            </a:extLst>
+          </p:cNvPr>
+          <p:cNvSpPr txBox="1"/>
+          <p:nvPr/>
+        </p:nvSpPr>
+        <p:spPr>
+          <a:xfrm>
+            <a:off x="7214233" y="1925906"/>
+            <a:ext cx="1866099" cy="516820"/>
+          </a:xfrm>
+          <a:prstGeom prst="roundRect">
+            <a:avLst>
+              <a:gd name="adj" fmla="val 16667"/>
+            </a:avLst>
+          </a:prstGeom>
+          <a:solidFill>
+            <a:srgbClr val="8661C5"/>
+          </a:solidFill>
+          <a:ln w="15875">
+            <a:noFill/>
+            <a:headEnd type="none" w="med" len="med"/>
+            <a:tailEnd type="none" w="med" len="med"/>
+          </a:ln>
+          <a:effectLst>
+            <a:outerShdw blurRad="101600" dist="127000" dir="2700000" algn="tl" rotWithShape="0">
+              <a:prstClr val="black">
+                <a:alpha val="20000"/>
+              </a:prstClr>
+            </a:outerShdw>
+          </a:effectLst>
+        </p:spPr>
+        <p:style>
+          <a:lnRef idx="1">
+            <a:schemeClr val="accent2"/>
+          </a:lnRef>
+          <a:fillRef idx="3">
+            <a:schemeClr val="accent2"/>
+          </a:fillRef>
+          <a:effectRef idx="2">
+            <a:schemeClr val="accent2"/>
+          </a:effectRef>
+          <a:fontRef idx="minor">
+            <a:schemeClr val="lt1"/>
+          </a:fontRef>
+        </p:style>
+        <p:txBody>
+          <a:bodyPr rot="0" spcFirstLastPara="0" vertOverflow="overflow" horzOverflow="overflow" vert="horz" wrap="square" lIns="179285" tIns="72000" rIns="179285" bIns="72000" numCol="1" spcCol="0" rtlCol="0" fromWordArt="0" anchor="ctr" anchorCtr="0" forceAA="0" compatLnSpc="1">
+            <a:prstTxWarp prst="textNoShape">
+              <a:avLst/>
+            </a:prstTxWarp>
+            <a:noAutofit/>
+          </a:bodyPr>
+          <a:lstStyle>
+            <a:defPPr>
+              <a:defRPr lang="en-US"/>
+            </a:defPPr>
+            <a:lvl1pPr algn="ctr" defTabSz="914102" fontAlgn="base">
+              <a:spcBef>
+                <a:spcPct val="0"/>
+              </a:spcBef>
+              <a:spcAft>
+                <a:spcPct val="0"/>
+              </a:spcAft>
+              <a:defRPr sz="1961">
+                <a:gradFill>
+                  <a:gsLst>
+                    <a:gs pos="0">
+                      <a:srgbClr val="FFFFFF"/>
+                    </a:gs>
+                    <a:gs pos="100000">
+                      <a:srgbClr val="FFFFFF"/>
+                    </a:gs>
+                  </a:gsLst>
+                  <a:lin ang="5400000" scaled="0"/>
+                </a:gradFill>
+                <a:latin typeface="Segoe UI"/>
+                <a:cs typeface="Segoe UI" pitchFamily="34" charset="0"/>
+              </a:defRPr>
+            </a:lvl1pPr>
+            <a:lvl2pPr>
+              <a:defRPr>
+                <a:solidFill>
+                  <a:schemeClr val="lt1"/>
+                </a:solidFill>
+              </a:defRPr>
+            </a:lvl2pPr>
+            <a:lvl3pPr>
+              <a:defRPr>
+                <a:solidFill>
+                  <a:schemeClr val="lt1"/>
+                </a:solidFill>
+              </a:defRPr>
+            </a:lvl3pPr>
+            <a:lvl4pPr>
+              <a:defRPr>
+                <a:solidFill>
+                  <a:schemeClr val="lt1"/>
+                </a:solidFill>
+              </a:defRPr>
+            </a:lvl4pPr>
+            <a:lvl5pPr>
+              <a:defRPr>
+                <a:solidFill>
+                  <a:schemeClr val="lt1"/>
+                </a:solidFill>
+              </a:defRPr>
+            </a:lvl5pPr>
+            <a:lvl6pPr>
+              <a:defRPr>
+                <a:solidFill>
+                  <a:schemeClr val="lt1"/>
+                </a:solidFill>
+              </a:defRPr>
+            </a:lvl6pPr>
+            <a:lvl7pPr>
+              <a:defRPr>
+                <a:solidFill>
+                  <a:schemeClr val="lt1"/>
+                </a:solidFill>
+              </a:defRPr>
+            </a:lvl7pPr>
+            <a:lvl8pPr>
+              <a:defRPr>
+                <a:solidFill>
+                  <a:schemeClr val="lt1"/>
+                </a:solidFill>
+              </a:defRPr>
+            </a:lvl8pPr>
+            <a:lvl9pPr>
+              <a:defRPr>
+                <a:solidFill>
+                  <a:schemeClr val="lt1"/>
+                </a:solidFill>
+              </a:defRPr>
+            </a:lvl9pPr>
+          </a:lstStyle>
+          <a:p>
+            <a:pPr marL="0" marR="0" lvl="0" indent="0" algn="ctr" defTabSz="914102" rtl="0" eaLnBrk="1" fontAlgn="base" latinLnBrk="0" hangingPunct="1">
+              <a:lnSpc>
+                <a:spcPct val="100000"/>
+              </a:lnSpc>
+              <a:spcBef>
+                <a:spcPct val="0"/>
+              </a:spcBef>
+              <a:spcAft>
+                <a:spcPct val="0"/>
+              </a:spcAft>
+              <a:buClrTx/>
+              <a:buSzTx/>
+              <a:buFontTx/>
+              <a:buNone/>
+              <a:tabLst/>
+              <a:defRPr/>
+            </a:pPr>
+            <a:r>
+              <a:rPr lang="en-US" sz="1000" b="1" noProof="0" dirty="0">
+                <a:latin typeface="Segoe Sans Text Semibold"/>
+              </a:rPr>
+              <a:t>Decision Communication</a:t>
+            </a:r>
+            <a:endParaRPr kumimoji="0" lang="en-US" sz="1000" b="1" i="0" u="none" strike="noStrike" kern="1200" cap="none" spc="0" normalizeH="0" baseline="0" noProof="0" dirty="0">
+              <a:ln>
+                <a:noFill/>
+              </a:ln>
+              <a:gradFill>
+                <a:gsLst>
+                  <a:gs pos="0">
+                    <a:srgbClr val="FFFFFF"/>
+                  </a:gs>
+                  <a:gs pos="100000">
+                    <a:srgbClr val="FFFFFF"/>
+                  </a:gs>
+                </a:gsLst>
+                <a:lin ang="5400000" scaled="0"/>
+              </a:gradFill>
+              <a:effectLst/>
+              <a:uLnTx/>
+              <a:uFillTx/>
+              <a:latin typeface="Segoe Sans Text Semibold"/>
+            </a:endParaRPr>
+          </a:p>
+        </p:txBody>
+      </p:sp>
+      <p:sp>
+        <p:nvSpPr>
+          <p:cNvPr id="6" name="!! Purple box">
+            <a:extLst>
+              <a:ext uri="{FF2B5EF4-FFF2-40B4-BE49-F238E27FC236}">
+                <a16:creationId xmlns:a16="http://schemas.microsoft.com/office/drawing/2014/main" id="{CA1999AF-C26B-5FDC-915C-0079AC4DFE38}"/>
+              </a:ext>
+            </a:extLst>
+          </p:cNvPr>
+          <p:cNvSpPr txBox="1"/>
+          <p:nvPr/>
+        </p:nvSpPr>
+        <p:spPr>
+          <a:xfrm>
+            <a:off x="4964822" y="1939321"/>
+            <a:ext cx="1866099" cy="516820"/>
+          </a:xfrm>
+          <a:prstGeom prst="roundRect">
+            <a:avLst>
+              <a:gd name="adj" fmla="val 16667"/>
+            </a:avLst>
+          </a:prstGeom>
+          <a:solidFill>
+            <a:srgbClr val="8661C5"/>
+          </a:solidFill>
+          <a:ln w="15875">
+            <a:noFill/>
+            <a:headEnd type="none" w="med" len="med"/>
+            <a:tailEnd type="none" w="med" len="med"/>
+          </a:ln>
+          <a:effectLst>
+            <a:outerShdw blurRad="101600" dist="127000" dir="2700000" algn="tl" rotWithShape="0">
+              <a:prstClr val="black">
+                <a:alpha val="20000"/>
+              </a:prstClr>
+            </a:outerShdw>
+          </a:effectLst>
+        </p:spPr>
+        <p:style>
+          <a:lnRef idx="1">
+            <a:schemeClr val="accent2"/>
+          </a:lnRef>
+          <a:fillRef idx="3">
+            <a:schemeClr val="accent2"/>
+          </a:fillRef>
+          <a:effectRef idx="2">
+            <a:schemeClr val="accent2"/>
+          </a:effectRef>
+          <a:fontRef idx="minor">
+            <a:schemeClr val="lt1"/>
+          </a:fontRef>
+        </p:style>
+        <p:txBody>
+          <a:bodyPr rot="0" spcFirstLastPara="0" vertOverflow="overflow" horzOverflow="overflow" vert="horz" wrap="square" lIns="179285" tIns="72000" rIns="179285" bIns="72000" numCol="1" spcCol="0" rtlCol="0" fromWordArt="0" anchor="ctr" anchorCtr="0" forceAA="0" compatLnSpc="1">
+            <a:prstTxWarp prst="textNoShape">
+              <a:avLst/>
+            </a:prstTxWarp>
+            <a:noAutofit/>
+          </a:bodyPr>
+          <a:lstStyle>
+            <a:defPPr>
+              <a:defRPr lang="en-US"/>
+            </a:defPPr>
+            <a:lvl1pPr algn="ctr" defTabSz="914102" fontAlgn="base">
+              <a:spcBef>
+                <a:spcPct val="0"/>
+              </a:spcBef>
+              <a:spcAft>
+                <a:spcPct val="0"/>
+              </a:spcAft>
+              <a:defRPr sz="1961">
+                <a:gradFill>
+                  <a:gsLst>
+                    <a:gs pos="0">
+                      <a:srgbClr val="FFFFFF"/>
+                    </a:gs>
+                    <a:gs pos="100000">
+                      <a:srgbClr val="FFFFFF"/>
+                    </a:gs>
+                  </a:gsLst>
+                  <a:lin ang="5400000" scaled="0"/>
+                </a:gradFill>
+                <a:latin typeface="Segoe UI"/>
+                <a:cs typeface="Segoe UI" pitchFamily="34" charset="0"/>
+              </a:defRPr>
+            </a:lvl1pPr>
+            <a:lvl2pPr>
+              <a:defRPr>
+                <a:solidFill>
+                  <a:schemeClr val="lt1"/>
+                </a:solidFill>
+              </a:defRPr>
+            </a:lvl2pPr>
+            <a:lvl3pPr>
+              <a:defRPr>
+                <a:solidFill>
+                  <a:schemeClr val="lt1"/>
+                </a:solidFill>
+              </a:defRPr>
+            </a:lvl3pPr>
+            <a:lvl4pPr>
+              <a:defRPr>
+                <a:solidFill>
+                  <a:schemeClr val="lt1"/>
+                </a:solidFill>
+              </a:defRPr>
+            </a:lvl4pPr>
+            <a:lvl5pPr>
+              <a:defRPr>
+                <a:solidFill>
+                  <a:schemeClr val="lt1"/>
+                </a:solidFill>
+              </a:defRPr>
+            </a:lvl5pPr>
+            <a:lvl6pPr>
+              <a:defRPr>
+                <a:solidFill>
+                  <a:schemeClr val="lt1"/>
+                </a:solidFill>
+              </a:defRPr>
+            </a:lvl6pPr>
+            <a:lvl7pPr>
+              <a:defRPr>
+                <a:solidFill>
+                  <a:schemeClr val="lt1"/>
+                </a:solidFill>
+              </a:defRPr>
+            </a:lvl7pPr>
+            <a:lvl8pPr>
+              <a:defRPr>
+                <a:solidFill>
+                  <a:schemeClr val="lt1"/>
+                </a:solidFill>
+              </a:defRPr>
+            </a:lvl8pPr>
+            <a:lvl9pPr>
+              <a:defRPr>
+                <a:solidFill>
+                  <a:schemeClr val="lt1"/>
+                </a:solidFill>
+              </a:defRPr>
+            </a:lvl9pPr>
+          </a:lstStyle>
+          <a:p>
+            <a:pPr marL="0" marR="0" lvl="0" indent="0" algn="ctr" defTabSz="914102" rtl="0" eaLnBrk="1" fontAlgn="base" latinLnBrk="0" hangingPunct="1">
+              <a:lnSpc>
+                <a:spcPct val="100000"/>
+              </a:lnSpc>
+              <a:spcBef>
+                <a:spcPct val="0"/>
+              </a:spcBef>
+              <a:spcAft>
+                <a:spcPct val="0"/>
+              </a:spcAft>
+              <a:buClrTx/>
+              <a:buSzTx/>
+              <a:buFontTx/>
+              <a:buNone/>
+              <a:tabLst/>
+              <a:defRPr/>
+            </a:pPr>
+            <a:r>
+              <a:rPr lang="en-US" sz="1000" b="1" noProof="0" dirty="0">
+                <a:latin typeface="Segoe Sans Text Semibold"/>
+              </a:rPr>
+              <a:t>Decision Execution</a:t>
+            </a:r>
+            <a:endParaRPr kumimoji="0" lang="en-US" sz="1000" b="1" i="0" u="none" strike="noStrike" kern="1200" cap="none" spc="0" normalizeH="0" baseline="0" noProof="0" dirty="0">
+              <a:ln>
+                <a:noFill/>
+              </a:ln>
+              <a:gradFill>
+                <a:gsLst>
+                  <a:gs pos="0">
+                    <a:srgbClr val="FFFFFF"/>
+                  </a:gs>
+                  <a:gs pos="100000">
+                    <a:srgbClr val="FFFFFF"/>
+                  </a:gs>
+                </a:gsLst>
+                <a:lin ang="5400000" scaled="0"/>
+              </a:gradFill>
+              <a:effectLst/>
+              <a:uLnTx/>
+              <a:uFillTx/>
+              <a:latin typeface="Segoe Sans Text Semibold"/>
+            </a:endParaRPr>
+          </a:p>
+        </p:txBody>
+      </p:sp>
+      <p:sp>
+        <p:nvSpPr>
+          <p:cNvPr id="3" name="!! Purple box">
+            <a:extLst>
+              <a:ext uri="{FF2B5EF4-FFF2-40B4-BE49-F238E27FC236}">
+                <a16:creationId xmlns:a16="http://schemas.microsoft.com/office/drawing/2014/main" id="{98520B7B-44E7-4E66-EAB0-3604FAD0CBDD}"/>
+              </a:ext>
+            </a:extLst>
+          </p:cNvPr>
+          <p:cNvSpPr txBox="1"/>
+          <p:nvPr/>
+        </p:nvSpPr>
+        <p:spPr>
+          <a:xfrm>
+            <a:off x="2700948" y="1943886"/>
+            <a:ext cx="1866099" cy="516820"/>
+          </a:xfrm>
+          <a:prstGeom prst="roundRect">
+            <a:avLst>
+              <a:gd name="adj" fmla="val 16667"/>
+            </a:avLst>
+          </a:prstGeom>
+          <a:solidFill>
+            <a:srgbClr val="8661C5"/>
+          </a:solidFill>
+          <a:ln w="15875">
+            <a:noFill/>
+            <a:headEnd type="none" w="med" len="med"/>
+            <a:tailEnd type="none" w="med" len="med"/>
+          </a:ln>
+          <a:effectLst>
+            <a:outerShdw blurRad="101600" dist="127000" dir="2700000" algn="tl" rotWithShape="0">
+              <a:prstClr val="black">
+                <a:alpha val="20000"/>
+              </a:prstClr>
+            </a:outerShdw>
+          </a:effectLst>
+        </p:spPr>
+        <p:style>
+          <a:lnRef idx="1">
+            <a:schemeClr val="accent2"/>
+          </a:lnRef>
+          <a:fillRef idx="3">
+            <a:schemeClr val="accent2"/>
+          </a:fillRef>
+          <a:effectRef idx="2">
+            <a:schemeClr val="accent2"/>
+          </a:effectRef>
+          <a:fontRef idx="minor">
+            <a:schemeClr val="lt1"/>
+          </a:fontRef>
+        </p:style>
+        <p:txBody>
+          <a:bodyPr rot="0" spcFirstLastPara="0" vertOverflow="overflow" horzOverflow="overflow" vert="horz" wrap="square" lIns="179285" tIns="72000" rIns="179285" bIns="72000" numCol="1" spcCol="0" rtlCol="0" fromWordArt="0" anchor="ctr" anchorCtr="0" forceAA="0" compatLnSpc="1">
+            <a:prstTxWarp prst="textNoShape">
+              <a:avLst/>
+            </a:prstTxWarp>
+            <a:noAutofit/>
+          </a:bodyPr>
+          <a:lstStyle>
+            <a:defPPr>
+              <a:defRPr lang="en-US"/>
+            </a:defPPr>
+            <a:lvl1pPr algn="ctr" defTabSz="914102" fontAlgn="base">
+              <a:spcBef>
+                <a:spcPct val="0"/>
+              </a:spcBef>
+              <a:spcAft>
+                <a:spcPct val="0"/>
+              </a:spcAft>
+              <a:defRPr sz="1961">
+                <a:gradFill>
+                  <a:gsLst>
+                    <a:gs pos="0">
+                      <a:srgbClr val="FFFFFF"/>
+                    </a:gs>
+                    <a:gs pos="100000">
+                      <a:srgbClr val="FFFFFF"/>
+                    </a:gs>
+                  </a:gsLst>
+                  <a:lin ang="5400000" scaled="0"/>
+                </a:gradFill>
+                <a:latin typeface="Segoe UI"/>
+                <a:cs typeface="Segoe UI" pitchFamily="34" charset="0"/>
+              </a:defRPr>
+            </a:lvl1pPr>
+            <a:lvl2pPr>
+              <a:defRPr>
+                <a:solidFill>
+                  <a:schemeClr val="lt1"/>
+                </a:solidFill>
+              </a:defRPr>
+            </a:lvl2pPr>
+            <a:lvl3pPr>
+              <a:defRPr>
+                <a:solidFill>
+                  <a:schemeClr val="lt1"/>
+                </a:solidFill>
+              </a:defRPr>
+            </a:lvl3pPr>
+            <a:lvl4pPr>
+              <a:defRPr>
+                <a:solidFill>
+                  <a:schemeClr val="lt1"/>
+                </a:solidFill>
+              </a:defRPr>
+            </a:lvl4pPr>
+            <a:lvl5pPr>
+              <a:defRPr>
+                <a:solidFill>
+                  <a:schemeClr val="lt1"/>
+                </a:solidFill>
+              </a:defRPr>
+            </a:lvl5pPr>
+            <a:lvl6pPr>
+              <a:defRPr>
+                <a:solidFill>
+                  <a:schemeClr val="lt1"/>
+                </a:solidFill>
+              </a:defRPr>
+            </a:lvl6pPr>
+            <a:lvl7pPr>
+              <a:defRPr>
+                <a:solidFill>
+                  <a:schemeClr val="lt1"/>
+                </a:solidFill>
+              </a:defRPr>
+            </a:lvl7pPr>
+            <a:lvl8pPr>
+              <a:defRPr>
+                <a:solidFill>
+                  <a:schemeClr val="lt1"/>
+                </a:solidFill>
+              </a:defRPr>
+            </a:lvl8pPr>
+            <a:lvl9pPr>
+              <a:defRPr>
+                <a:solidFill>
+                  <a:schemeClr val="lt1"/>
+                </a:solidFill>
+              </a:defRPr>
+            </a:lvl9pPr>
+          </a:lstStyle>
+          <a:p>
+            <a:pPr marL="0" marR="0" lvl="0" indent="0" algn="ctr" defTabSz="914102" rtl="0" eaLnBrk="1" fontAlgn="base" latinLnBrk="0" hangingPunct="1">
+              <a:lnSpc>
+                <a:spcPct val="100000"/>
+              </a:lnSpc>
+              <a:spcBef>
+                <a:spcPct val="0"/>
+              </a:spcBef>
+              <a:spcAft>
+                <a:spcPct val="0"/>
+              </a:spcAft>
+              <a:buClrTx/>
+              <a:buSzTx/>
+              <a:buFontTx/>
+              <a:buNone/>
+              <a:tabLst/>
+              <a:defRPr/>
+            </a:pPr>
+            <a:r>
+              <a:rPr lang="en-US" sz="1000" b="1" noProof="0" dirty="0">
+                <a:latin typeface="Segoe Sans Text Semibold"/>
+              </a:rPr>
+              <a:t>Gather Intelligence</a:t>
+            </a:r>
+            <a:endParaRPr kumimoji="0" lang="en-US" sz="1000" b="1" i="0" u="none" strike="noStrike" kern="1200" cap="none" spc="0" normalizeH="0" baseline="0" noProof="0" dirty="0">
+              <a:ln>
+                <a:noFill/>
+              </a:ln>
+              <a:gradFill>
+                <a:gsLst>
+                  <a:gs pos="0">
+                    <a:srgbClr val="FFFFFF"/>
+                  </a:gs>
+                  <a:gs pos="100000">
+                    <a:srgbClr val="FFFFFF"/>
+                  </a:gs>
+                </a:gsLst>
+                <a:lin ang="5400000" scaled="0"/>
+              </a:gradFill>
+              <a:effectLst/>
+              <a:uLnTx/>
+              <a:uFillTx/>
+              <a:latin typeface="Segoe Sans Text Semibold"/>
+            </a:endParaRPr>
+          </a:p>
+        </p:txBody>
+      </p:sp>
+      <p:sp>
+        <p:nvSpPr>
+          <p:cNvPr id="14" name="TextBox 13">
+            <a:extLst>
+              <a:ext uri="{FF2B5EF4-FFF2-40B4-BE49-F238E27FC236}">
+                <a16:creationId xmlns:a16="http://schemas.microsoft.com/office/drawing/2014/main" id="{AD03AE39-803F-D741-20A8-9FAF3C28C746}"/>
+              </a:ext>
+            </a:extLst>
+          </p:cNvPr>
+          <p:cNvSpPr txBox="1"/>
+          <p:nvPr/>
+        </p:nvSpPr>
+        <p:spPr>
+          <a:xfrm>
+            <a:off x="2701084" y="2640081"/>
+            <a:ext cx="1865963" cy="1342868"/>
+          </a:xfrm>
+          <a:prstGeom prst="rect">
+            <a:avLst/>
+          </a:prstGeom>
+          <a:noFill/>
+        </p:spPr>
+        <p:txBody>
+          <a:bodyPr wrap="square" lIns="0" tIns="0" rIns="0" bIns="0" rtlCol="0">
+            <a:spAutoFit/>
+          </a:bodyPr>
+          <a:lstStyle/>
+          <a:p>
+            <a:pPr marL="0" marR="0" lvl="0" indent="0" defTabSz="914400" rtl="0" eaLnBrk="1" fontAlgn="auto" latinLnBrk="0" hangingPunct="1">
+              <a:lnSpc>
+                <a:spcPct val="110000"/>
+              </a:lnSpc>
+              <a:spcBef>
+                <a:spcPts val="0"/>
+              </a:spcBef>
+              <a:spcAft>
+                <a:spcPts val="200"/>
+              </a:spcAft>
+              <a:buClrTx/>
+              <a:buSzTx/>
+              <a:buFontTx/>
+              <a:buNone/>
+              <a:tabLst/>
+              <a:defRPr/>
+            </a:pPr>
+            <a:r>
+              <a:rPr lang="en-US" sz="1000" spc="300" dirty="0">
+                <a:solidFill>
+                  <a:schemeClr val="tx1">
+                    <a:lumMod val="65000"/>
+                    <a:lumOff val="35000"/>
+                  </a:schemeClr>
+                </a:solidFill>
+                <a:latin typeface="Segoe Sans Text Semibold"/>
+                <a:cs typeface="Segoe UI Semilight" panose="020B0402040204020203" pitchFamily="34" charset="0"/>
+              </a:rPr>
+              <a:t>Research various statistics: genealogy, fertility, USA households, probability of various events impacting birth</a:t>
+            </a:r>
+            <a:endParaRPr kumimoji="0" lang="en-US" sz="1000" b="0" i="0" u="none" strike="noStrike" kern="1200" cap="none" spc="300" normalizeH="0" baseline="0" noProof="0" dirty="0">
+              <a:ln>
+                <a:noFill/>
+              </a:ln>
+              <a:solidFill>
+                <a:schemeClr val="tx1">
+                  <a:lumMod val="65000"/>
+                  <a:lumOff val="35000"/>
+                </a:schemeClr>
+              </a:solidFill>
+              <a:effectLst/>
+              <a:uLnTx/>
+              <a:uFillTx/>
+              <a:latin typeface="Segoe Sans Text Semibold"/>
+              <a:cs typeface="Segoe UI Semilight" panose="020B0402040204020203" pitchFamily="34" charset="0"/>
+            </a:endParaRPr>
+          </a:p>
+        </p:txBody>
+      </p:sp>
+      <p:sp>
+        <p:nvSpPr>
+          <p:cNvPr id="22" name="TextBox 21">
+            <a:extLst>
+              <a:ext uri="{FF2B5EF4-FFF2-40B4-BE49-F238E27FC236}">
+                <a16:creationId xmlns:a16="http://schemas.microsoft.com/office/drawing/2014/main" id="{E3B63AE6-802F-8C08-47C8-7A972D97BBE1}"/>
+              </a:ext>
+            </a:extLst>
+          </p:cNvPr>
+          <p:cNvSpPr txBox="1"/>
+          <p:nvPr/>
+        </p:nvSpPr>
+        <p:spPr>
+          <a:xfrm>
+            <a:off x="4964958" y="2636319"/>
+            <a:ext cx="1865963" cy="1173591"/>
+          </a:xfrm>
+          <a:prstGeom prst="rect">
+            <a:avLst/>
+          </a:prstGeom>
+          <a:noFill/>
+        </p:spPr>
+        <p:txBody>
+          <a:bodyPr wrap="square" lIns="0" tIns="0" rIns="0" bIns="0" rtlCol="0">
+            <a:spAutoFit/>
+          </a:bodyPr>
+          <a:lstStyle/>
+          <a:p>
+            <a:pPr marL="0" marR="0" lvl="0" indent="0" defTabSz="914400" rtl="0" eaLnBrk="1" fontAlgn="auto" latinLnBrk="0" hangingPunct="1">
+              <a:lnSpc>
+                <a:spcPct val="110000"/>
+              </a:lnSpc>
+              <a:spcBef>
+                <a:spcPts val="0"/>
+              </a:spcBef>
+              <a:spcAft>
+                <a:spcPts val="200"/>
+              </a:spcAft>
+              <a:buClrTx/>
+              <a:buSzTx/>
+              <a:buFontTx/>
+              <a:buNone/>
+              <a:tabLst/>
+              <a:defRPr/>
+            </a:pPr>
+            <a:r>
+              <a:rPr lang="en-US" sz="1000" spc="300" noProof="0" dirty="0">
+                <a:solidFill>
+                  <a:schemeClr val="tx1">
+                    <a:lumMod val="65000"/>
+                    <a:lumOff val="35000"/>
+                  </a:schemeClr>
+                </a:solidFill>
+                <a:latin typeface="Segoe Sans Text Semibold"/>
+                <a:cs typeface="Segoe UI Semilight" panose="020B0402040204020203" pitchFamily="34" charset="0"/>
+              </a:rPr>
+              <a:t>Create and calculate an independent math equation to arrive at a statistical probability of my mom’s prediction </a:t>
+            </a:r>
+            <a:endParaRPr kumimoji="0" lang="en-US" sz="1000" b="0" i="0" u="none" strike="noStrike" kern="1200" cap="none" spc="300" normalizeH="0" baseline="0" noProof="0" dirty="0">
+              <a:ln>
+                <a:noFill/>
+              </a:ln>
+              <a:solidFill>
+                <a:schemeClr val="tx1">
+                  <a:lumMod val="65000"/>
+                  <a:lumOff val="35000"/>
+                </a:schemeClr>
+              </a:solidFill>
+              <a:effectLst/>
+              <a:uLnTx/>
+              <a:uFillTx/>
+              <a:latin typeface="Segoe Sans Text Semibold"/>
+              <a:cs typeface="Segoe UI Semilight" panose="020B0402040204020203" pitchFamily="34" charset="0"/>
+            </a:endParaRPr>
+          </a:p>
+        </p:txBody>
+      </p:sp>
+      <p:sp>
+        <p:nvSpPr>
+          <p:cNvPr id="23" name="TextBox 22">
+            <a:extLst>
+              <a:ext uri="{FF2B5EF4-FFF2-40B4-BE49-F238E27FC236}">
+                <a16:creationId xmlns:a16="http://schemas.microsoft.com/office/drawing/2014/main" id="{46640866-B0AF-5C1C-888E-788092ADBFFD}"/>
+              </a:ext>
+            </a:extLst>
+          </p:cNvPr>
+          <p:cNvSpPr txBox="1"/>
+          <p:nvPr/>
+        </p:nvSpPr>
+        <p:spPr>
+          <a:xfrm>
+            <a:off x="7205416" y="2608061"/>
+            <a:ext cx="1865963" cy="1342868"/>
+          </a:xfrm>
+          <a:prstGeom prst="rect">
+            <a:avLst/>
+          </a:prstGeom>
+          <a:noFill/>
+        </p:spPr>
+        <p:txBody>
+          <a:bodyPr wrap="square" lIns="0" tIns="0" rIns="0" bIns="0" rtlCol="0">
+            <a:spAutoFit/>
+          </a:bodyPr>
+          <a:lstStyle/>
+          <a:p>
+            <a:pPr marL="0" marR="0" lvl="0" indent="0" defTabSz="914400" rtl="0" eaLnBrk="1" fontAlgn="auto" latinLnBrk="0" hangingPunct="1">
+              <a:lnSpc>
+                <a:spcPct val="110000"/>
+              </a:lnSpc>
+              <a:spcBef>
+                <a:spcPts val="0"/>
+              </a:spcBef>
+              <a:spcAft>
+                <a:spcPts val="200"/>
+              </a:spcAft>
+              <a:buClrTx/>
+              <a:buSzTx/>
+              <a:buFontTx/>
+              <a:buNone/>
+              <a:tabLst/>
+              <a:defRPr/>
+            </a:pPr>
+            <a:r>
+              <a:rPr lang="en-US" sz="1000" spc="300" noProof="0" dirty="0">
+                <a:solidFill>
+                  <a:schemeClr val="tx1">
+                    <a:lumMod val="65000"/>
+                    <a:lumOff val="35000"/>
+                  </a:schemeClr>
+                </a:solidFill>
+                <a:latin typeface="Segoe Sans Text Semibold"/>
+                <a:cs typeface="Segoe UI Semilight" panose="020B0402040204020203" pitchFamily="34" charset="0"/>
+              </a:rPr>
+              <a:t>Articulate the approach, calculations, devil’s advocate explanations </a:t>
+            </a:r>
+            <a:r>
+              <a:rPr lang="en-US" sz="1000" spc="300" dirty="0">
+                <a:solidFill>
+                  <a:schemeClr val="tx1">
+                    <a:lumMod val="65000"/>
+                    <a:lumOff val="35000"/>
+                  </a:schemeClr>
+                </a:solidFill>
+                <a:latin typeface="Segoe Sans Text Semibold"/>
+                <a:cs typeface="Segoe UI Semilight" panose="020B0402040204020203" pitchFamily="34" charset="0"/>
+              </a:rPr>
+              <a:t>with data visualizations in a transparent article and blog</a:t>
+            </a:r>
+            <a:endParaRPr kumimoji="0" lang="en-US" sz="1000" b="0" i="0" u="none" strike="noStrike" kern="1200" cap="none" spc="300" normalizeH="0" baseline="0" noProof="0" dirty="0">
+              <a:ln>
+                <a:noFill/>
+              </a:ln>
+              <a:solidFill>
+                <a:schemeClr val="tx1">
+                  <a:lumMod val="65000"/>
+                  <a:lumOff val="35000"/>
+                </a:schemeClr>
+              </a:solidFill>
+              <a:effectLst/>
+              <a:uLnTx/>
+              <a:uFillTx/>
+              <a:latin typeface="Segoe Sans Text Semibold"/>
+              <a:cs typeface="Segoe UI Semilight" panose="020B0402040204020203" pitchFamily="34" charset="0"/>
+            </a:endParaRPr>
+          </a:p>
+        </p:txBody>
+      </p:sp>
+      <p:sp>
+        <p:nvSpPr>
+          <p:cNvPr id="27" name="TextBox 26">
+            <a:extLst>
+              <a:ext uri="{FF2B5EF4-FFF2-40B4-BE49-F238E27FC236}">
+                <a16:creationId xmlns:a16="http://schemas.microsoft.com/office/drawing/2014/main" id="{8829CC03-EF67-2D8A-BF98-3069ED8BCAAA}"/>
+              </a:ext>
+            </a:extLst>
+          </p:cNvPr>
+          <p:cNvSpPr txBox="1"/>
+          <p:nvPr/>
+        </p:nvSpPr>
+        <p:spPr>
+          <a:xfrm>
+            <a:off x="9503778" y="2640081"/>
+            <a:ext cx="1865963" cy="835037"/>
+          </a:xfrm>
+          <a:prstGeom prst="rect">
+            <a:avLst/>
+          </a:prstGeom>
+          <a:noFill/>
+        </p:spPr>
+        <p:txBody>
+          <a:bodyPr wrap="square" lIns="0" tIns="0" rIns="0" bIns="0" rtlCol="0">
+            <a:spAutoFit/>
+          </a:bodyPr>
+          <a:lstStyle/>
+          <a:p>
+            <a:pPr marL="0" marR="0" lvl="0" indent="0" defTabSz="914400" rtl="0" eaLnBrk="1" fontAlgn="auto" latinLnBrk="0" hangingPunct="1">
+              <a:lnSpc>
+                <a:spcPct val="110000"/>
+              </a:lnSpc>
+              <a:spcBef>
+                <a:spcPts val="0"/>
+              </a:spcBef>
+              <a:spcAft>
+                <a:spcPts val="200"/>
+              </a:spcAft>
+              <a:buClrTx/>
+              <a:buSzTx/>
+              <a:buFontTx/>
+              <a:buNone/>
+              <a:tabLst/>
+              <a:defRPr/>
+            </a:pPr>
+            <a:r>
+              <a:rPr lang="en-US" sz="1000" spc="300" dirty="0">
+                <a:solidFill>
+                  <a:schemeClr val="tx1">
+                    <a:lumMod val="65000"/>
+                    <a:lumOff val="35000"/>
+                  </a:schemeClr>
+                </a:solidFill>
+                <a:latin typeface="Segoe Sans Text Semibold"/>
+                <a:cs typeface="Segoe UI Semilight" panose="020B0402040204020203" pitchFamily="34" charset="0"/>
+              </a:rPr>
+              <a:t>Present the information and source feedback from engaged audience</a:t>
+            </a:r>
+            <a:endParaRPr kumimoji="0" lang="en-US" sz="1000" b="0" i="0" u="none" strike="noStrike" kern="1200" cap="none" spc="300" normalizeH="0" baseline="0" noProof="0" dirty="0">
+              <a:ln>
+                <a:noFill/>
+              </a:ln>
+              <a:solidFill>
+                <a:schemeClr val="tx1">
+                  <a:lumMod val="65000"/>
+                  <a:lumOff val="35000"/>
+                </a:schemeClr>
+              </a:solidFill>
+              <a:effectLst/>
+              <a:uLnTx/>
+              <a:uFillTx/>
+              <a:latin typeface="Segoe Sans Text Semibold"/>
+              <a:cs typeface="Segoe UI Semilight" panose="020B0402040204020203" pitchFamily="34" charset="0"/>
+            </a:endParaRPr>
+          </a:p>
+        </p:txBody>
+      </p:sp>
+      <p:sp>
+        <p:nvSpPr>
+          <p:cNvPr id="45" name="Title 1">
+            <a:extLst>
+              <a:ext uri="{FF2B5EF4-FFF2-40B4-BE49-F238E27FC236}">
+                <a16:creationId xmlns:a16="http://schemas.microsoft.com/office/drawing/2014/main" id="{32839614-AC59-93FA-783B-8B912385EC30}"/>
+              </a:ext>
+            </a:extLst>
+          </p:cNvPr>
+          <p:cNvSpPr txBox="1">
+            <a:spLocks/>
+          </p:cNvSpPr>
+          <p:nvPr/>
+        </p:nvSpPr>
+        <p:spPr>
+          <a:xfrm>
+            <a:off x="349807" y="1114236"/>
+            <a:ext cx="11017250" cy="615553"/>
+          </a:xfrm>
+          <a:prstGeom prst="rect">
+            <a:avLst/>
+          </a:prstGeom>
+        </p:spPr>
+        <p:txBody>
+          <a:bodyPr vert="horz" lIns="91440" tIns="45720" rIns="91440" bIns="45720" rtlCol="0" anchor="ctr">
+            <a:normAutofit lnSpcReduction="10000"/>
+          </a:bodyPr>
+          <a:lstStyle>
+            <a:lvl1pPr algn="l" defTabSz="914400" rtl="0" eaLnBrk="1" latinLnBrk="0" hangingPunct="1">
+              <a:lnSpc>
+                <a:spcPct val="90000"/>
+              </a:lnSpc>
+              <a:spcBef>
+                <a:spcPct val="0"/>
+              </a:spcBef>
+              <a:buNone/>
+              <a:defRPr sz="4400" kern="1200">
+                <a:solidFill>
+                  <a:schemeClr val="tx1"/>
+                </a:solidFill>
+                <a:latin typeface="+mj-lt"/>
+                <a:ea typeface="+mj-ea"/>
+                <a:cs typeface="+mj-cs"/>
+              </a:defRPr>
+            </a:lvl1pPr>
+          </a:lstStyle>
+          <a:p>
+            <a:r>
+              <a:rPr lang="en-US" sz="4000" dirty="0">
+                <a:solidFill>
+                  <a:schemeClr val="tx2">
+                    <a:lumMod val="50000"/>
+                    <a:lumOff val="50000"/>
+                  </a:schemeClr>
+                </a:solidFill>
+              </a:rPr>
+              <a:t>Applied Decision Intelligence</a:t>
+            </a:r>
+          </a:p>
+        </p:txBody>
+      </p:sp>
+    </p:spTree>
+    <p:extLst>
+      <p:ext uri="{BB962C8B-B14F-4D97-AF65-F5344CB8AC3E}">
+        <p14:creationId xmlns:p14="http://schemas.microsoft.com/office/powerpoint/2010/main" val="1693353766"/>
+      </p:ext>
+    </p:extLst>
+  </p:cSld>
+  <p:clrMapOvr>
+    <a:masterClrMapping/>
+  </p:clrMapOvr>
+  <mc:AlternateContent xmlns:mc="http://schemas.openxmlformats.org/markup-compatibility/2006" xmlns:p14="http://schemas.microsoft.com/office/powerpoint/2010/main">
+    <mc:Choice Requires="p14">
+      <p:transition spd="med" p14:dur="700">
+        <p:fade/>
+      </p:transition>
+    </mc:Choice>
+    <mc:Fallback xmlns="">
+      <p:transition spd="med">
+        <p:fade/>
+      </p:transition>
+    </mc:Fallback>
+  </mc:AlternateContent>
+  <p:timing>
+    <p:tnLst>
+      <p:par>
+        <p:cTn id="1" dur="indefinite" restart="never" nodeType="tmRoot">
+          <p:childTnLst>
+            <p:seq concurrent="1" nextAc="seek">
+              <p:cTn id="2" dur="indefinite" nodeType="mainSeq">
+                <p:childTnLst>
+                  <p:par>
+                    <p:cTn id="3" fill="hold">
+                      <p:stCondLst>
+                        <p:cond delay="indefinite"/>
+                        <p:cond evt="onBegin" delay="0">
+                          <p:tn val="2"/>
+                        </p:cond>
+                      </p:stCondLst>
+                      <p:childTnLst>
+                        <p:par>
+                          <p:cTn id="4" fill="hold">
+                            <p:stCondLst>
+                              <p:cond delay="0"/>
+                            </p:stCondLst>
+                            <p:childTnLst>
+                              <p:par>
+                                <p:cTn id="5" presetID="22" presetClass="entr" presetSubtype="8" fill="hold" nodeType="withEffect">
+                                  <p:stCondLst>
+                                    <p:cond delay="0"/>
+                                  </p:stCondLst>
+                                  <p:childTnLst>
+                                    <p:set>
+                                      <p:cBhvr>
+                                        <p:cTn id="6" dur="1" fill="hold">
+                                          <p:stCondLst>
+                                            <p:cond delay="0"/>
+                                          </p:stCondLst>
+                                        </p:cTn>
+                                        <p:tgtEl>
+                                          <p:spTgt spid="39"/>
+                                        </p:tgtEl>
+                                        <p:attrNameLst>
+                                          <p:attrName>style.visibility</p:attrName>
+                                        </p:attrNameLst>
+                                      </p:cBhvr>
+                                      <p:to>
+                                        <p:strVal val="visible"/>
+                                      </p:to>
+                                    </p:set>
+                                    <p:animEffect transition="in" filter="wipe(left)">
+                                      <p:cBhvr>
+                                        <p:cTn id="7" dur="500"/>
+                                        <p:tgtEl>
+                                          <p:spTgt spid="39"/>
+                                        </p:tgtEl>
+                                      </p:cBhvr>
+                                    </p:animEffect>
+                                  </p:childTnLst>
+                                </p:cTn>
+                              </p:par>
+                              <p:par>
+                                <p:cTn id="8" presetID="22" presetClass="entr" presetSubtype="8" fill="hold" grpId="0" nodeType="withEffect">
+                                  <p:stCondLst>
+                                    <p:cond delay="0"/>
+                                  </p:stCondLst>
+                                  <p:childTnLst>
+                                    <p:set>
+                                      <p:cBhvr>
+                                        <p:cTn id="9" dur="1" fill="hold">
+                                          <p:stCondLst>
+                                            <p:cond delay="0"/>
+                                          </p:stCondLst>
+                                        </p:cTn>
+                                        <p:tgtEl>
+                                          <p:spTgt spid="40"/>
+                                        </p:tgtEl>
+                                        <p:attrNameLst>
+                                          <p:attrName>style.visibility</p:attrName>
+                                        </p:attrNameLst>
+                                      </p:cBhvr>
+                                      <p:to>
+                                        <p:strVal val="visible"/>
+                                      </p:to>
+                                    </p:set>
+                                    <p:animEffect transition="in" filter="wipe(left)">
+                                      <p:cBhvr>
+                                        <p:cTn id="10" dur="500"/>
+                                        <p:tgtEl>
+                                          <p:spTgt spid="40"/>
+                                        </p:tgtEl>
+                                      </p:cBhvr>
+                                    </p:animEffect>
+                                  </p:childTnLst>
+                                </p:cTn>
+                              </p:par>
+                              <p:par>
+                                <p:cTn id="11" presetID="22" presetClass="entr" presetSubtype="8" fill="hold" grpId="0" nodeType="withEffect">
+                                  <p:stCondLst>
+                                    <p:cond delay="0"/>
+                                  </p:stCondLst>
+                                  <p:childTnLst>
+                                    <p:set>
+                                      <p:cBhvr>
+                                        <p:cTn id="12" dur="1" fill="hold">
+                                          <p:stCondLst>
+                                            <p:cond delay="0"/>
+                                          </p:stCondLst>
+                                        </p:cTn>
+                                        <p:tgtEl>
+                                          <p:spTgt spid="19"/>
+                                        </p:tgtEl>
+                                        <p:attrNameLst>
+                                          <p:attrName>style.visibility</p:attrName>
+                                        </p:attrNameLst>
+                                      </p:cBhvr>
+                                      <p:to>
+                                        <p:strVal val="visible"/>
+                                      </p:to>
+                                    </p:set>
+                                    <p:animEffect transition="in" filter="wipe(left)">
+                                      <p:cBhvr>
+                                        <p:cTn id="13" dur="500"/>
+                                        <p:tgtEl>
+                                          <p:spTgt spid="19"/>
+                                        </p:tgtEl>
+                                      </p:cBhvr>
+                                    </p:animEffect>
+                                  </p:childTnLst>
+                                </p:cTn>
+                              </p:par>
+                              <p:par>
+                                <p:cTn id="14" presetID="22" presetClass="entr" presetSubtype="8" fill="hold" grpId="0" nodeType="withEffect">
+                                  <p:stCondLst>
+                                    <p:cond delay="0"/>
+                                  </p:stCondLst>
+                                  <p:childTnLst>
+                                    <p:set>
+                                      <p:cBhvr>
+                                        <p:cTn id="15" dur="1" fill="hold">
+                                          <p:stCondLst>
+                                            <p:cond delay="0"/>
+                                          </p:stCondLst>
+                                        </p:cTn>
+                                        <p:tgtEl>
+                                          <p:spTgt spid="3"/>
+                                        </p:tgtEl>
+                                        <p:attrNameLst>
+                                          <p:attrName>style.visibility</p:attrName>
+                                        </p:attrNameLst>
+                                      </p:cBhvr>
+                                      <p:to>
+                                        <p:strVal val="visible"/>
+                                      </p:to>
+                                    </p:set>
+                                    <p:animEffect transition="in" filter="wipe(left)">
+                                      <p:cBhvr>
+                                        <p:cTn id="16" dur="500"/>
+                                        <p:tgtEl>
+                                          <p:spTgt spid="3"/>
+                                        </p:tgtEl>
+                                      </p:cBhvr>
+                                    </p:animEffect>
+                                  </p:childTnLst>
+                                </p:cTn>
+                              </p:par>
+                              <p:par>
+                                <p:cTn id="17" presetID="22" presetClass="entr" presetSubtype="8" fill="hold" grpId="0" nodeType="withEffect">
+                                  <p:stCondLst>
+                                    <p:cond delay="0"/>
+                                  </p:stCondLst>
+                                  <p:childTnLst>
+                                    <p:set>
+                                      <p:cBhvr>
+                                        <p:cTn id="18" dur="1" fill="hold">
+                                          <p:stCondLst>
+                                            <p:cond delay="0"/>
+                                          </p:stCondLst>
+                                        </p:cTn>
+                                        <p:tgtEl>
+                                          <p:spTgt spid="6"/>
+                                        </p:tgtEl>
+                                        <p:attrNameLst>
+                                          <p:attrName>style.visibility</p:attrName>
+                                        </p:attrNameLst>
+                                      </p:cBhvr>
+                                      <p:to>
+                                        <p:strVal val="visible"/>
+                                      </p:to>
+                                    </p:set>
+                                    <p:animEffect transition="in" filter="wipe(left)">
+                                      <p:cBhvr>
+                                        <p:cTn id="19" dur="500"/>
+                                        <p:tgtEl>
+                                          <p:spTgt spid="6"/>
+                                        </p:tgtEl>
+                                      </p:cBhvr>
+                                    </p:animEffect>
+                                  </p:childTnLst>
+                                </p:cTn>
+                              </p:par>
+                              <p:par>
+                                <p:cTn id="20" presetID="22" presetClass="entr" presetSubtype="8" fill="hold" grpId="0" nodeType="withEffect">
+                                  <p:stCondLst>
+                                    <p:cond delay="0"/>
+                                  </p:stCondLst>
+                                  <p:childTnLst>
+                                    <p:set>
+                                      <p:cBhvr>
+                                        <p:cTn id="21" dur="1" fill="hold">
+                                          <p:stCondLst>
+                                            <p:cond delay="0"/>
+                                          </p:stCondLst>
+                                        </p:cTn>
+                                        <p:tgtEl>
+                                          <p:spTgt spid="7"/>
+                                        </p:tgtEl>
+                                        <p:attrNameLst>
+                                          <p:attrName>style.visibility</p:attrName>
+                                        </p:attrNameLst>
+                                      </p:cBhvr>
+                                      <p:to>
+                                        <p:strVal val="visible"/>
+                                      </p:to>
+                                    </p:set>
+                                    <p:animEffect transition="in" filter="wipe(left)">
+                                      <p:cBhvr>
+                                        <p:cTn id="22" dur="500"/>
+                                        <p:tgtEl>
+                                          <p:spTgt spid="7"/>
+                                        </p:tgtEl>
+                                      </p:cBhvr>
+                                    </p:animEffect>
+                                  </p:childTnLst>
+                                </p:cTn>
+                              </p:par>
+                              <p:par>
+                                <p:cTn id="23" presetID="22" presetClass="entr" presetSubtype="8" fill="hold" grpId="0" nodeType="withEffect">
+                                  <p:stCondLst>
+                                    <p:cond delay="0"/>
+                                  </p:stCondLst>
+                                  <p:childTnLst>
+                                    <p:set>
+                                      <p:cBhvr>
+                                        <p:cTn id="24" dur="1" fill="hold">
+                                          <p:stCondLst>
+                                            <p:cond delay="0"/>
+                                          </p:stCondLst>
+                                        </p:cTn>
+                                        <p:tgtEl>
+                                          <p:spTgt spid="10"/>
+                                        </p:tgtEl>
+                                        <p:attrNameLst>
+                                          <p:attrName>style.visibility</p:attrName>
+                                        </p:attrNameLst>
+                                      </p:cBhvr>
+                                      <p:to>
+                                        <p:strVal val="visible"/>
+                                      </p:to>
+                                    </p:set>
+                                    <p:animEffect transition="in" filter="wipe(left)">
+                                      <p:cBhvr>
+                                        <p:cTn id="25" dur="500"/>
+                                        <p:tgtEl>
+                                          <p:spTgt spid="10"/>
+                                        </p:tgtEl>
+                                      </p:cBhvr>
+                                    </p:animEffect>
+                                  </p:childTnLst>
+                                </p:cTn>
+                              </p:par>
+                              <p:par>
+                                <p:cTn id="26" presetID="22" presetClass="entr" presetSubtype="8" fill="hold" nodeType="withEffect">
+                                  <p:stCondLst>
+                                    <p:cond delay="0"/>
+                                  </p:stCondLst>
+                                  <p:childTnLst>
+                                    <p:set>
+                                      <p:cBhvr>
+                                        <p:cTn id="27" dur="1" fill="hold">
+                                          <p:stCondLst>
+                                            <p:cond delay="0"/>
+                                          </p:stCondLst>
+                                        </p:cTn>
+                                        <p:tgtEl>
+                                          <p:spTgt spid="11"/>
+                                        </p:tgtEl>
+                                        <p:attrNameLst>
+                                          <p:attrName>style.visibility</p:attrName>
+                                        </p:attrNameLst>
+                                      </p:cBhvr>
+                                      <p:to>
+                                        <p:strVal val="visible"/>
+                                      </p:to>
+                                    </p:set>
+                                    <p:animEffect transition="in" filter="wipe(left)">
+                                      <p:cBhvr>
+                                        <p:cTn id="28" dur="500"/>
+                                        <p:tgtEl>
+                                          <p:spTgt spid="11"/>
+                                        </p:tgtEl>
+                                      </p:cBhvr>
+                                    </p:animEffect>
+                                  </p:childTnLst>
+                                </p:cTn>
+                              </p:par>
+                              <p:par>
+                                <p:cTn id="29" presetID="22" presetClass="entr" presetSubtype="8" fill="hold" nodeType="withEffect">
+                                  <p:stCondLst>
+                                    <p:cond delay="0"/>
+                                  </p:stCondLst>
+                                  <p:childTnLst>
+                                    <p:set>
+                                      <p:cBhvr>
+                                        <p:cTn id="30" dur="1" fill="hold">
+                                          <p:stCondLst>
+                                            <p:cond delay="0"/>
+                                          </p:stCondLst>
+                                        </p:cTn>
+                                        <p:tgtEl>
+                                          <p:spTgt spid="12"/>
+                                        </p:tgtEl>
+                                        <p:attrNameLst>
+                                          <p:attrName>style.visibility</p:attrName>
+                                        </p:attrNameLst>
+                                      </p:cBhvr>
+                                      <p:to>
+                                        <p:strVal val="visible"/>
+                                      </p:to>
+                                    </p:set>
+                                    <p:animEffect transition="in" filter="wipe(left)">
+                                      <p:cBhvr>
+                                        <p:cTn id="31" dur="500"/>
+                                        <p:tgtEl>
+                                          <p:spTgt spid="12"/>
+                                        </p:tgtEl>
+                                      </p:cBhvr>
+                                    </p:animEffect>
+                                  </p:childTnLst>
+                                </p:cTn>
+                              </p:par>
+                              <p:par>
+                                <p:cTn id="32" presetID="22" presetClass="entr" presetSubtype="8" fill="hold" nodeType="withEffect">
+                                  <p:stCondLst>
+                                    <p:cond delay="0"/>
+                                  </p:stCondLst>
+                                  <p:childTnLst>
+                                    <p:set>
+                                      <p:cBhvr>
+                                        <p:cTn id="33" dur="1" fill="hold">
+                                          <p:stCondLst>
+                                            <p:cond delay="0"/>
+                                          </p:stCondLst>
+                                        </p:cTn>
+                                        <p:tgtEl>
+                                          <p:spTgt spid="13"/>
+                                        </p:tgtEl>
+                                        <p:attrNameLst>
+                                          <p:attrName>style.visibility</p:attrName>
+                                        </p:attrNameLst>
+                                      </p:cBhvr>
+                                      <p:to>
+                                        <p:strVal val="visible"/>
+                                      </p:to>
+                                    </p:set>
+                                    <p:animEffect transition="in" filter="wipe(left)">
+                                      <p:cBhvr>
+                                        <p:cTn id="34" dur="500"/>
+                                        <p:tgtEl>
+                                          <p:spTgt spid="13"/>
+                                        </p:tgtEl>
+                                      </p:cBhvr>
+                                    </p:animEffect>
+                                  </p:childTnLst>
+                                </p:cTn>
+                              </p:par>
+                              <p:par>
+                                <p:cTn id="35" presetID="22" presetClass="entr" presetSubtype="8" fill="hold" grpId="0" nodeType="withEffect">
+                                  <p:stCondLst>
+                                    <p:cond delay="0"/>
+                                  </p:stCondLst>
+                                  <p:childTnLst>
+                                    <p:set>
+                                      <p:cBhvr>
+                                        <p:cTn id="36" dur="1" fill="hold">
+                                          <p:stCondLst>
+                                            <p:cond delay="0"/>
+                                          </p:stCondLst>
+                                        </p:cTn>
+                                        <p:tgtEl>
+                                          <p:spTgt spid="14"/>
+                                        </p:tgtEl>
+                                        <p:attrNameLst>
+                                          <p:attrName>style.visibility</p:attrName>
+                                        </p:attrNameLst>
+                                      </p:cBhvr>
+                                      <p:to>
+                                        <p:strVal val="visible"/>
+                                      </p:to>
+                                    </p:set>
+                                    <p:animEffect transition="in" filter="wipe(left)">
+                                      <p:cBhvr>
+                                        <p:cTn id="37" dur="500"/>
+                                        <p:tgtEl>
+                                          <p:spTgt spid="14"/>
+                                        </p:tgtEl>
+                                      </p:cBhvr>
+                                    </p:animEffect>
+                                  </p:childTnLst>
+                                </p:cTn>
+                              </p:par>
+                              <p:par>
+                                <p:cTn id="38" presetID="22" presetClass="entr" presetSubtype="8" fill="hold" grpId="0" nodeType="withEffect">
+                                  <p:stCondLst>
+                                    <p:cond delay="0"/>
+                                  </p:stCondLst>
+                                  <p:childTnLst>
+                                    <p:set>
+                                      <p:cBhvr>
+                                        <p:cTn id="39" dur="1" fill="hold">
+                                          <p:stCondLst>
+                                            <p:cond delay="0"/>
+                                          </p:stCondLst>
+                                        </p:cTn>
+                                        <p:tgtEl>
+                                          <p:spTgt spid="22"/>
+                                        </p:tgtEl>
+                                        <p:attrNameLst>
+                                          <p:attrName>style.visibility</p:attrName>
+                                        </p:attrNameLst>
+                                      </p:cBhvr>
+                                      <p:to>
+                                        <p:strVal val="visible"/>
+                                      </p:to>
+                                    </p:set>
+                                    <p:animEffect transition="in" filter="wipe(left)">
+                                      <p:cBhvr>
+                                        <p:cTn id="40" dur="500"/>
+                                        <p:tgtEl>
+                                          <p:spTgt spid="22"/>
+                                        </p:tgtEl>
+                                      </p:cBhvr>
+                                    </p:animEffect>
+                                  </p:childTnLst>
+                                </p:cTn>
+                              </p:par>
+                              <p:par>
+                                <p:cTn id="41" presetID="22" presetClass="entr" presetSubtype="8" fill="hold" grpId="0" nodeType="withEffect">
+                                  <p:stCondLst>
+                                    <p:cond delay="0"/>
+                                  </p:stCondLst>
+                                  <p:childTnLst>
+                                    <p:set>
+                                      <p:cBhvr>
+                                        <p:cTn id="42" dur="1" fill="hold">
+                                          <p:stCondLst>
+                                            <p:cond delay="0"/>
+                                          </p:stCondLst>
+                                        </p:cTn>
+                                        <p:tgtEl>
+                                          <p:spTgt spid="23"/>
+                                        </p:tgtEl>
+                                        <p:attrNameLst>
+                                          <p:attrName>style.visibility</p:attrName>
+                                        </p:attrNameLst>
+                                      </p:cBhvr>
+                                      <p:to>
+                                        <p:strVal val="visible"/>
+                                      </p:to>
+                                    </p:set>
+                                    <p:animEffect transition="in" filter="wipe(left)">
+                                      <p:cBhvr>
+                                        <p:cTn id="43" dur="500"/>
+                                        <p:tgtEl>
+                                          <p:spTgt spid="23"/>
+                                        </p:tgtEl>
+                                      </p:cBhvr>
+                                    </p:animEffect>
+                                  </p:childTnLst>
+                                </p:cTn>
+                              </p:par>
+                              <p:par>
+                                <p:cTn id="44" presetID="22" presetClass="entr" presetSubtype="8" fill="hold" grpId="0" nodeType="withEffect">
+                                  <p:stCondLst>
+                                    <p:cond delay="0"/>
+                                  </p:stCondLst>
+                                  <p:childTnLst>
+                                    <p:set>
+                                      <p:cBhvr>
+                                        <p:cTn id="45" dur="1" fill="hold">
+                                          <p:stCondLst>
+                                            <p:cond delay="0"/>
+                                          </p:stCondLst>
+                                        </p:cTn>
+                                        <p:tgtEl>
+                                          <p:spTgt spid="27"/>
+                                        </p:tgtEl>
+                                        <p:attrNameLst>
+                                          <p:attrName>style.visibility</p:attrName>
+                                        </p:attrNameLst>
+                                      </p:cBhvr>
+                                      <p:to>
+                                        <p:strVal val="visible"/>
+                                      </p:to>
+                                    </p:set>
+                                    <p:animEffect transition="in" filter="wipe(left)">
+                                      <p:cBhvr>
+                                        <p:cTn id="46" dur="500"/>
+                                        <p:tgtEl>
+                                          <p:spTgt spid="27"/>
+                                        </p:tgtEl>
+                                      </p:cBhvr>
+                                    </p:animEffect>
+                                  </p:childTnLst>
+                                </p:cTn>
+                              </p:par>
+                            </p:childTnLst>
+                          </p:cTn>
+                        </p:par>
+                      </p:childTnLst>
+                    </p:cTn>
+                  </p:par>
+                </p:childTnLst>
+              </p:cTn>
+              <p:prevCondLst>
+                <p:cond evt="onPrev" delay="0">
+                  <p:tgtEl>
+                    <p:sldTgt/>
+                  </p:tgtEl>
+                </p:cond>
+              </p:prevCondLst>
+              <p:nextCondLst>
+                <p:cond evt="onNext" delay="0">
+                  <p:tgtEl>
+                    <p:sldTgt/>
+                  </p:tgtEl>
+                </p:cond>
+              </p:nextCondLst>
+            </p:seq>
+          </p:childTnLst>
+        </p:cTn>
+      </p:par>
+    </p:tnLst>
+    <p:bldLst>
+      <p:bldP spid="40" grpId="0" animBg="1"/>
+      <p:bldP spid="19" grpId="0"/>
+      <p:bldP spid="10" grpId="0" animBg="1"/>
+      <p:bldP spid="7" grpId="0" animBg="1"/>
+      <p:bldP spid="6" grpId="0" animBg="1"/>
+      <p:bldP spid="3" grpId="0" animBg="1"/>
+      <p:bldP spid="14" grpId="0"/>
+      <p:bldP spid="22" grpId="0"/>
+      <p:bldP spid="23" grpId="0"/>
+      <p:bldP spid="27" grpId="0"/>
     </p:bldLst>
   </p:timing>
 </p:sld>

</xml_diff>

<commit_message>
Added AI Brain Pillars
</commit_message>
<xml_diff>
--- a/Images/DecisionIntelligence.pptx
+++ b/Images/DecisionIntelligence.pptx
@@ -5,7 +5,7 @@
     <p:sldMasterId id="2147483648" r:id="rId1"/>
   </p:sldMasterIdLst>
   <p:notesMasterIdLst>
-    <p:notesMasterId r:id="rId9"/>
+    <p:notesMasterId r:id="rId10"/>
   </p:notesMasterIdLst>
   <p:sldIdLst>
     <p:sldId id="265" r:id="rId2"/>
@@ -15,6 +15,7 @@
     <p:sldId id="268" r:id="rId6"/>
     <p:sldId id="269" r:id="rId7"/>
     <p:sldId id="270" r:id="rId8"/>
+    <p:sldId id="271" r:id="rId9"/>
   </p:sldIdLst>
   <p:sldSz cx="12192000" cy="6858000"/>
   <p:notesSz cx="6858000" cy="9144000"/>
@@ -131,6 +132,11 @@
             <p14:sldId id="270"/>
           </p14:sldIdLst>
         </p14:section>
+        <p14:section name="AI Brain" id="{223EA97B-8E87-0740-A32A-A7BAA331CB84}">
+          <p14:sldIdLst>
+            <p14:sldId id="271"/>
+          </p14:sldIdLst>
+        </p14:section>
       </p14:sectionLst>
     </p:ext>
     <p:ext uri="{EFAFB233-063F-42B5-8137-9DF3F51BA10A}">
@@ -222,7 +228,7 @@
           <a:p>
             <a:fld id="{2CEE8FBA-7790-BE4B-A711-6375D57AA7C0}" type="datetimeFigureOut">
               <a:rPr lang="en-US" smtClean="0"/>
-              <a:t>12/2/24</a:t>
+              <a:t>12/30/24</a:t>
             </a:fld>
             <a:endParaRPr lang="en-US" dirty="0"/>
           </a:p>
@@ -757,7 +763,7 @@
                 <a:tabLst/>
                 <a:defRPr/>
               </a:pPr>
-              <a:t>12/2/24 8:32 AM</a:t>
+              <a:t>12/30/24 1:32 PM</a:t>
             </a:fld>
             <a:endParaRPr kumimoji="0" lang="en-US" sz="1200" b="0" i="0" u="none" strike="noStrike" kern="1200" cap="none" spc="0" normalizeH="0" baseline="0" noProof="0" dirty="0">
               <a:ln>
@@ -1146,7 +1152,7 @@
                 <a:tabLst/>
                 <a:defRPr/>
               </a:pPr>
-              <a:t>12/2/24 8:32 AM</a:t>
+              <a:t>12/30/24 1:32 PM</a:t>
             </a:fld>
             <a:endParaRPr kumimoji="0" lang="en-US" sz="1200" b="0" i="0" u="none" strike="noStrike" kern="1200" cap="none" spc="0" normalizeH="0" baseline="0" noProof="0" dirty="0">
               <a:ln>
@@ -1535,7 +1541,7 @@
                 <a:tabLst/>
                 <a:defRPr/>
               </a:pPr>
-              <a:t>12/2/24 8:32 AM</a:t>
+              <a:t>12/30/24 1:32 PM</a:t>
             </a:fld>
             <a:endParaRPr kumimoji="0" lang="en-US" sz="1200" b="0" i="0" u="none" strike="noStrike" kern="1200" cap="none" spc="0" normalizeH="0" baseline="0" noProof="0" dirty="0">
               <a:ln>
@@ -1924,7 +1930,7 @@
                 <a:tabLst/>
                 <a:defRPr/>
               </a:pPr>
-              <a:t>12/2/24 8:32 AM</a:t>
+              <a:t>12/30/24 1:32 PM</a:t>
             </a:fld>
             <a:endParaRPr kumimoji="0" lang="en-US" sz="1200" b="0" i="0" u="none" strike="noStrike" kern="1200" cap="none" spc="0" normalizeH="0" baseline="0" noProof="0" dirty="0">
               <a:ln>
@@ -2313,7 +2319,7 @@
                 <a:tabLst/>
                 <a:defRPr/>
               </a:pPr>
-              <a:t>12/2/24 8:32 AM</a:t>
+              <a:t>12/30/24 1:32 PM</a:t>
             </a:fld>
             <a:endParaRPr kumimoji="0" lang="en-US" sz="1200" b="0" i="0" u="none" strike="noStrike" kern="1200" cap="none" spc="0" normalizeH="0" baseline="0" noProof="0" dirty="0">
               <a:ln>
@@ -2702,7 +2708,7 @@
                 <a:tabLst/>
                 <a:defRPr/>
               </a:pPr>
-              <a:t>12/2/24 8:32 AM</a:t>
+              <a:t>12/30/24 1:32 PM</a:t>
             </a:fld>
             <a:endParaRPr kumimoji="0" lang="en-US" sz="1200" b="0" i="0" u="none" strike="noStrike" kern="1200" cap="none" spc="0" normalizeH="0" baseline="0" noProof="0" dirty="0">
               <a:ln>
@@ -3091,7 +3097,7 @@
                 <a:tabLst/>
                 <a:defRPr/>
               </a:pPr>
-              <a:t>12/2/24 8:33 AM</a:t>
+              <a:t>12/30/24 1:32 PM</a:t>
             </a:fld>
             <a:endParaRPr kumimoji="0" lang="en-US" sz="1200" b="0" i="0" u="none" strike="noStrike" kern="1200" cap="none" spc="0" normalizeH="0" baseline="0" noProof="0" dirty="0">
               <a:ln>
@@ -3359,7 +3365,7 @@
           <a:p>
             <a:fld id="{CC3759E9-439F-164C-816F-E7C3A6980DCB}" type="datetimeFigureOut">
               <a:rPr lang="en-US" smtClean="0"/>
-              <a:t>12/2/24</a:t>
+              <a:t>12/30/24</a:t>
             </a:fld>
             <a:endParaRPr lang="en-US" dirty="0"/>
           </a:p>
@@ -3557,7 +3563,7 @@
           <a:p>
             <a:fld id="{CC3759E9-439F-164C-816F-E7C3A6980DCB}" type="datetimeFigureOut">
               <a:rPr lang="en-US" smtClean="0"/>
-              <a:t>12/2/24</a:t>
+              <a:t>12/30/24</a:t>
             </a:fld>
             <a:endParaRPr lang="en-US" dirty="0"/>
           </a:p>
@@ -3765,7 +3771,7 @@
           <a:p>
             <a:fld id="{CC3759E9-439F-164C-816F-E7C3A6980DCB}" type="datetimeFigureOut">
               <a:rPr lang="en-US" smtClean="0"/>
-              <a:t>12/2/24</a:t>
+              <a:t>12/30/24</a:t>
             </a:fld>
             <a:endParaRPr lang="en-US" dirty="0"/>
           </a:p>
@@ -3963,7 +3969,7 @@
           <a:p>
             <a:fld id="{CC3759E9-439F-164C-816F-E7C3A6980DCB}" type="datetimeFigureOut">
               <a:rPr lang="en-US" smtClean="0"/>
-              <a:t>12/2/24</a:t>
+              <a:t>12/30/24</a:t>
             </a:fld>
             <a:endParaRPr lang="en-US" dirty="0"/>
           </a:p>
@@ -4238,7 +4244,7 @@
           <a:p>
             <a:fld id="{CC3759E9-439F-164C-816F-E7C3A6980DCB}" type="datetimeFigureOut">
               <a:rPr lang="en-US" smtClean="0"/>
-              <a:t>12/2/24</a:t>
+              <a:t>12/30/24</a:t>
             </a:fld>
             <a:endParaRPr lang="en-US" dirty="0"/>
           </a:p>
@@ -4503,7 +4509,7 @@
           <a:p>
             <a:fld id="{CC3759E9-439F-164C-816F-E7C3A6980DCB}" type="datetimeFigureOut">
               <a:rPr lang="en-US" smtClean="0"/>
-              <a:t>12/2/24</a:t>
+              <a:t>12/30/24</a:t>
             </a:fld>
             <a:endParaRPr lang="en-US" dirty="0"/>
           </a:p>
@@ -4915,7 +4921,7 @@
           <a:p>
             <a:fld id="{CC3759E9-439F-164C-816F-E7C3A6980DCB}" type="datetimeFigureOut">
               <a:rPr lang="en-US" smtClean="0"/>
-              <a:t>12/2/24</a:t>
+              <a:t>12/30/24</a:t>
             </a:fld>
             <a:endParaRPr lang="en-US" dirty="0"/>
           </a:p>
@@ -5056,7 +5062,7 @@
           <a:p>
             <a:fld id="{CC3759E9-439F-164C-816F-E7C3A6980DCB}" type="datetimeFigureOut">
               <a:rPr lang="en-US" smtClean="0"/>
-              <a:t>12/2/24</a:t>
+              <a:t>12/30/24</a:t>
             </a:fld>
             <a:endParaRPr lang="en-US" dirty="0"/>
           </a:p>
@@ -5169,7 +5175,7 @@
           <a:p>
             <a:fld id="{CC3759E9-439F-164C-816F-E7C3A6980DCB}" type="datetimeFigureOut">
               <a:rPr lang="en-US" smtClean="0"/>
-              <a:t>12/2/24</a:t>
+              <a:t>12/30/24</a:t>
             </a:fld>
             <a:endParaRPr lang="en-US" dirty="0"/>
           </a:p>
@@ -5480,7 +5486,7 @@
           <a:p>
             <a:fld id="{CC3759E9-439F-164C-816F-E7C3A6980DCB}" type="datetimeFigureOut">
               <a:rPr lang="en-US" smtClean="0"/>
-              <a:t>12/2/24</a:t>
+              <a:t>12/30/24</a:t>
             </a:fld>
             <a:endParaRPr lang="en-US" dirty="0"/>
           </a:p>
@@ -5768,7 +5774,7 @@
           <a:p>
             <a:fld id="{CC3759E9-439F-164C-816F-E7C3A6980DCB}" type="datetimeFigureOut">
               <a:rPr lang="en-US" smtClean="0"/>
-              <a:t>12/2/24</a:t>
+              <a:t>12/30/24</a:t>
             </a:fld>
             <a:endParaRPr lang="en-US" dirty="0"/>
           </a:p>
@@ -6009,7 +6015,7 @@
           <a:p>
             <a:fld id="{CC3759E9-439F-164C-816F-E7C3A6980DCB}" type="datetimeFigureOut">
               <a:rPr lang="en-US" smtClean="0"/>
-              <a:t>12/2/24</a:t>
+              <a:t>12/30/24</a:t>
             </a:fld>
             <a:endParaRPr lang="en-US" dirty="0"/>
           </a:p>
@@ -22140,6 +22146,1981 @@
 </p:sld>
 </file>
 
+<file path=ppt/slides/slide8.xml><?xml version="1.0" encoding="utf-8"?>
+<p:sld xmlns:a="http://schemas.openxmlformats.org/drawingml/2006/main" xmlns:r="http://schemas.openxmlformats.org/officeDocument/2006/relationships" xmlns:p="http://schemas.openxmlformats.org/presentationml/2006/main">
+  <p:cSld>
+    <p:spTree>
+      <p:nvGrpSpPr>
+        <p:cNvPr id="1" name=""/>
+        <p:cNvGrpSpPr/>
+        <p:nvPr/>
+      </p:nvGrpSpPr>
+      <p:grpSpPr>
+        <a:xfrm>
+          <a:off x="0" y="0"/>
+          <a:ext cx="0" cy="0"/>
+          <a:chOff x="0" y="0"/>
+          <a:chExt cx="0" cy="0"/>
+        </a:xfrm>
+      </p:grpSpPr>
+      <p:sp>
+        <p:nvSpPr>
+          <p:cNvPr id="9" name="Rectangle: Rounded Corners 89">
+            <a:extLst>
+              <a:ext uri="{FF2B5EF4-FFF2-40B4-BE49-F238E27FC236}">
+                <a16:creationId xmlns:a16="http://schemas.microsoft.com/office/drawing/2014/main" id="{EDE6A6B9-2142-DCC2-3BE2-D32E2B028097}"/>
+              </a:ext>
+              <a:ext uri="{C183D7F6-B498-43B3-948B-1728B52AA6E4}">
+                <adec:decorative xmlns:adec="http://schemas.microsoft.com/office/drawing/2017/decorative" val="1"/>
+              </a:ext>
+            </a:extLst>
+          </p:cNvPr>
+          <p:cNvSpPr/>
+          <p:nvPr/>
+        </p:nvSpPr>
+        <p:spPr bwMode="auto">
+          <a:xfrm>
+            <a:off x="350183" y="2520616"/>
+            <a:ext cx="11512950" cy="2177716"/>
+          </a:xfrm>
+          <a:prstGeom prst="roundRect">
+            <a:avLst>
+              <a:gd name="adj" fmla="val 6953"/>
+            </a:avLst>
+          </a:prstGeom>
+          <a:solidFill>
+            <a:schemeClr val="accent3">
+              <a:lumMod val="20000"/>
+              <a:lumOff val="80000"/>
+            </a:schemeClr>
+          </a:solidFill>
+          <a:ln w="9525" cap="flat" cmpd="sng" algn="ctr">
+            <a:noFill/>
+            <a:prstDash val="solid"/>
+            <a:headEnd type="none" w="med" len="med"/>
+            <a:tailEnd type="none" w="med" len="med"/>
+          </a:ln>
+          <a:effectLst>
+            <a:outerShdw blurRad="190500" dist="38100" dir="2700000" algn="tl" rotWithShape="0">
+              <a:schemeClr val="tx1">
+                <a:alpha val="20000"/>
+              </a:schemeClr>
+            </a:outerShdw>
+          </a:effectLst>
+        </p:spPr>
+        <p:txBody>
+          <a:bodyPr rot="0" spcFirstLastPara="0" vertOverflow="overflow" horzOverflow="overflow" vert="horz" wrap="square" lIns="72000" tIns="146304" rIns="182880" bIns="72000" numCol="1" spcCol="0" rtlCol="0" fromWordArt="0" anchor="b" anchorCtr="0" forceAA="0" compatLnSpc="1">
+            <a:prstTxWarp prst="textNoShape">
+              <a:avLst/>
+            </a:prstTxWarp>
+            <a:noAutofit/>
+          </a:bodyPr>
+          <a:lstStyle/>
+          <a:p>
+            <a:pPr algn="ctr" defTabSz="932472" fontAlgn="base">
+              <a:spcBef>
+                <a:spcPct val="0"/>
+              </a:spcBef>
+              <a:spcAft>
+                <a:spcPct val="0"/>
+              </a:spcAft>
+            </a:pPr>
+            <a:endParaRPr lang="en-GB" sz="1000" b="1" kern="0">
+              <a:solidFill>
+                <a:prstClr val="black"/>
+              </a:solidFill>
+              <a:latin typeface="Segoe UI" panose="020B0502040204020203" pitchFamily="34" charset="0"/>
+              <a:cs typeface="Segoe UI" panose="020B0502040204020203" pitchFamily="34" charset="0"/>
+            </a:endParaRPr>
+          </a:p>
+        </p:txBody>
+      </p:sp>
+      <p:sp>
+        <p:nvSpPr>
+          <p:cNvPr id="3" name="Rectangle: Rounded Corners 89">
+            <a:extLst>
+              <a:ext uri="{FF2B5EF4-FFF2-40B4-BE49-F238E27FC236}">
+                <a16:creationId xmlns:a16="http://schemas.microsoft.com/office/drawing/2014/main" id="{02FD32AF-CAB7-AE05-12E3-274F1E5B6844}"/>
+              </a:ext>
+              <a:ext uri="{C183D7F6-B498-43B3-948B-1728B52AA6E4}">
+                <adec:decorative xmlns:adec="http://schemas.microsoft.com/office/drawing/2017/decorative" val="1"/>
+              </a:ext>
+            </a:extLst>
+          </p:cNvPr>
+          <p:cNvSpPr/>
+          <p:nvPr/>
+        </p:nvSpPr>
+        <p:spPr bwMode="auto">
+          <a:xfrm>
+            <a:off x="472480" y="3484400"/>
+            <a:ext cx="3485907" cy="996103"/>
+          </a:xfrm>
+          <a:prstGeom prst="roundRect">
+            <a:avLst>
+              <a:gd name="adj" fmla="val 6953"/>
+            </a:avLst>
+          </a:prstGeom>
+          <a:solidFill>
+            <a:srgbClr val="C1DDE9"/>
+          </a:solidFill>
+          <a:ln w="9525" cap="flat" cmpd="sng" algn="ctr">
+            <a:noFill/>
+            <a:prstDash val="solid"/>
+            <a:headEnd type="none" w="med" len="med"/>
+            <a:tailEnd type="none" w="med" len="med"/>
+          </a:ln>
+          <a:effectLst>
+            <a:outerShdw blurRad="190500" dist="38100" dir="2700000" algn="tl" rotWithShape="0">
+              <a:schemeClr val="tx1">
+                <a:alpha val="20000"/>
+              </a:schemeClr>
+            </a:outerShdw>
+          </a:effectLst>
+        </p:spPr>
+        <p:txBody>
+          <a:bodyPr rot="0" spcFirstLastPara="0" vertOverflow="overflow" horzOverflow="overflow" vert="horz" wrap="square" lIns="72000" tIns="146304" rIns="182880" bIns="72000" numCol="1" spcCol="0" rtlCol="0" fromWordArt="0" anchor="b" anchorCtr="0" forceAA="0" compatLnSpc="1">
+            <a:prstTxWarp prst="textNoShape">
+              <a:avLst/>
+            </a:prstTxWarp>
+            <a:noAutofit/>
+          </a:bodyPr>
+          <a:lstStyle/>
+          <a:p>
+            <a:pPr algn="ctr" defTabSz="932472" fontAlgn="base">
+              <a:spcBef>
+                <a:spcPct val="0"/>
+              </a:spcBef>
+              <a:spcAft>
+                <a:spcPct val="0"/>
+              </a:spcAft>
+            </a:pPr>
+            <a:endParaRPr lang="en-GB" sz="1000" b="1" kern="0">
+              <a:solidFill>
+                <a:prstClr val="black"/>
+              </a:solidFill>
+              <a:latin typeface="Segoe UI" panose="020B0502040204020203" pitchFamily="34" charset="0"/>
+              <a:cs typeface="Segoe UI" panose="020B0502040204020203" pitchFamily="34" charset="0"/>
+            </a:endParaRPr>
+          </a:p>
+        </p:txBody>
+      </p:sp>
+      <p:sp>
+        <p:nvSpPr>
+          <p:cNvPr id="4" name="TextBox 3">
+            <a:extLst>
+              <a:ext uri="{FF2B5EF4-FFF2-40B4-BE49-F238E27FC236}">
+                <a16:creationId xmlns:a16="http://schemas.microsoft.com/office/drawing/2014/main" id="{C91F10AB-3936-5700-B84D-CDB64F3B5737}"/>
+              </a:ext>
+            </a:extLst>
+          </p:cNvPr>
+          <p:cNvSpPr txBox="1"/>
+          <p:nvPr/>
+        </p:nvSpPr>
+        <p:spPr>
+          <a:xfrm>
+            <a:off x="472480" y="3244689"/>
+            <a:ext cx="2054148" cy="221023"/>
+          </a:xfrm>
+          <a:prstGeom prst="rect">
+            <a:avLst/>
+          </a:prstGeom>
+          <a:noFill/>
+        </p:spPr>
+        <p:txBody>
+          <a:bodyPr wrap="square" lIns="0" tIns="0" rIns="0" bIns="0" rtlCol="0">
+            <a:spAutoFit/>
+          </a:bodyPr>
+          <a:lstStyle/>
+          <a:p>
+            <a:pPr marL="0" marR="0" lvl="0" indent="0" algn="l" defTabSz="914400" rtl="0" eaLnBrk="1" fontAlgn="auto" latinLnBrk="0" hangingPunct="1">
+              <a:lnSpc>
+                <a:spcPct val="110000"/>
+              </a:lnSpc>
+              <a:spcBef>
+                <a:spcPts val="0"/>
+              </a:spcBef>
+              <a:spcAft>
+                <a:spcPts val="200"/>
+              </a:spcAft>
+              <a:buClrTx/>
+              <a:buSzTx/>
+              <a:buFontTx/>
+              <a:buNone/>
+              <a:tabLst/>
+              <a:defRPr/>
+            </a:pPr>
+            <a:r>
+              <a:rPr lang="en-US" sz="1400" b="1" noProof="0" dirty="0">
+                <a:solidFill>
+                  <a:srgbClr val="5D77C7"/>
+                </a:solidFill>
+                <a:latin typeface="Segoe Sans Text Semibold"/>
+                <a:cs typeface="Segoe UI Semibold" panose="020B0702040204020203" pitchFamily="34" charset="0"/>
+              </a:rPr>
+              <a:t>Commercial AI</a:t>
+            </a:r>
+            <a:endParaRPr kumimoji="0" lang="en-US" sz="1400" b="1" i="0" u="none" strike="noStrike" kern="1200" cap="none" spc="0" normalizeH="0" baseline="0" noProof="0" dirty="0">
+              <a:ln>
+                <a:noFill/>
+              </a:ln>
+              <a:solidFill>
+                <a:srgbClr val="5D77C7"/>
+              </a:solidFill>
+              <a:effectLst/>
+              <a:uLnTx/>
+              <a:uFillTx/>
+              <a:latin typeface="Segoe Sans Text Semibold"/>
+              <a:cs typeface="Segoe UI Semibold" panose="020B0702040204020203" pitchFamily="34" charset="0"/>
+            </a:endParaRPr>
+          </a:p>
+        </p:txBody>
+      </p:sp>
+      <p:sp>
+        <p:nvSpPr>
+          <p:cNvPr id="5" name="Rectangle: Rounded Corners 89">
+            <a:extLst>
+              <a:ext uri="{FF2B5EF4-FFF2-40B4-BE49-F238E27FC236}">
+                <a16:creationId xmlns:a16="http://schemas.microsoft.com/office/drawing/2014/main" id="{409E6408-A16A-D54C-89CB-AD5216CA28C3}"/>
+              </a:ext>
+              <a:ext uri="{C183D7F6-B498-43B3-948B-1728B52AA6E4}">
+                <adec:decorative xmlns:adec="http://schemas.microsoft.com/office/drawing/2017/decorative" val="1"/>
+              </a:ext>
+            </a:extLst>
+          </p:cNvPr>
+          <p:cNvSpPr/>
+          <p:nvPr/>
+        </p:nvSpPr>
+        <p:spPr bwMode="auto">
+          <a:xfrm>
+            <a:off x="4276086" y="3484400"/>
+            <a:ext cx="3485907" cy="996103"/>
+          </a:xfrm>
+          <a:prstGeom prst="roundRect">
+            <a:avLst>
+              <a:gd name="adj" fmla="val 6953"/>
+            </a:avLst>
+          </a:prstGeom>
+          <a:solidFill>
+            <a:schemeClr val="accent2">
+              <a:lumMod val="40000"/>
+              <a:lumOff val="60000"/>
+            </a:schemeClr>
+          </a:solidFill>
+          <a:ln w="9525" cap="flat" cmpd="sng" algn="ctr">
+            <a:noFill/>
+            <a:prstDash val="solid"/>
+            <a:headEnd type="none" w="med" len="med"/>
+            <a:tailEnd type="none" w="med" len="med"/>
+          </a:ln>
+          <a:effectLst>
+            <a:outerShdw blurRad="190500" dist="38100" dir="2700000" algn="tl" rotWithShape="0">
+              <a:schemeClr val="tx1">
+                <a:alpha val="20000"/>
+              </a:schemeClr>
+            </a:outerShdw>
+          </a:effectLst>
+        </p:spPr>
+        <p:txBody>
+          <a:bodyPr rot="0" spcFirstLastPara="0" vertOverflow="overflow" horzOverflow="overflow" vert="horz" wrap="square" lIns="72000" tIns="146304" rIns="182880" bIns="72000" numCol="1" spcCol="0" rtlCol="0" fromWordArt="0" anchor="b" anchorCtr="0" forceAA="0" compatLnSpc="1">
+            <a:prstTxWarp prst="textNoShape">
+              <a:avLst/>
+            </a:prstTxWarp>
+            <a:noAutofit/>
+          </a:bodyPr>
+          <a:lstStyle/>
+          <a:p>
+            <a:pPr algn="ctr" defTabSz="932472" fontAlgn="base">
+              <a:spcBef>
+                <a:spcPct val="0"/>
+              </a:spcBef>
+              <a:spcAft>
+                <a:spcPct val="0"/>
+              </a:spcAft>
+            </a:pPr>
+            <a:endParaRPr lang="en-GB" sz="1000" b="1" kern="0">
+              <a:solidFill>
+                <a:prstClr val="black"/>
+              </a:solidFill>
+              <a:latin typeface="Segoe UI" panose="020B0502040204020203" pitchFamily="34" charset="0"/>
+              <a:cs typeface="Segoe UI" panose="020B0502040204020203" pitchFamily="34" charset="0"/>
+            </a:endParaRPr>
+          </a:p>
+        </p:txBody>
+      </p:sp>
+      <p:sp>
+        <p:nvSpPr>
+          <p:cNvPr id="6" name="TextBox 5">
+            <a:extLst>
+              <a:ext uri="{FF2B5EF4-FFF2-40B4-BE49-F238E27FC236}">
+                <a16:creationId xmlns:a16="http://schemas.microsoft.com/office/drawing/2014/main" id="{1A259F60-624B-16B6-2BD4-CF9CE5C011E0}"/>
+              </a:ext>
+            </a:extLst>
+          </p:cNvPr>
+          <p:cNvSpPr txBox="1"/>
+          <p:nvPr/>
+        </p:nvSpPr>
+        <p:spPr>
+          <a:xfrm>
+            <a:off x="4276086" y="3244689"/>
+            <a:ext cx="2054148" cy="221023"/>
+          </a:xfrm>
+          <a:prstGeom prst="rect">
+            <a:avLst/>
+          </a:prstGeom>
+          <a:noFill/>
+        </p:spPr>
+        <p:txBody>
+          <a:bodyPr wrap="square" lIns="0" tIns="0" rIns="0" bIns="0" rtlCol="0">
+            <a:spAutoFit/>
+          </a:bodyPr>
+          <a:lstStyle/>
+          <a:p>
+            <a:pPr marL="0" marR="0" lvl="0" indent="0" algn="l" defTabSz="914400" rtl="0" eaLnBrk="1" fontAlgn="auto" latinLnBrk="0" hangingPunct="1">
+              <a:lnSpc>
+                <a:spcPct val="110000"/>
+              </a:lnSpc>
+              <a:spcBef>
+                <a:spcPts val="0"/>
+              </a:spcBef>
+              <a:spcAft>
+                <a:spcPts val="200"/>
+              </a:spcAft>
+              <a:buClrTx/>
+              <a:buSzTx/>
+              <a:buFontTx/>
+              <a:buNone/>
+              <a:tabLst/>
+              <a:defRPr/>
+            </a:pPr>
+            <a:r>
+              <a:rPr lang="en-US" sz="1400" b="1" noProof="0" dirty="0">
+                <a:solidFill>
+                  <a:srgbClr val="5D77C7"/>
+                </a:solidFill>
+                <a:latin typeface="Segoe Sans Text Semibold"/>
+                <a:cs typeface="Segoe UI Semibold" panose="020B0702040204020203" pitchFamily="34" charset="0"/>
+              </a:rPr>
+              <a:t>Open-Source AI</a:t>
+            </a:r>
+            <a:endParaRPr kumimoji="0" lang="en-US" sz="1400" b="1" i="0" u="none" strike="noStrike" kern="1200" cap="none" spc="0" normalizeH="0" baseline="0" noProof="0" dirty="0">
+              <a:ln>
+                <a:noFill/>
+              </a:ln>
+              <a:solidFill>
+                <a:srgbClr val="5D77C7"/>
+              </a:solidFill>
+              <a:effectLst/>
+              <a:uLnTx/>
+              <a:uFillTx/>
+              <a:latin typeface="Segoe Sans Text Semibold"/>
+              <a:cs typeface="Segoe UI Semibold" panose="020B0702040204020203" pitchFamily="34" charset="0"/>
+            </a:endParaRPr>
+          </a:p>
+        </p:txBody>
+      </p:sp>
+      <p:sp>
+        <p:nvSpPr>
+          <p:cNvPr id="7" name="Rectangle: Rounded Corners 89">
+            <a:extLst>
+              <a:ext uri="{FF2B5EF4-FFF2-40B4-BE49-F238E27FC236}">
+                <a16:creationId xmlns:a16="http://schemas.microsoft.com/office/drawing/2014/main" id="{0F58BD93-9849-6B9D-7EE5-15EF06DB7F71}"/>
+              </a:ext>
+              <a:ext uri="{C183D7F6-B498-43B3-948B-1728B52AA6E4}">
+                <adec:decorative xmlns:adec="http://schemas.microsoft.com/office/drawing/2017/decorative" val="1"/>
+              </a:ext>
+            </a:extLst>
+          </p:cNvPr>
+          <p:cNvSpPr/>
+          <p:nvPr/>
+        </p:nvSpPr>
+        <p:spPr bwMode="auto">
+          <a:xfrm>
+            <a:off x="8079692" y="3484400"/>
+            <a:ext cx="3485907" cy="996103"/>
+          </a:xfrm>
+          <a:prstGeom prst="roundRect">
+            <a:avLst>
+              <a:gd name="adj" fmla="val 6953"/>
+            </a:avLst>
+          </a:prstGeom>
+          <a:solidFill>
+            <a:schemeClr val="accent5">
+              <a:lumMod val="20000"/>
+              <a:lumOff val="80000"/>
+            </a:schemeClr>
+          </a:solidFill>
+          <a:ln w="9525" cap="flat" cmpd="sng" algn="ctr">
+            <a:noFill/>
+            <a:prstDash val="solid"/>
+            <a:headEnd type="none" w="med" len="med"/>
+            <a:tailEnd type="none" w="med" len="med"/>
+          </a:ln>
+          <a:effectLst>
+            <a:outerShdw blurRad="190500" dist="38100" dir="2700000" algn="tl" rotWithShape="0">
+              <a:schemeClr val="tx1">
+                <a:alpha val="20000"/>
+              </a:schemeClr>
+            </a:outerShdw>
+          </a:effectLst>
+        </p:spPr>
+        <p:txBody>
+          <a:bodyPr rot="0" spcFirstLastPara="0" vertOverflow="overflow" horzOverflow="overflow" vert="horz" wrap="square" lIns="72000" tIns="146304" rIns="182880" bIns="72000" numCol="1" spcCol="0" rtlCol="0" fromWordArt="0" anchor="b" anchorCtr="0" forceAA="0" compatLnSpc="1">
+            <a:prstTxWarp prst="textNoShape">
+              <a:avLst/>
+            </a:prstTxWarp>
+            <a:noAutofit/>
+          </a:bodyPr>
+          <a:lstStyle/>
+          <a:p>
+            <a:pPr algn="ctr" defTabSz="932472" fontAlgn="base">
+              <a:spcBef>
+                <a:spcPct val="0"/>
+              </a:spcBef>
+              <a:spcAft>
+                <a:spcPct val="0"/>
+              </a:spcAft>
+            </a:pPr>
+            <a:endParaRPr lang="en-GB" sz="1000" b="1" kern="0">
+              <a:solidFill>
+                <a:prstClr val="black"/>
+              </a:solidFill>
+              <a:latin typeface="Segoe UI" panose="020B0502040204020203" pitchFamily="34" charset="0"/>
+              <a:cs typeface="Segoe UI" panose="020B0502040204020203" pitchFamily="34" charset="0"/>
+            </a:endParaRPr>
+          </a:p>
+        </p:txBody>
+      </p:sp>
+      <p:sp>
+        <p:nvSpPr>
+          <p:cNvPr id="8" name="TextBox 7">
+            <a:extLst>
+              <a:ext uri="{FF2B5EF4-FFF2-40B4-BE49-F238E27FC236}">
+                <a16:creationId xmlns:a16="http://schemas.microsoft.com/office/drawing/2014/main" id="{AAD0633B-7317-F44D-909F-3B72B3D11630}"/>
+              </a:ext>
+            </a:extLst>
+          </p:cNvPr>
+          <p:cNvSpPr txBox="1"/>
+          <p:nvPr/>
+        </p:nvSpPr>
+        <p:spPr>
+          <a:xfrm>
+            <a:off x="8079692" y="3244689"/>
+            <a:ext cx="1830204" cy="221023"/>
+          </a:xfrm>
+          <a:prstGeom prst="rect">
+            <a:avLst/>
+          </a:prstGeom>
+          <a:noFill/>
+        </p:spPr>
+        <p:txBody>
+          <a:bodyPr wrap="square" lIns="0" tIns="0" rIns="0" bIns="0" rtlCol="0">
+            <a:spAutoFit/>
+          </a:bodyPr>
+          <a:lstStyle/>
+          <a:p>
+            <a:pPr marL="0" marR="0" lvl="0" indent="0" algn="l" defTabSz="914400" rtl="0" eaLnBrk="1" fontAlgn="auto" latinLnBrk="0" hangingPunct="1">
+              <a:lnSpc>
+                <a:spcPct val="110000"/>
+              </a:lnSpc>
+              <a:spcBef>
+                <a:spcPts val="0"/>
+              </a:spcBef>
+              <a:spcAft>
+                <a:spcPts val="200"/>
+              </a:spcAft>
+              <a:buClrTx/>
+              <a:buSzTx/>
+              <a:buFontTx/>
+              <a:buNone/>
+              <a:tabLst/>
+              <a:defRPr/>
+            </a:pPr>
+            <a:r>
+              <a:rPr lang="en-US" sz="1400" b="1" noProof="0" dirty="0">
+                <a:solidFill>
+                  <a:srgbClr val="5D77C7"/>
+                </a:solidFill>
+                <a:latin typeface="Segoe Sans Text Semibold"/>
+                <a:cs typeface="Segoe UI Semibold" panose="020B0702040204020203" pitchFamily="34" charset="0"/>
+              </a:rPr>
+              <a:t>Vendor and Partner AI</a:t>
+            </a:r>
+            <a:endParaRPr kumimoji="0" lang="en-US" sz="1400" b="1" i="0" u="none" strike="noStrike" kern="1200" cap="none" spc="0" normalizeH="0" baseline="0" noProof="0" dirty="0">
+              <a:ln>
+                <a:noFill/>
+              </a:ln>
+              <a:solidFill>
+                <a:srgbClr val="5D77C7"/>
+              </a:solidFill>
+              <a:effectLst/>
+              <a:uLnTx/>
+              <a:uFillTx/>
+              <a:latin typeface="Segoe Sans Text Semibold"/>
+              <a:cs typeface="Segoe UI Semibold" panose="020B0702040204020203" pitchFamily="34" charset="0"/>
+            </a:endParaRPr>
+          </a:p>
+        </p:txBody>
+      </p:sp>
+      <p:sp>
+        <p:nvSpPr>
+          <p:cNvPr id="10" name="TextBox 9">
+            <a:extLst>
+              <a:ext uri="{FF2B5EF4-FFF2-40B4-BE49-F238E27FC236}">
+                <a16:creationId xmlns:a16="http://schemas.microsoft.com/office/drawing/2014/main" id="{8B62A159-9579-B176-2E19-436544363793}"/>
+              </a:ext>
+            </a:extLst>
+          </p:cNvPr>
+          <p:cNvSpPr txBox="1"/>
+          <p:nvPr/>
+        </p:nvSpPr>
+        <p:spPr>
+          <a:xfrm>
+            <a:off x="350183" y="2668060"/>
+            <a:ext cx="11512950" cy="315792"/>
+          </a:xfrm>
+          <a:prstGeom prst="rect">
+            <a:avLst/>
+          </a:prstGeom>
+          <a:noFill/>
+        </p:spPr>
+        <p:txBody>
+          <a:bodyPr wrap="square" lIns="0" tIns="0" rIns="0" bIns="0" rtlCol="0">
+            <a:spAutoFit/>
+          </a:bodyPr>
+          <a:lstStyle/>
+          <a:p>
+            <a:pPr marL="0" marR="0" lvl="0" indent="0" algn="ctr" defTabSz="914400" rtl="0" eaLnBrk="1" fontAlgn="auto" latinLnBrk="0" hangingPunct="1">
+              <a:lnSpc>
+                <a:spcPct val="110000"/>
+              </a:lnSpc>
+              <a:spcBef>
+                <a:spcPts val="0"/>
+              </a:spcBef>
+              <a:spcAft>
+                <a:spcPts val="200"/>
+              </a:spcAft>
+              <a:buClrTx/>
+              <a:buSzTx/>
+              <a:buFontTx/>
+              <a:buNone/>
+              <a:tabLst/>
+              <a:defRPr/>
+            </a:pPr>
+            <a:r>
+              <a:rPr lang="en-US" sz="2000" b="1" dirty="0">
+                <a:solidFill>
+                  <a:srgbClr val="5D77C7"/>
+                </a:solidFill>
+                <a:latin typeface="Segoe Sans Text Semibold"/>
+                <a:cs typeface="Segoe UI Semibold" panose="020B0702040204020203" pitchFamily="34" charset="0"/>
+              </a:rPr>
+              <a:t>Generative</a:t>
+            </a:r>
+            <a:r>
+              <a:rPr lang="en-US" b="1" dirty="0">
+                <a:solidFill>
+                  <a:srgbClr val="5D77C7"/>
+                </a:solidFill>
+                <a:latin typeface="Segoe Sans Text Semibold"/>
+                <a:cs typeface="Segoe UI Semibold" panose="020B0702040204020203" pitchFamily="34" charset="0"/>
+              </a:rPr>
+              <a:t> AI Brain</a:t>
+            </a:r>
+            <a:endParaRPr kumimoji="0" lang="en-US" b="1" i="0" u="none" strike="noStrike" kern="1200" cap="none" spc="0" normalizeH="0" baseline="0" noProof="0" dirty="0">
+              <a:ln>
+                <a:noFill/>
+              </a:ln>
+              <a:solidFill>
+                <a:srgbClr val="5D77C7"/>
+              </a:solidFill>
+              <a:effectLst/>
+              <a:uLnTx/>
+              <a:uFillTx/>
+              <a:latin typeface="Segoe Sans Text Semibold"/>
+              <a:cs typeface="Segoe UI Semibold" panose="020B0702040204020203" pitchFamily="34" charset="0"/>
+            </a:endParaRPr>
+          </a:p>
+        </p:txBody>
+      </p:sp>
+      <p:pic>
+        <p:nvPicPr>
+          <p:cNvPr id="12" name="Graphic 11" descr="Head with gears outline">
+            <a:extLst>
+              <a:ext uri="{FF2B5EF4-FFF2-40B4-BE49-F238E27FC236}">
+                <a16:creationId xmlns:a16="http://schemas.microsoft.com/office/drawing/2014/main" id="{D8C7C902-83A7-942C-BF21-4A7D3AD850F3}"/>
+              </a:ext>
+            </a:extLst>
+          </p:cNvPr>
+          <p:cNvPicPr>
+            <a:picLocks noChangeAspect="1"/>
+          </p:cNvPicPr>
+          <p:nvPr/>
+        </p:nvPicPr>
+        <p:blipFill>
+          <a:blip r:embed="rId2">
+            <a:extLst>
+              <a:ext uri="{96DAC541-7B7A-43D3-8B79-37D633B846F1}">
+                <asvg:svgBlip xmlns:asvg="http://schemas.microsoft.com/office/drawing/2016/SVG/main" r:embed="rId3"/>
+              </a:ext>
+            </a:extLst>
+          </a:blip>
+          <a:stretch>
+            <a:fillRect/>
+          </a:stretch>
+        </p:blipFill>
+        <p:spPr>
+          <a:xfrm>
+            <a:off x="15280" y="2014422"/>
+            <a:ext cx="914400" cy="914400"/>
+          </a:xfrm>
+          <a:prstGeom prst="rect">
+            <a:avLst/>
+          </a:prstGeom>
+        </p:spPr>
+      </p:pic>
+      <p:pic>
+        <p:nvPicPr>
+          <p:cNvPr id="13" name="2F358329-2C19-4FBA-B51C-51CE75BE790F" descr="openai logo">
+            <a:extLst>
+              <a:ext uri="{FF2B5EF4-FFF2-40B4-BE49-F238E27FC236}">
+                <a16:creationId xmlns:a16="http://schemas.microsoft.com/office/drawing/2014/main" id="{8875CFAA-2CB9-04FF-BB7E-A6D891585C56}"/>
+              </a:ext>
+            </a:extLst>
+          </p:cNvPr>
+          <p:cNvPicPr>
+            <a:picLocks noChangeAspect="1" noChangeArrowheads="1"/>
+          </p:cNvPicPr>
+          <p:nvPr/>
+        </p:nvPicPr>
+        <p:blipFill rotWithShape="1">
+          <a:blip r:embed="rId4" cstate="email">
+            <a:extLst>
+              <a:ext uri="{28A0092B-C50C-407E-A947-70E740481C1C}">
+                <a14:useLocalDpi xmlns:a14="http://schemas.microsoft.com/office/drawing/2010/main"/>
+              </a:ext>
+              <a:ext uri="{96DAC541-7B7A-43D3-8B79-37D633B846F1}">
+                <asvg:svgBlip xmlns:asvg="http://schemas.microsoft.com/office/drawing/2016/SVG/main" r:embed="rId5"/>
+              </a:ext>
+            </a:extLst>
+          </a:blip>
+          <a:srcRect l="-7183" r="-3331"/>
+          <a:stretch/>
+        </p:blipFill>
+        <p:spPr bwMode="auto">
+          <a:xfrm>
+            <a:off x="1189705" y="3616239"/>
+            <a:ext cx="382710" cy="348675"/>
+          </a:xfrm>
+          <a:prstGeom prst="rect">
+            <a:avLst/>
+          </a:prstGeom>
+          <a:noFill/>
+          <a:ln>
+            <a:noFill/>
+          </a:ln>
+          <a:extLst>
+            <a:ext uri="{909E8E84-426E-40DD-AFC4-6F175D3DCCD1}">
+              <a14:hiddenFill xmlns:a14="http://schemas.microsoft.com/office/drawing/2010/main">
+                <a:solidFill>
+                  <a:srgbClr val="FFFFFF"/>
+                </a:solidFill>
+              </a14:hiddenFill>
+            </a:ext>
+          </a:extLst>
+        </p:spPr>
+      </p:pic>
+      <p:sp>
+        <p:nvSpPr>
+          <p:cNvPr id="14" name="TextBox 13">
+            <a:extLst>
+              <a:ext uri="{FF2B5EF4-FFF2-40B4-BE49-F238E27FC236}">
+                <a16:creationId xmlns:a16="http://schemas.microsoft.com/office/drawing/2014/main" id="{5F889EDB-A8B9-7E9A-ACB1-E7C4AA2E3311}"/>
+              </a:ext>
+            </a:extLst>
+          </p:cNvPr>
+          <p:cNvSpPr txBox="1"/>
+          <p:nvPr/>
+        </p:nvSpPr>
+        <p:spPr>
+          <a:xfrm>
+            <a:off x="860742" y="4019548"/>
+            <a:ext cx="1040637" cy="418256"/>
+          </a:xfrm>
+          <a:prstGeom prst="rect">
+            <a:avLst/>
+          </a:prstGeom>
+          <a:noFill/>
+        </p:spPr>
+        <p:txBody>
+          <a:bodyPr wrap="square" lIns="0" tIns="0" rIns="0" bIns="0" rtlCol="0">
+            <a:spAutoFit/>
+          </a:bodyPr>
+          <a:lstStyle/>
+          <a:p>
+            <a:pPr marL="0" marR="0" lvl="0" indent="0" algn="ctr" defTabSz="914400" rtl="0" eaLnBrk="1" fontAlgn="auto" latinLnBrk="0" hangingPunct="1">
+              <a:lnSpc>
+                <a:spcPct val="110000"/>
+              </a:lnSpc>
+              <a:spcBef>
+                <a:spcPts val="0"/>
+              </a:spcBef>
+              <a:spcAft>
+                <a:spcPts val="200"/>
+              </a:spcAft>
+              <a:buClrTx/>
+              <a:buSzTx/>
+              <a:buFontTx/>
+              <a:buNone/>
+              <a:tabLst/>
+              <a:defRPr/>
+            </a:pPr>
+            <a:r>
+              <a:rPr lang="en-US" sz="1200" b="1" noProof="0" dirty="0">
+                <a:solidFill>
+                  <a:srgbClr val="5D77C7"/>
+                </a:solidFill>
+                <a:latin typeface="Segoe Sans Text Semibold"/>
+                <a:cs typeface="Segoe UI Semibold" panose="020B0702040204020203" pitchFamily="34" charset="0"/>
+              </a:rPr>
+              <a:t>Azure OpenAI</a:t>
+            </a:r>
+          </a:p>
+          <a:p>
+            <a:pPr marL="0" marR="0" lvl="0" indent="0" algn="ctr" defTabSz="914400" rtl="0" eaLnBrk="1" fontAlgn="auto" latinLnBrk="0" hangingPunct="1">
+              <a:lnSpc>
+                <a:spcPct val="110000"/>
+              </a:lnSpc>
+              <a:spcBef>
+                <a:spcPts val="0"/>
+              </a:spcBef>
+              <a:spcAft>
+                <a:spcPts val="200"/>
+              </a:spcAft>
+              <a:buClrTx/>
+              <a:buSzTx/>
+              <a:buFontTx/>
+              <a:buNone/>
+              <a:tabLst/>
+              <a:defRPr/>
+            </a:pPr>
+            <a:r>
+              <a:rPr kumimoji="0" lang="en-US" sz="1200" b="1" i="0" u="none" strike="noStrike" kern="1200" cap="none" spc="0" normalizeH="0" baseline="0" dirty="0">
+                <a:ln>
+                  <a:noFill/>
+                </a:ln>
+                <a:solidFill>
+                  <a:srgbClr val="5D77C7"/>
+                </a:solidFill>
+                <a:effectLst/>
+                <a:uLnTx/>
+                <a:uFillTx/>
+                <a:latin typeface="Segoe Sans Text Semibold"/>
+                <a:cs typeface="Segoe UI Semibold" panose="020B0702040204020203" pitchFamily="34" charset="0"/>
+              </a:rPr>
+              <a:t>GPT-4o</a:t>
+            </a:r>
+            <a:endParaRPr kumimoji="0" lang="en-US" sz="1200" b="1" i="0" u="none" strike="noStrike" kern="1200" cap="none" spc="0" normalizeH="0" baseline="0" noProof="0" dirty="0">
+              <a:ln>
+                <a:noFill/>
+              </a:ln>
+              <a:solidFill>
+                <a:srgbClr val="5D77C7"/>
+              </a:solidFill>
+              <a:effectLst/>
+              <a:uLnTx/>
+              <a:uFillTx/>
+              <a:latin typeface="Segoe Sans Text Semibold"/>
+              <a:cs typeface="Segoe UI Semibold" panose="020B0702040204020203" pitchFamily="34" charset="0"/>
+            </a:endParaRPr>
+          </a:p>
+        </p:txBody>
+      </p:sp>
+      <p:pic>
+        <p:nvPicPr>
+          <p:cNvPr id="15" name="2F358329-2C19-4FBA-B51C-51CE75BE790F" descr="openai logo">
+            <a:extLst>
+              <a:ext uri="{FF2B5EF4-FFF2-40B4-BE49-F238E27FC236}">
+                <a16:creationId xmlns:a16="http://schemas.microsoft.com/office/drawing/2014/main" id="{27DB131F-ACA1-3FF5-4E6C-BEF4911FD115}"/>
+              </a:ext>
+            </a:extLst>
+          </p:cNvPr>
+          <p:cNvPicPr>
+            <a:picLocks noChangeAspect="1" noChangeArrowheads="1"/>
+          </p:cNvPicPr>
+          <p:nvPr/>
+        </p:nvPicPr>
+        <p:blipFill rotWithShape="1">
+          <a:blip r:embed="rId4" cstate="email">
+            <a:extLst>
+              <a:ext uri="{28A0092B-C50C-407E-A947-70E740481C1C}">
+                <a14:useLocalDpi xmlns:a14="http://schemas.microsoft.com/office/drawing/2010/main"/>
+              </a:ext>
+              <a:ext uri="{96DAC541-7B7A-43D3-8B79-37D633B846F1}">
+                <asvg:svgBlip xmlns:asvg="http://schemas.microsoft.com/office/drawing/2016/SVG/main" r:embed="rId5"/>
+              </a:ext>
+            </a:extLst>
+          </a:blip>
+          <a:srcRect l="-7183" r="-3331"/>
+          <a:stretch/>
+        </p:blipFill>
+        <p:spPr bwMode="auto">
+          <a:xfrm>
+            <a:off x="2738527" y="3612209"/>
+            <a:ext cx="382710" cy="348675"/>
+          </a:xfrm>
+          <a:prstGeom prst="rect">
+            <a:avLst/>
+          </a:prstGeom>
+          <a:noFill/>
+          <a:ln>
+            <a:noFill/>
+          </a:ln>
+          <a:extLst>
+            <a:ext uri="{909E8E84-426E-40DD-AFC4-6F175D3DCCD1}">
+              <a14:hiddenFill xmlns:a14="http://schemas.microsoft.com/office/drawing/2010/main">
+                <a:solidFill>
+                  <a:srgbClr val="FFFFFF"/>
+                </a:solidFill>
+              </a14:hiddenFill>
+            </a:ext>
+          </a:extLst>
+        </p:spPr>
+      </p:pic>
+      <p:sp>
+        <p:nvSpPr>
+          <p:cNvPr id="16" name="TextBox 15">
+            <a:extLst>
+              <a:ext uri="{FF2B5EF4-FFF2-40B4-BE49-F238E27FC236}">
+                <a16:creationId xmlns:a16="http://schemas.microsoft.com/office/drawing/2014/main" id="{35CAFB5B-BB54-403E-B660-57A0D2181A8E}"/>
+              </a:ext>
+            </a:extLst>
+          </p:cNvPr>
+          <p:cNvSpPr txBox="1"/>
+          <p:nvPr/>
+        </p:nvSpPr>
+        <p:spPr>
+          <a:xfrm>
+            <a:off x="2409564" y="4015518"/>
+            <a:ext cx="1040637" cy="418256"/>
+          </a:xfrm>
+          <a:prstGeom prst="rect">
+            <a:avLst/>
+          </a:prstGeom>
+          <a:noFill/>
+        </p:spPr>
+        <p:txBody>
+          <a:bodyPr wrap="square" lIns="0" tIns="0" rIns="0" bIns="0" rtlCol="0">
+            <a:spAutoFit/>
+          </a:bodyPr>
+          <a:lstStyle/>
+          <a:p>
+            <a:pPr marL="0" marR="0" lvl="0" indent="0" algn="ctr" defTabSz="914400" rtl="0" eaLnBrk="1" fontAlgn="auto" latinLnBrk="0" hangingPunct="1">
+              <a:lnSpc>
+                <a:spcPct val="110000"/>
+              </a:lnSpc>
+              <a:spcBef>
+                <a:spcPts val="0"/>
+              </a:spcBef>
+              <a:spcAft>
+                <a:spcPts val="200"/>
+              </a:spcAft>
+              <a:buClrTx/>
+              <a:buSzTx/>
+              <a:buFontTx/>
+              <a:buNone/>
+              <a:tabLst/>
+              <a:defRPr/>
+            </a:pPr>
+            <a:r>
+              <a:rPr lang="en-US" sz="1200" b="1" noProof="0" dirty="0">
+                <a:solidFill>
+                  <a:srgbClr val="5D77C7"/>
+                </a:solidFill>
+                <a:latin typeface="Segoe Sans Text Semibold"/>
+                <a:cs typeface="Segoe UI Semibold" panose="020B0702040204020203" pitchFamily="34" charset="0"/>
+              </a:rPr>
+              <a:t>Azure OpenAI</a:t>
+            </a:r>
+          </a:p>
+          <a:p>
+            <a:pPr marL="0" marR="0" lvl="0" indent="0" algn="ctr" defTabSz="914400" rtl="0" eaLnBrk="1" fontAlgn="auto" latinLnBrk="0" hangingPunct="1">
+              <a:lnSpc>
+                <a:spcPct val="110000"/>
+              </a:lnSpc>
+              <a:spcBef>
+                <a:spcPts val="0"/>
+              </a:spcBef>
+              <a:spcAft>
+                <a:spcPts val="200"/>
+              </a:spcAft>
+              <a:buClrTx/>
+              <a:buSzTx/>
+              <a:buFontTx/>
+              <a:buNone/>
+              <a:tabLst/>
+              <a:defRPr/>
+            </a:pPr>
+            <a:r>
+              <a:rPr lang="en-US" sz="1200" b="1" dirty="0">
+                <a:solidFill>
+                  <a:srgbClr val="5D77C7"/>
+                </a:solidFill>
+                <a:latin typeface="Segoe Sans Text Semibold"/>
+                <a:cs typeface="Segoe UI Semibold" panose="020B0702040204020203" pitchFamily="34" charset="0"/>
+              </a:rPr>
+              <a:t>o</a:t>
+            </a:r>
+            <a:r>
+              <a:rPr lang="en-US" sz="1200" b="1" noProof="0" dirty="0">
+                <a:solidFill>
+                  <a:srgbClr val="5D77C7"/>
+                </a:solidFill>
+                <a:latin typeface="Segoe Sans Text Semibold"/>
+                <a:cs typeface="Segoe UI Semibold" panose="020B0702040204020203" pitchFamily="34" charset="0"/>
+              </a:rPr>
+              <a:t>3</a:t>
+            </a:r>
+            <a:endParaRPr kumimoji="0" lang="en-US" sz="1200" b="1" i="0" u="none" strike="noStrike" kern="1200" cap="none" spc="0" normalizeH="0" baseline="0" noProof="0" dirty="0">
+              <a:ln>
+                <a:noFill/>
+              </a:ln>
+              <a:solidFill>
+                <a:srgbClr val="5D77C7"/>
+              </a:solidFill>
+              <a:effectLst/>
+              <a:uLnTx/>
+              <a:uFillTx/>
+              <a:latin typeface="Segoe Sans Text Semibold"/>
+              <a:cs typeface="Segoe UI Semibold" panose="020B0702040204020203" pitchFamily="34" charset="0"/>
+            </a:endParaRPr>
+          </a:p>
+        </p:txBody>
+      </p:sp>
+      <p:pic>
+        <p:nvPicPr>
+          <p:cNvPr id="17" name="Picture 6" descr="Meta Logo and symbol, meaning, history, PNG">
+            <a:extLst>
+              <a:ext uri="{FF2B5EF4-FFF2-40B4-BE49-F238E27FC236}">
+                <a16:creationId xmlns:a16="http://schemas.microsoft.com/office/drawing/2014/main" id="{2ECE46E6-C0C8-B261-C4E3-EFCB8410B485}"/>
+              </a:ext>
+            </a:extLst>
+          </p:cNvPr>
+          <p:cNvPicPr>
+            <a:picLocks noChangeAspect="1" noChangeArrowheads="1"/>
+          </p:cNvPicPr>
+          <p:nvPr/>
+        </p:nvPicPr>
+        <p:blipFill>
+          <a:blip r:embed="rId6">
+            <a:extLst>
+              <a:ext uri="{28A0092B-C50C-407E-A947-70E740481C1C}">
+                <a14:useLocalDpi xmlns:a14="http://schemas.microsoft.com/office/drawing/2010/main" val="0"/>
+              </a:ext>
+            </a:extLst>
+          </a:blip>
+          <a:srcRect/>
+          <a:stretch>
+            <a:fillRect/>
+          </a:stretch>
+        </p:blipFill>
+        <p:spPr bwMode="auto">
+          <a:xfrm>
+            <a:off x="5024226" y="3668650"/>
+            <a:ext cx="557868" cy="313801"/>
+          </a:xfrm>
+          <a:prstGeom prst="rect">
+            <a:avLst/>
+          </a:prstGeom>
+          <a:noFill/>
+          <a:extLst>
+            <a:ext uri="{909E8E84-426E-40DD-AFC4-6F175D3DCCD1}">
+              <a14:hiddenFill xmlns:a14="http://schemas.microsoft.com/office/drawing/2010/main">
+                <a:solidFill>
+                  <a:srgbClr val="FFFFFF"/>
+                </a:solidFill>
+              </a14:hiddenFill>
+            </a:ext>
+          </a:extLst>
+        </p:spPr>
+      </p:pic>
+      <p:sp>
+        <p:nvSpPr>
+          <p:cNvPr id="18" name="TextBox 17">
+            <a:extLst>
+              <a:ext uri="{FF2B5EF4-FFF2-40B4-BE49-F238E27FC236}">
+                <a16:creationId xmlns:a16="http://schemas.microsoft.com/office/drawing/2014/main" id="{1E74D196-36F2-708F-801C-7807059762C9}"/>
+              </a:ext>
+            </a:extLst>
+          </p:cNvPr>
+          <p:cNvSpPr txBox="1"/>
+          <p:nvPr/>
+        </p:nvSpPr>
+        <p:spPr>
+          <a:xfrm>
+            <a:off x="4782841" y="4033864"/>
+            <a:ext cx="1040637" cy="418256"/>
+          </a:xfrm>
+          <a:prstGeom prst="rect">
+            <a:avLst/>
+          </a:prstGeom>
+          <a:noFill/>
+        </p:spPr>
+        <p:txBody>
+          <a:bodyPr wrap="square" lIns="0" tIns="0" rIns="0" bIns="0" rtlCol="0">
+            <a:spAutoFit/>
+          </a:bodyPr>
+          <a:lstStyle/>
+          <a:p>
+            <a:pPr marL="0" marR="0" lvl="0" indent="0" algn="ctr" defTabSz="914400" rtl="0" eaLnBrk="1" fontAlgn="auto" latinLnBrk="0" hangingPunct="1">
+              <a:lnSpc>
+                <a:spcPct val="110000"/>
+              </a:lnSpc>
+              <a:spcBef>
+                <a:spcPts val="0"/>
+              </a:spcBef>
+              <a:spcAft>
+                <a:spcPts val="200"/>
+              </a:spcAft>
+              <a:buClrTx/>
+              <a:buSzTx/>
+              <a:buFontTx/>
+              <a:buNone/>
+              <a:tabLst/>
+              <a:defRPr/>
+            </a:pPr>
+            <a:r>
+              <a:rPr lang="en-US" sz="1200" b="1" noProof="0" dirty="0">
+                <a:solidFill>
+                  <a:srgbClr val="5D77C7"/>
+                </a:solidFill>
+                <a:latin typeface="Segoe Sans Text Semibold"/>
+                <a:cs typeface="Segoe UI Semibold" panose="020B0702040204020203" pitchFamily="34" charset="0"/>
+              </a:rPr>
+              <a:t>Meta</a:t>
+            </a:r>
+          </a:p>
+          <a:p>
+            <a:pPr marL="0" marR="0" lvl="0" indent="0" algn="ctr" defTabSz="914400" rtl="0" eaLnBrk="1" fontAlgn="auto" latinLnBrk="0" hangingPunct="1">
+              <a:lnSpc>
+                <a:spcPct val="110000"/>
+              </a:lnSpc>
+              <a:spcBef>
+                <a:spcPts val="0"/>
+              </a:spcBef>
+              <a:spcAft>
+                <a:spcPts val="200"/>
+              </a:spcAft>
+              <a:buClrTx/>
+              <a:buSzTx/>
+              <a:buFontTx/>
+              <a:buNone/>
+              <a:tabLst/>
+              <a:defRPr/>
+            </a:pPr>
+            <a:r>
+              <a:rPr lang="en-US" sz="1200" b="1" noProof="0" dirty="0">
+                <a:solidFill>
+                  <a:srgbClr val="5D77C7"/>
+                </a:solidFill>
+                <a:latin typeface="Segoe Sans Text Semibold"/>
+                <a:cs typeface="Segoe UI Semibold" panose="020B0702040204020203" pitchFamily="34" charset="0"/>
+              </a:rPr>
+              <a:t>Llama 3.x</a:t>
+            </a:r>
+            <a:endParaRPr kumimoji="0" lang="en-US" sz="1200" b="1" i="0" u="none" strike="noStrike" kern="1200" cap="none" spc="0" normalizeH="0" baseline="0" noProof="0" dirty="0">
+              <a:ln>
+                <a:noFill/>
+              </a:ln>
+              <a:solidFill>
+                <a:srgbClr val="5D77C7"/>
+              </a:solidFill>
+              <a:effectLst/>
+              <a:uLnTx/>
+              <a:uFillTx/>
+              <a:latin typeface="Segoe Sans Text Semibold"/>
+              <a:cs typeface="Segoe UI Semibold" panose="020B0702040204020203" pitchFamily="34" charset="0"/>
+            </a:endParaRPr>
+          </a:p>
+        </p:txBody>
+      </p:sp>
+      <p:sp>
+        <p:nvSpPr>
+          <p:cNvPr id="20" name="AutoShape 8">
+            <a:extLst>
+              <a:ext uri="{FF2B5EF4-FFF2-40B4-BE49-F238E27FC236}">
+                <a16:creationId xmlns:a16="http://schemas.microsoft.com/office/drawing/2014/main" id="{5987273E-E873-5496-040D-9BFB55790C20}"/>
+              </a:ext>
+            </a:extLst>
+          </p:cNvPr>
+          <p:cNvSpPr>
+            <a:spLocks noChangeAspect="1" noChangeArrowheads="1"/>
+          </p:cNvSpPr>
+          <p:nvPr/>
+        </p:nvSpPr>
+        <p:spPr bwMode="auto">
+          <a:xfrm>
+            <a:off x="5390551" y="3588802"/>
+            <a:ext cx="2751221" cy="2751221"/>
+          </a:xfrm>
+          <a:prstGeom prst="rect">
+            <a:avLst/>
+          </a:prstGeom>
+          <a:noFill/>
+          <a:extLst>
+            <a:ext uri="{909E8E84-426E-40DD-AFC4-6F175D3DCCD1}">
+              <a14:hiddenFill xmlns:a14="http://schemas.microsoft.com/office/drawing/2010/main">
+                <a:solidFill>
+                  <a:srgbClr val="FFFFFF"/>
+                </a:solidFill>
+              </a14:hiddenFill>
+            </a:ext>
+          </a:extLst>
+        </p:spPr>
+        <p:txBody>
+          <a:bodyPr vert="horz" wrap="square" lIns="91440" tIns="45720" rIns="91440" bIns="45720" numCol="1" anchor="t" anchorCtr="0" compatLnSpc="1">
+            <a:prstTxWarp prst="textNoShape">
+              <a:avLst/>
+            </a:prstTxWarp>
+          </a:bodyPr>
+          <a:lstStyle/>
+          <a:p>
+            <a:endParaRPr lang="en-US"/>
+          </a:p>
+        </p:txBody>
+      </p:sp>
+      <p:pic>
+        <p:nvPicPr>
+          <p:cNvPr id="21" name="Picture 20">
+            <a:extLst>
+              <a:ext uri="{FF2B5EF4-FFF2-40B4-BE49-F238E27FC236}">
+                <a16:creationId xmlns:a16="http://schemas.microsoft.com/office/drawing/2014/main" id="{4EBA94D4-9EB6-54A9-3428-EAEC2E94047F}"/>
+              </a:ext>
+            </a:extLst>
+          </p:cNvPr>
+          <p:cNvPicPr>
+            <a:picLocks noChangeAspect="1"/>
+          </p:cNvPicPr>
+          <p:nvPr/>
+        </p:nvPicPr>
+        <p:blipFill>
+          <a:blip r:embed="rId7"/>
+          <a:stretch>
+            <a:fillRect/>
+          </a:stretch>
+        </p:blipFill>
+        <p:spPr>
+          <a:xfrm>
+            <a:off x="6609276" y="3609474"/>
+            <a:ext cx="368565" cy="368565"/>
+          </a:xfrm>
+          <a:prstGeom prst="rect">
+            <a:avLst/>
+          </a:prstGeom>
+        </p:spPr>
+      </p:pic>
+      <p:sp>
+        <p:nvSpPr>
+          <p:cNvPr id="22" name="TextBox 21">
+            <a:extLst>
+              <a:ext uri="{FF2B5EF4-FFF2-40B4-BE49-F238E27FC236}">
+                <a16:creationId xmlns:a16="http://schemas.microsoft.com/office/drawing/2014/main" id="{849E3AD3-7BFE-470D-216C-9D57903CA61F}"/>
+              </a:ext>
+            </a:extLst>
+          </p:cNvPr>
+          <p:cNvSpPr txBox="1"/>
+          <p:nvPr/>
+        </p:nvSpPr>
+        <p:spPr>
+          <a:xfrm>
+            <a:off x="6270074" y="4033864"/>
+            <a:ext cx="1040637" cy="418256"/>
+          </a:xfrm>
+          <a:prstGeom prst="rect">
+            <a:avLst/>
+          </a:prstGeom>
+          <a:noFill/>
+        </p:spPr>
+        <p:txBody>
+          <a:bodyPr wrap="square" lIns="0" tIns="0" rIns="0" bIns="0" rtlCol="0">
+            <a:spAutoFit/>
+          </a:bodyPr>
+          <a:lstStyle/>
+          <a:p>
+            <a:pPr marL="0" marR="0" lvl="0" indent="0" algn="ctr" defTabSz="914400" rtl="0" eaLnBrk="1" fontAlgn="auto" latinLnBrk="0" hangingPunct="1">
+              <a:lnSpc>
+                <a:spcPct val="110000"/>
+              </a:lnSpc>
+              <a:spcBef>
+                <a:spcPts val="0"/>
+              </a:spcBef>
+              <a:spcAft>
+                <a:spcPts val="200"/>
+              </a:spcAft>
+              <a:buClrTx/>
+              <a:buSzTx/>
+              <a:buFontTx/>
+              <a:buNone/>
+              <a:tabLst/>
+              <a:defRPr/>
+            </a:pPr>
+            <a:r>
+              <a:rPr lang="en-US" sz="1200" b="1" noProof="0" dirty="0">
+                <a:solidFill>
+                  <a:srgbClr val="5D77C7"/>
+                </a:solidFill>
+                <a:latin typeface="Segoe Sans Text Semibold"/>
+                <a:cs typeface="Segoe UI Semibold" panose="020B0702040204020203" pitchFamily="34" charset="0"/>
+              </a:rPr>
+              <a:t>Microsoft</a:t>
+            </a:r>
+          </a:p>
+          <a:p>
+            <a:pPr marL="0" marR="0" lvl="0" indent="0" algn="ctr" defTabSz="914400" rtl="0" eaLnBrk="1" fontAlgn="auto" latinLnBrk="0" hangingPunct="1">
+              <a:lnSpc>
+                <a:spcPct val="110000"/>
+              </a:lnSpc>
+              <a:spcBef>
+                <a:spcPts val="0"/>
+              </a:spcBef>
+              <a:spcAft>
+                <a:spcPts val="200"/>
+              </a:spcAft>
+              <a:buClrTx/>
+              <a:buSzTx/>
+              <a:buFontTx/>
+              <a:buNone/>
+              <a:tabLst/>
+              <a:defRPr/>
+            </a:pPr>
+            <a:r>
+              <a:rPr lang="en-US" sz="1200" b="1" noProof="0" dirty="0">
+                <a:solidFill>
+                  <a:srgbClr val="5D77C7"/>
+                </a:solidFill>
+                <a:latin typeface="Segoe Sans Text Semibold"/>
+                <a:cs typeface="Segoe UI Semibold" panose="020B0702040204020203" pitchFamily="34" charset="0"/>
+              </a:rPr>
+              <a:t>Phi-4</a:t>
+            </a:r>
+            <a:endParaRPr kumimoji="0" lang="en-US" sz="1200" b="1" i="0" u="none" strike="noStrike" kern="1200" cap="none" spc="0" normalizeH="0" baseline="0" noProof="0" dirty="0">
+              <a:ln>
+                <a:noFill/>
+              </a:ln>
+              <a:solidFill>
+                <a:srgbClr val="5D77C7"/>
+              </a:solidFill>
+              <a:effectLst/>
+              <a:uLnTx/>
+              <a:uFillTx/>
+              <a:latin typeface="Segoe Sans Text Semibold"/>
+              <a:cs typeface="Segoe UI Semibold" panose="020B0702040204020203" pitchFamily="34" charset="0"/>
+            </a:endParaRPr>
+          </a:p>
+        </p:txBody>
+      </p:sp>
+      <p:pic>
+        <p:nvPicPr>
+          <p:cNvPr id="23" name="Picture 12" descr="Adobe Logo PNG Transparent Images - PNG All">
+            <a:extLst>
+              <a:ext uri="{FF2B5EF4-FFF2-40B4-BE49-F238E27FC236}">
+                <a16:creationId xmlns:a16="http://schemas.microsoft.com/office/drawing/2014/main" id="{A708655D-A28F-154E-D90B-8A07234D1BA1}"/>
+              </a:ext>
+            </a:extLst>
+          </p:cNvPr>
+          <p:cNvPicPr>
+            <a:picLocks noChangeAspect="1" noChangeArrowheads="1"/>
+          </p:cNvPicPr>
+          <p:nvPr/>
+        </p:nvPicPr>
+        <p:blipFill>
+          <a:blip r:embed="rId8">
+            <a:extLst>
+              <a:ext uri="{28A0092B-C50C-407E-A947-70E740481C1C}">
+                <a14:useLocalDpi xmlns:a14="http://schemas.microsoft.com/office/drawing/2010/main" val="0"/>
+              </a:ext>
+            </a:extLst>
+          </a:blip>
+          <a:srcRect/>
+          <a:stretch>
+            <a:fillRect/>
+          </a:stretch>
+        </p:blipFill>
+        <p:spPr bwMode="auto">
+          <a:xfrm>
+            <a:off x="8781638" y="3616239"/>
+            <a:ext cx="656590" cy="369332"/>
+          </a:xfrm>
+          <a:prstGeom prst="rect">
+            <a:avLst/>
+          </a:prstGeom>
+          <a:noFill/>
+          <a:extLst>
+            <a:ext uri="{909E8E84-426E-40DD-AFC4-6F175D3DCCD1}">
+              <a14:hiddenFill xmlns:a14="http://schemas.microsoft.com/office/drawing/2010/main">
+                <a:solidFill>
+                  <a:srgbClr val="FFFFFF"/>
+                </a:solidFill>
+              </a14:hiddenFill>
+            </a:ext>
+          </a:extLst>
+        </p:spPr>
+      </p:pic>
+      <p:sp>
+        <p:nvSpPr>
+          <p:cNvPr id="24" name="TextBox 23">
+            <a:extLst>
+              <a:ext uri="{FF2B5EF4-FFF2-40B4-BE49-F238E27FC236}">
+                <a16:creationId xmlns:a16="http://schemas.microsoft.com/office/drawing/2014/main" id="{7E4D59BE-62D6-EC46-B6AE-FD5724B01941}"/>
+              </a:ext>
+            </a:extLst>
+          </p:cNvPr>
+          <p:cNvSpPr txBox="1"/>
+          <p:nvPr/>
+        </p:nvSpPr>
+        <p:spPr>
+          <a:xfrm>
+            <a:off x="8589862" y="4037149"/>
+            <a:ext cx="1040637" cy="418256"/>
+          </a:xfrm>
+          <a:prstGeom prst="rect">
+            <a:avLst/>
+          </a:prstGeom>
+          <a:noFill/>
+        </p:spPr>
+        <p:txBody>
+          <a:bodyPr wrap="square" lIns="0" tIns="0" rIns="0" bIns="0" rtlCol="0">
+            <a:spAutoFit/>
+          </a:bodyPr>
+          <a:lstStyle/>
+          <a:p>
+            <a:pPr marL="0" marR="0" lvl="0" indent="0" algn="ctr" defTabSz="914400" rtl="0" eaLnBrk="1" fontAlgn="auto" latinLnBrk="0" hangingPunct="1">
+              <a:lnSpc>
+                <a:spcPct val="110000"/>
+              </a:lnSpc>
+              <a:spcBef>
+                <a:spcPts val="0"/>
+              </a:spcBef>
+              <a:spcAft>
+                <a:spcPts val="200"/>
+              </a:spcAft>
+              <a:buClrTx/>
+              <a:buSzTx/>
+              <a:buFontTx/>
+              <a:buNone/>
+              <a:tabLst/>
+              <a:defRPr/>
+            </a:pPr>
+            <a:r>
+              <a:rPr lang="en-US" sz="1200" b="1" noProof="0" dirty="0">
+                <a:solidFill>
+                  <a:srgbClr val="5D77C7"/>
+                </a:solidFill>
+                <a:latin typeface="Segoe Sans Text Semibold"/>
+                <a:cs typeface="Segoe UI Semibold" panose="020B0702040204020203" pitchFamily="34" charset="0"/>
+              </a:rPr>
+              <a:t>Adobe</a:t>
+            </a:r>
+          </a:p>
+          <a:p>
+            <a:pPr marL="0" marR="0" lvl="0" indent="0" algn="ctr" defTabSz="914400" rtl="0" eaLnBrk="1" fontAlgn="auto" latinLnBrk="0" hangingPunct="1">
+              <a:lnSpc>
+                <a:spcPct val="110000"/>
+              </a:lnSpc>
+              <a:spcBef>
+                <a:spcPts val="0"/>
+              </a:spcBef>
+              <a:spcAft>
+                <a:spcPts val="200"/>
+              </a:spcAft>
+              <a:buClrTx/>
+              <a:buSzTx/>
+              <a:buFontTx/>
+              <a:buNone/>
+              <a:tabLst/>
+              <a:defRPr/>
+            </a:pPr>
+            <a:r>
+              <a:rPr lang="en-US" sz="1200" b="1" noProof="0" dirty="0">
+                <a:solidFill>
+                  <a:srgbClr val="5D77C7"/>
+                </a:solidFill>
+                <a:latin typeface="Segoe Sans Text Semibold"/>
+                <a:cs typeface="Segoe UI Semibold" panose="020B0702040204020203" pitchFamily="34" charset="0"/>
+              </a:rPr>
+              <a:t>Firefly</a:t>
+            </a:r>
+            <a:endParaRPr kumimoji="0" lang="en-US" sz="1200" b="1" i="0" u="none" strike="noStrike" kern="1200" cap="none" spc="0" normalizeH="0" baseline="0" noProof="0" dirty="0">
+              <a:ln>
+                <a:noFill/>
+              </a:ln>
+              <a:solidFill>
+                <a:srgbClr val="5D77C7"/>
+              </a:solidFill>
+              <a:effectLst/>
+              <a:uLnTx/>
+              <a:uFillTx/>
+              <a:latin typeface="Segoe Sans Text Semibold"/>
+              <a:cs typeface="Segoe UI Semibold" panose="020B0702040204020203" pitchFamily="34" charset="0"/>
+            </a:endParaRPr>
+          </a:p>
+        </p:txBody>
+      </p:sp>
+      <p:pic>
+        <p:nvPicPr>
+          <p:cNvPr id="25" name="Picture 24">
+            <a:extLst>
+              <a:ext uri="{FF2B5EF4-FFF2-40B4-BE49-F238E27FC236}">
+                <a16:creationId xmlns:a16="http://schemas.microsoft.com/office/drawing/2014/main" id="{B96908FF-6A49-DFB7-7F6B-3AA3C49B0AAB}"/>
+              </a:ext>
+            </a:extLst>
+          </p:cNvPr>
+          <p:cNvPicPr>
+            <a:picLocks noChangeAspect="1"/>
+          </p:cNvPicPr>
+          <p:nvPr/>
+        </p:nvPicPr>
+        <p:blipFill>
+          <a:blip r:embed="rId9"/>
+          <a:stretch>
+            <a:fillRect/>
+          </a:stretch>
+        </p:blipFill>
+        <p:spPr>
+          <a:xfrm>
+            <a:off x="10331381" y="3594048"/>
+            <a:ext cx="413714" cy="413714"/>
+          </a:xfrm>
+          <a:prstGeom prst="rect">
+            <a:avLst/>
+          </a:prstGeom>
+        </p:spPr>
+      </p:pic>
+      <p:sp>
+        <p:nvSpPr>
+          <p:cNvPr id="26" name="TextBox 25">
+            <a:extLst>
+              <a:ext uri="{FF2B5EF4-FFF2-40B4-BE49-F238E27FC236}">
+                <a16:creationId xmlns:a16="http://schemas.microsoft.com/office/drawing/2014/main" id="{A4844F0C-7D4A-755E-530B-54F9EB859146}"/>
+              </a:ext>
+            </a:extLst>
+          </p:cNvPr>
+          <p:cNvSpPr txBox="1"/>
+          <p:nvPr/>
+        </p:nvSpPr>
+        <p:spPr>
+          <a:xfrm>
+            <a:off x="9965402" y="4030835"/>
+            <a:ext cx="1040637" cy="418256"/>
+          </a:xfrm>
+          <a:prstGeom prst="rect">
+            <a:avLst/>
+          </a:prstGeom>
+          <a:noFill/>
+        </p:spPr>
+        <p:txBody>
+          <a:bodyPr wrap="square" lIns="0" tIns="0" rIns="0" bIns="0" rtlCol="0">
+            <a:spAutoFit/>
+          </a:bodyPr>
+          <a:lstStyle/>
+          <a:p>
+            <a:pPr marL="0" marR="0" lvl="0" indent="0" algn="ctr" defTabSz="914400" rtl="0" eaLnBrk="1" fontAlgn="auto" latinLnBrk="0" hangingPunct="1">
+              <a:lnSpc>
+                <a:spcPct val="110000"/>
+              </a:lnSpc>
+              <a:spcBef>
+                <a:spcPts val="0"/>
+              </a:spcBef>
+              <a:spcAft>
+                <a:spcPts val="200"/>
+              </a:spcAft>
+              <a:buClrTx/>
+              <a:buSzTx/>
+              <a:buFontTx/>
+              <a:buNone/>
+              <a:tabLst/>
+              <a:defRPr/>
+            </a:pPr>
+            <a:r>
+              <a:rPr lang="en-US" sz="1200" b="1" noProof="0" dirty="0">
+                <a:solidFill>
+                  <a:srgbClr val="5D77C7"/>
+                </a:solidFill>
+                <a:latin typeface="Segoe Sans Text Semibold"/>
+                <a:cs typeface="Segoe UI Semibold" panose="020B0702040204020203" pitchFamily="34" charset="0"/>
+              </a:rPr>
+              <a:t>Nasdaq</a:t>
+            </a:r>
+          </a:p>
+          <a:p>
+            <a:pPr marL="0" marR="0" lvl="0" indent="0" algn="ctr" defTabSz="914400" rtl="0" eaLnBrk="1" fontAlgn="auto" latinLnBrk="0" hangingPunct="1">
+              <a:lnSpc>
+                <a:spcPct val="110000"/>
+              </a:lnSpc>
+              <a:spcBef>
+                <a:spcPts val="0"/>
+              </a:spcBef>
+              <a:spcAft>
+                <a:spcPts val="200"/>
+              </a:spcAft>
+              <a:buClrTx/>
+              <a:buSzTx/>
+              <a:buFontTx/>
+              <a:buNone/>
+              <a:tabLst/>
+              <a:defRPr/>
+            </a:pPr>
+            <a:r>
+              <a:rPr lang="en-US" sz="1200" b="1" noProof="0" dirty="0">
+                <a:solidFill>
+                  <a:srgbClr val="5D77C7"/>
+                </a:solidFill>
+                <a:latin typeface="Segoe Sans Text Semibold"/>
+                <a:cs typeface="Segoe UI Semibold" panose="020B0702040204020203" pitchFamily="34" charset="0"/>
+              </a:rPr>
+              <a:t>BoardVantage</a:t>
+            </a:r>
+            <a:endParaRPr kumimoji="0" lang="en-US" sz="1200" b="1" i="0" u="none" strike="noStrike" kern="1200" cap="none" spc="0" normalizeH="0" baseline="0" noProof="0" dirty="0">
+              <a:ln>
+                <a:noFill/>
+              </a:ln>
+              <a:solidFill>
+                <a:srgbClr val="5D77C7"/>
+              </a:solidFill>
+              <a:effectLst/>
+              <a:uLnTx/>
+              <a:uFillTx/>
+              <a:latin typeface="Segoe Sans Text Semibold"/>
+              <a:cs typeface="Segoe UI Semibold" panose="020B0702040204020203" pitchFamily="34" charset="0"/>
+            </a:endParaRPr>
+          </a:p>
+        </p:txBody>
+      </p:sp>
+    </p:spTree>
+    <p:extLst>
+      <p:ext uri="{BB962C8B-B14F-4D97-AF65-F5344CB8AC3E}">
+        <p14:creationId xmlns:p14="http://schemas.microsoft.com/office/powerpoint/2010/main" val="1074725259"/>
+      </p:ext>
+    </p:extLst>
+  </p:cSld>
+  <p:clrMapOvr>
+    <a:masterClrMapping/>
+  </p:clrMapOvr>
+  <p:timing>
+    <p:tnLst>
+      <p:par>
+        <p:cTn id="1" dur="indefinite" restart="never" nodeType="tmRoot">
+          <p:childTnLst>
+            <p:seq concurrent="1" nextAc="seek">
+              <p:cTn id="2" dur="indefinite" nodeType="mainSeq">
+                <p:childTnLst>
+                  <p:par>
+                    <p:cTn id="3" fill="hold">
+                      <p:stCondLst>
+                        <p:cond delay="indefinite"/>
+                        <p:cond evt="onBegin" delay="0">
+                          <p:tn val="2"/>
+                        </p:cond>
+                      </p:stCondLst>
+                      <p:childTnLst>
+                        <p:par>
+                          <p:cTn id="4" fill="hold">
+                            <p:stCondLst>
+                              <p:cond delay="0"/>
+                            </p:stCondLst>
+                            <p:childTnLst>
+                              <p:par>
+                                <p:cTn id="5" presetID="22" presetClass="entr" presetSubtype="8" fill="hold" grpId="0" nodeType="withEffect">
+                                  <p:stCondLst>
+                                    <p:cond delay="0"/>
+                                  </p:stCondLst>
+                                  <p:childTnLst>
+                                    <p:set>
+                                      <p:cBhvr>
+                                        <p:cTn id="6" dur="1" fill="hold">
+                                          <p:stCondLst>
+                                            <p:cond delay="0"/>
+                                          </p:stCondLst>
+                                        </p:cTn>
+                                        <p:tgtEl>
+                                          <p:spTgt spid="4"/>
+                                        </p:tgtEl>
+                                        <p:attrNameLst>
+                                          <p:attrName>style.visibility</p:attrName>
+                                        </p:attrNameLst>
+                                      </p:cBhvr>
+                                      <p:to>
+                                        <p:strVal val="visible"/>
+                                      </p:to>
+                                    </p:set>
+                                    <p:animEffect transition="in" filter="wipe(left)">
+                                      <p:cBhvr>
+                                        <p:cTn id="7" dur="500"/>
+                                        <p:tgtEl>
+                                          <p:spTgt spid="4"/>
+                                        </p:tgtEl>
+                                      </p:cBhvr>
+                                    </p:animEffect>
+                                  </p:childTnLst>
+                                </p:cTn>
+                              </p:par>
+                              <p:par>
+                                <p:cTn id="8" presetID="22" presetClass="entr" presetSubtype="8" fill="hold" grpId="0" nodeType="withEffect">
+                                  <p:stCondLst>
+                                    <p:cond delay="0"/>
+                                  </p:stCondLst>
+                                  <p:childTnLst>
+                                    <p:set>
+                                      <p:cBhvr>
+                                        <p:cTn id="9" dur="1" fill="hold">
+                                          <p:stCondLst>
+                                            <p:cond delay="0"/>
+                                          </p:stCondLst>
+                                        </p:cTn>
+                                        <p:tgtEl>
+                                          <p:spTgt spid="6"/>
+                                        </p:tgtEl>
+                                        <p:attrNameLst>
+                                          <p:attrName>style.visibility</p:attrName>
+                                        </p:attrNameLst>
+                                      </p:cBhvr>
+                                      <p:to>
+                                        <p:strVal val="visible"/>
+                                      </p:to>
+                                    </p:set>
+                                    <p:animEffect transition="in" filter="wipe(left)">
+                                      <p:cBhvr>
+                                        <p:cTn id="10" dur="500"/>
+                                        <p:tgtEl>
+                                          <p:spTgt spid="6"/>
+                                        </p:tgtEl>
+                                      </p:cBhvr>
+                                    </p:animEffect>
+                                  </p:childTnLst>
+                                </p:cTn>
+                              </p:par>
+                              <p:par>
+                                <p:cTn id="11" presetID="22" presetClass="entr" presetSubtype="8" fill="hold" grpId="0" nodeType="withEffect">
+                                  <p:stCondLst>
+                                    <p:cond delay="0"/>
+                                  </p:stCondLst>
+                                  <p:childTnLst>
+                                    <p:set>
+                                      <p:cBhvr>
+                                        <p:cTn id="12" dur="1" fill="hold">
+                                          <p:stCondLst>
+                                            <p:cond delay="0"/>
+                                          </p:stCondLst>
+                                        </p:cTn>
+                                        <p:tgtEl>
+                                          <p:spTgt spid="8"/>
+                                        </p:tgtEl>
+                                        <p:attrNameLst>
+                                          <p:attrName>style.visibility</p:attrName>
+                                        </p:attrNameLst>
+                                      </p:cBhvr>
+                                      <p:to>
+                                        <p:strVal val="visible"/>
+                                      </p:to>
+                                    </p:set>
+                                    <p:animEffect transition="in" filter="wipe(left)">
+                                      <p:cBhvr>
+                                        <p:cTn id="13" dur="500"/>
+                                        <p:tgtEl>
+                                          <p:spTgt spid="8"/>
+                                        </p:tgtEl>
+                                      </p:cBhvr>
+                                    </p:animEffect>
+                                  </p:childTnLst>
+                                </p:cTn>
+                              </p:par>
+                              <p:par>
+                                <p:cTn id="14" presetID="22" presetClass="entr" presetSubtype="8" fill="hold" grpId="0" nodeType="withEffect">
+                                  <p:stCondLst>
+                                    <p:cond delay="0"/>
+                                  </p:stCondLst>
+                                  <p:childTnLst>
+                                    <p:set>
+                                      <p:cBhvr>
+                                        <p:cTn id="15" dur="1" fill="hold">
+                                          <p:stCondLst>
+                                            <p:cond delay="0"/>
+                                          </p:stCondLst>
+                                        </p:cTn>
+                                        <p:tgtEl>
+                                          <p:spTgt spid="10"/>
+                                        </p:tgtEl>
+                                        <p:attrNameLst>
+                                          <p:attrName>style.visibility</p:attrName>
+                                        </p:attrNameLst>
+                                      </p:cBhvr>
+                                      <p:to>
+                                        <p:strVal val="visible"/>
+                                      </p:to>
+                                    </p:set>
+                                    <p:animEffect transition="in" filter="wipe(left)">
+                                      <p:cBhvr>
+                                        <p:cTn id="16" dur="500"/>
+                                        <p:tgtEl>
+                                          <p:spTgt spid="10"/>
+                                        </p:tgtEl>
+                                      </p:cBhvr>
+                                    </p:animEffect>
+                                  </p:childTnLst>
+                                </p:cTn>
+                              </p:par>
+                              <p:par>
+                                <p:cTn id="17" presetID="22" presetClass="entr" presetSubtype="8" fill="hold" grpId="0" nodeType="withEffect">
+                                  <p:stCondLst>
+                                    <p:cond delay="0"/>
+                                  </p:stCondLst>
+                                  <p:childTnLst>
+                                    <p:set>
+                                      <p:cBhvr>
+                                        <p:cTn id="18" dur="1" fill="hold">
+                                          <p:stCondLst>
+                                            <p:cond delay="0"/>
+                                          </p:stCondLst>
+                                        </p:cTn>
+                                        <p:tgtEl>
+                                          <p:spTgt spid="14"/>
+                                        </p:tgtEl>
+                                        <p:attrNameLst>
+                                          <p:attrName>style.visibility</p:attrName>
+                                        </p:attrNameLst>
+                                      </p:cBhvr>
+                                      <p:to>
+                                        <p:strVal val="visible"/>
+                                      </p:to>
+                                    </p:set>
+                                    <p:animEffect transition="in" filter="wipe(left)">
+                                      <p:cBhvr>
+                                        <p:cTn id="19" dur="500"/>
+                                        <p:tgtEl>
+                                          <p:spTgt spid="14"/>
+                                        </p:tgtEl>
+                                      </p:cBhvr>
+                                    </p:animEffect>
+                                  </p:childTnLst>
+                                </p:cTn>
+                              </p:par>
+                              <p:par>
+                                <p:cTn id="20" presetID="22" presetClass="entr" presetSubtype="8" fill="hold" grpId="0" nodeType="withEffect">
+                                  <p:stCondLst>
+                                    <p:cond delay="0"/>
+                                  </p:stCondLst>
+                                  <p:childTnLst>
+                                    <p:set>
+                                      <p:cBhvr>
+                                        <p:cTn id="21" dur="1" fill="hold">
+                                          <p:stCondLst>
+                                            <p:cond delay="0"/>
+                                          </p:stCondLst>
+                                        </p:cTn>
+                                        <p:tgtEl>
+                                          <p:spTgt spid="16"/>
+                                        </p:tgtEl>
+                                        <p:attrNameLst>
+                                          <p:attrName>style.visibility</p:attrName>
+                                        </p:attrNameLst>
+                                      </p:cBhvr>
+                                      <p:to>
+                                        <p:strVal val="visible"/>
+                                      </p:to>
+                                    </p:set>
+                                    <p:animEffect transition="in" filter="wipe(left)">
+                                      <p:cBhvr>
+                                        <p:cTn id="22" dur="500"/>
+                                        <p:tgtEl>
+                                          <p:spTgt spid="16"/>
+                                        </p:tgtEl>
+                                      </p:cBhvr>
+                                    </p:animEffect>
+                                  </p:childTnLst>
+                                </p:cTn>
+                              </p:par>
+                              <p:par>
+                                <p:cTn id="23" presetID="22" presetClass="entr" presetSubtype="8" fill="hold" grpId="0" nodeType="withEffect">
+                                  <p:stCondLst>
+                                    <p:cond delay="0"/>
+                                  </p:stCondLst>
+                                  <p:childTnLst>
+                                    <p:set>
+                                      <p:cBhvr>
+                                        <p:cTn id="24" dur="1" fill="hold">
+                                          <p:stCondLst>
+                                            <p:cond delay="0"/>
+                                          </p:stCondLst>
+                                        </p:cTn>
+                                        <p:tgtEl>
+                                          <p:spTgt spid="18"/>
+                                        </p:tgtEl>
+                                        <p:attrNameLst>
+                                          <p:attrName>style.visibility</p:attrName>
+                                        </p:attrNameLst>
+                                      </p:cBhvr>
+                                      <p:to>
+                                        <p:strVal val="visible"/>
+                                      </p:to>
+                                    </p:set>
+                                    <p:animEffect transition="in" filter="wipe(left)">
+                                      <p:cBhvr>
+                                        <p:cTn id="25" dur="500"/>
+                                        <p:tgtEl>
+                                          <p:spTgt spid="18"/>
+                                        </p:tgtEl>
+                                      </p:cBhvr>
+                                    </p:animEffect>
+                                  </p:childTnLst>
+                                </p:cTn>
+                              </p:par>
+                              <p:par>
+                                <p:cTn id="26" presetID="22" presetClass="entr" presetSubtype="8" fill="hold" grpId="0" nodeType="withEffect">
+                                  <p:stCondLst>
+                                    <p:cond delay="0"/>
+                                  </p:stCondLst>
+                                  <p:childTnLst>
+                                    <p:set>
+                                      <p:cBhvr>
+                                        <p:cTn id="27" dur="1" fill="hold">
+                                          <p:stCondLst>
+                                            <p:cond delay="0"/>
+                                          </p:stCondLst>
+                                        </p:cTn>
+                                        <p:tgtEl>
+                                          <p:spTgt spid="22"/>
+                                        </p:tgtEl>
+                                        <p:attrNameLst>
+                                          <p:attrName>style.visibility</p:attrName>
+                                        </p:attrNameLst>
+                                      </p:cBhvr>
+                                      <p:to>
+                                        <p:strVal val="visible"/>
+                                      </p:to>
+                                    </p:set>
+                                    <p:animEffect transition="in" filter="wipe(left)">
+                                      <p:cBhvr>
+                                        <p:cTn id="28" dur="500"/>
+                                        <p:tgtEl>
+                                          <p:spTgt spid="22"/>
+                                        </p:tgtEl>
+                                      </p:cBhvr>
+                                    </p:animEffect>
+                                  </p:childTnLst>
+                                </p:cTn>
+                              </p:par>
+                              <p:par>
+                                <p:cTn id="29" presetID="22" presetClass="entr" presetSubtype="8" fill="hold" grpId="0" nodeType="withEffect">
+                                  <p:stCondLst>
+                                    <p:cond delay="0"/>
+                                  </p:stCondLst>
+                                  <p:childTnLst>
+                                    <p:set>
+                                      <p:cBhvr>
+                                        <p:cTn id="30" dur="1" fill="hold">
+                                          <p:stCondLst>
+                                            <p:cond delay="0"/>
+                                          </p:stCondLst>
+                                        </p:cTn>
+                                        <p:tgtEl>
+                                          <p:spTgt spid="24"/>
+                                        </p:tgtEl>
+                                        <p:attrNameLst>
+                                          <p:attrName>style.visibility</p:attrName>
+                                        </p:attrNameLst>
+                                      </p:cBhvr>
+                                      <p:to>
+                                        <p:strVal val="visible"/>
+                                      </p:to>
+                                    </p:set>
+                                    <p:animEffect transition="in" filter="wipe(left)">
+                                      <p:cBhvr>
+                                        <p:cTn id="31" dur="500"/>
+                                        <p:tgtEl>
+                                          <p:spTgt spid="24"/>
+                                        </p:tgtEl>
+                                      </p:cBhvr>
+                                    </p:animEffect>
+                                  </p:childTnLst>
+                                </p:cTn>
+                              </p:par>
+                              <p:par>
+                                <p:cTn id="32" presetID="22" presetClass="entr" presetSubtype="8" fill="hold" grpId="0" nodeType="withEffect">
+                                  <p:stCondLst>
+                                    <p:cond delay="0"/>
+                                  </p:stCondLst>
+                                  <p:childTnLst>
+                                    <p:set>
+                                      <p:cBhvr>
+                                        <p:cTn id="33" dur="1" fill="hold">
+                                          <p:stCondLst>
+                                            <p:cond delay="0"/>
+                                          </p:stCondLst>
+                                        </p:cTn>
+                                        <p:tgtEl>
+                                          <p:spTgt spid="26"/>
+                                        </p:tgtEl>
+                                        <p:attrNameLst>
+                                          <p:attrName>style.visibility</p:attrName>
+                                        </p:attrNameLst>
+                                      </p:cBhvr>
+                                      <p:to>
+                                        <p:strVal val="visible"/>
+                                      </p:to>
+                                    </p:set>
+                                    <p:animEffect transition="in" filter="wipe(left)">
+                                      <p:cBhvr>
+                                        <p:cTn id="34" dur="500"/>
+                                        <p:tgtEl>
+                                          <p:spTgt spid="26"/>
+                                        </p:tgtEl>
+                                      </p:cBhvr>
+                                    </p:animEffect>
+                                  </p:childTnLst>
+                                </p:cTn>
+                              </p:par>
+                            </p:childTnLst>
+                          </p:cTn>
+                        </p:par>
+                      </p:childTnLst>
+                    </p:cTn>
+                  </p:par>
+                </p:childTnLst>
+              </p:cTn>
+              <p:prevCondLst>
+                <p:cond evt="onPrev" delay="0">
+                  <p:tgtEl>
+                    <p:sldTgt/>
+                  </p:tgtEl>
+                </p:cond>
+              </p:prevCondLst>
+              <p:nextCondLst>
+                <p:cond evt="onNext" delay="0">
+                  <p:tgtEl>
+                    <p:sldTgt/>
+                  </p:tgtEl>
+                </p:cond>
+              </p:nextCondLst>
+            </p:seq>
+          </p:childTnLst>
+        </p:cTn>
+      </p:par>
+    </p:tnLst>
+    <p:bldLst>
+      <p:bldP spid="4" grpId="0"/>
+      <p:bldP spid="6" grpId="0"/>
+      <p:bldP spid="8" grpId="0"/>
+      <p:bldP spid="10" grpId="0"/>
+      <p:bldP spid="14" grpId="0"/>
+      <p:bldP spid="16" grpId="0"/>
+      <p:bldP spid="18" grpId="0"/>
+      <p:bldP spid="22" grpId="0"/>
+      <p:bldP spid="24" grpId="0"/>
+      <p:bldP spid="26" grpId="0"/>
+    </p:bldLst>
+  </p:timing>
+</p:sld>
+</file>
+
 <file path=ppt/theme/theme1.xml><?xml version="1.0" encoding="utf-8"?>
 <a:theme xmlns:a="http://schemas.openxmlformats.org/drawingml/2006/main" name="Office Theme">
   <a:themeElements>
@@ -22768,4 +24749,10 @@
     </a:ext>
   </a:extLst>
 </a:theme>
+</file>
+
+<file path=docMetadata/LabelInfo.xml><?xml version="1.0" encoding="utf-8"?>
+<clbl:labelList xmlns:clbl="http://schemas.microsoft.com/office/2020/mipLabelMetadata">
+  <clbl:label id="{f42aa342-8706-4288-bd11-ebb85995028c}" enabled="1" method="Standard" siteId="{72f988bf-86f1-41af-91ab-2d7cd011db47}" contentBits="0" removed="0"/>
+</clbl:labelList>
 </file>
</xml_diff>